<commit_message>
updated presentation - some slides still missing
</commit_message>
<xml_diff>
--- a/BLOSUM_scorescompared to single SNAP scores.pptx
+++ b/BLOSUM_scorescompared to single SNAP scores.pptx
@@ -5,7 +5,7 @@
     <p:sldMasterId id="2147483648" r:id="rId1"/>
   </p:sldMasterIdLst>
   <p:notesMasterIdLst>
-    <p:notesMasterId r:id="rId12"/>
+    <p:notesMasterId r:id="rId18"/>
   </p:notesMasterIdLst>
   <p:sldIdLst>
     <p:sldId id="256" r:id="rId2"/>
@@ -15,9 +15,15 @@
     <p:sldId id="258" r:id="rId6"/>
     <p:sldId id="262" r:id="rId7"/>
     <p:sldId id="263" r:id="rId8"/>
-    <p:sldId id="264" r:id="rId9"/>
-    <p:sldId id="257" r:id="rId10"/>
-    <p:sldId id="265" r:id="rId11"/>
+    <p:sldId id="268" r:id="rId9"/>
+    <p:sldId id="269" r:id="rId10"/>
+    <p:sldId id="270" r:id="rId11"/>
+    <p:sldId id="271" r:id="rId12"/>
+    <p:sldId id="264" r:id="rId13"/>
+    <p:sldId id="266" r:id="rId14"/>
+    <p:sldId id="257" r:id="rId15"/>
+    <p:sldId id="267" r:id="rId16"/>
+    <p:sldId id="265" r:id="rId17"/>
   </p:sldIdLst>
   <p:sldSz cx="12192000" cy="6858000"/>
   <p:notesSz cx="6858000" cy="9144000"/>
@@ -116,6 +122,11 @@
       </a:defRPr>
     </a:lvl9pPr>
   </p:defaultTextStyle>
+  <p:extLst>
+    <p:ext uri="{EFAFB233-063F-42B5-8137-9DF3F51BA10A}">
+      <p15:sldGuideLst xmlns:p15="http://schemas.microsoft.com/office/powerpoint/2012/main"/>
+    </p:ext>
+  </p:extLst>
 </p:presentation>
 </file>
 
@@ -4085,7 +4096,7 @@
           <p:cNvPr id="2" name="Titel 1">
             <a:extLst>
               <a:ext uri="{FF2B5EF4-FFF2-40B4-BE49-F238E27FC236}">
-                <a16:creationId xmlns:a16="http://schemas.microsoft.com/office/drawing/2014/main" id="{9D97ED67-0983-40BA-B344-DFF1A8F9D645}"/>
+                <a16:creationId xmlns:a16="http://schemas.microsoft.com/office/drawing/2014/main" id="{BC47E63C-8BEB-46E4-A67C-028C263AB2BF}"/>
               </a:ext>
             </a:extLst>
           </p:cNvPr>
@@ -4101,44 +4112,25 @@
           <a:bodyPr/>
           <a:lstStyle/>
           <a:p>
-            <a:endParaRPr lang="en-US"/>
-          </a:p>
-        </p:txBody>
-      </p:sp>
-      <p:sp>
-        <p:nvSpPr>
-          <p:cNvPr id="3" name="Inhaltsplatzhalter 2">
-            <a:extLst>
-              <a:ext uri="{FF2B5EF4-FFF2-40B4-BE49-F238E27FC236}">
-                <a16:creationId xmlns:a16="http://schemas.microsoft.com/office/drawing/2014/main" id="{2EB22B1B-35DF-494F-B9F2-FC28829ED749}"/>
-              </a:ext>
-            </a:extLst>
-          </p:cNvPr>
-          <p:cNvSpPr>
-            <a:spLocks noGrp="1"/>
-          </p:cNvSpPr>
-          <p:nvPr>
-            <p:ph idx="1"/>
-          </p:nvPr>
-        </p:nvSpPr>
-        <p:spPr/>
-        <p:txBody>
-          <a:bodyPr/>
-          <a:lstStyle/>
-          <a:p>
-            <a:r>
-              <a:rPr lang="en-US" dirty="0"/>
-              <a:t>MCC: 0.23597300754427067</a:t>
-            </a:r>
-          </a:p>
-        </p:txBody>
-      </p:sp>
-      <p:sp>
-        <p:nvSpPr>
-          <p:cNvPr id="4" name="Foliennummernplatzhalter 3">
-            <a:extLst>
-              <a:ext uri="{FF2B5EF4-FFF2-40B4-BE49-F238E27FC236}">
-                <a16:creationId xmlns:a16="http://schemas.microsoft.com/office/drawing/2014/main" id="{FA0D585C-CC90-4B30-90DD-73F0D164A1C9}"/>
+            <a:pPr algn="ctr"/>
+            <a:r>
+              <a:rPr lang="de-DE" dirty="0"/>
+              <a:t>Hyperparameter: Grid </a:t>
+            </a:r>
+            <a:r>
+              <a:rPr lang="de-DE" dirty="0" err="1"/>
+              <a:t>search</a:t>
+            </a:r>
+            <a:endParaRPr lang="de-DE" dirty="0"/>
+          </a:p>
+        </p:txBody>
+      </p:sp>
+      <p:sp>
+        <p:nvSpPr>
+          <p:cNvPr id="5" name="Foliennummernplatzhalter 4">
+            <a:extLst>
+              <a:ext uri="{FF2B5EF4-FFF2-40B4-BE49-F238E27FC236}">
+                <a16:creationId xmlns:a16="http://schemas.microsoft.com/office/drawing/2014/main" id="{26C3A902-E35E-445D-A5DB-FFFA2DC59516}"/>
               </a:ext>
             </a:extLst>
           </p:cNvPr>
@@ -4162,10 +4154,80 @@
           </a:p>
         </p:txBody>
       </p:sp>
+      <p:pic>
+        <p:nvPicPr>
+          <p:cNvPr id="6" name="HiddenNodes.png" descr="HiddenNodes.png">
+            <a:extLst>
+              <a:ext uri="{FF2B5EF4-FFF2-40B4-BE49-F238E27FC236}">
+                <a16:creationId xmlns:a16="http://schemas.microsoft.com/office/drawing/2014/main" id="{6AAC1D14-878D-4EAF-8D1E-4FF8F4C5CE69}"/>
+              </a:ext>
+            </a:extLst>
+          </p:cNvPr>
+          <p:cNvPicPr>
+            <a:picLocks noGrp="1" noChangeAspect="1"/>
+          </p:cNvPicPr>
+          <p:nvPr>
+            <p:ph sz="half" idx="1"/>
+          </p:nvPr>
+        </p:nvPicPr>
+        <p:blipFill>
+          <a:blip r:embed="rId2"/>
+          <a:stretch>
+            <a:fillRect/>
+          </a:stretch>
+        </p:blipFill>
+        <p:spPr>
+          <a:xfrm>
+            <a:off x="838200" y="2631408"/>
+            <a:ext cx="5181600" cy="2739771"/>
+          </a:xfrm>
+          <a:prstGeom prst="rect">
+            <a:avLst/>
+          </a:prstGeom>
+          <a:ln w="12700">
+            <a:miter lim="400000"/>
+          </a:ln>
+        </p:spPr>
+      </p:pic>
+      <p:pic>
+        <p:nvPicPr>
+          <p:cNvPr id="7" name="Epochs.png" descr="Epochs.png">
+            <a:extLst>
+              <a:ext uri="{FF2B5EF4-FFF2-40B4-BE49-F238E27FC236}">
+                <a16:creationId xmlns:a16="http://schemas.microsoft.com/office/drawing/2014/main" id="{32CB2DC2-A1B2-4011-B333-57BE2685A703}"/>
+              </a:ext>
+            </a:extLst>
+          </p:cNvPr>
+          <p:cNvPicPr>
+            <a:picLocks noGrp="1" noChangeAspect="1"/>
+          </p:cNvPicPr>
+          <p:nvPr>
+            <p:ph sz="half" idx="2"/>
+          </p:nvPr>
+        </p:nvPicPr>
+        <p:blipFill>
+          <a:blip r:embed="rId3"/>
+          <a:stretch>
+            <a:fillRect/>
+          </a:stretch>
+        </p:blipFill>
+        <p:spPr>
+          <a:xfrm>
+            <a:off x="6328685" y="1825625"/>
+            <a:ext cx="4868629" cy="4351338"/>
+          </a:xfrm>
+          <a:prstGeom prst="rect">
+            <a:avLst/>
+          </a:prstGeom>
+          <a:ln w="12700">
+            <a:miter lim="400000"/>
+          </a:ln>
+        </p:spPr>
+      </p:pic>
     </p:spTree>
     <p:extLst>
       <p:ext uri="{BB962C8B-B14F-4D97-AF65-F5344CB8AC3E}">
-        <p14:creationId xmlns:p14="http://schemas.microsoft.com/office/powerpoint/2010/main" val="4122554641"/>
+        <p14:creationId xmlns:p14="http://schemas.microsoft.com/office/powerpoint/2010/main" val="1367925957"/>
       </p:ext>
     </p:extLst>
   </p:cSld>
@@ -4175,7 +4237,7 @@
 </p:sld>
 </file>
 
-<file path=ppt/slides/slide2.xml><?xml version="1.0" encoding="utf-8"?>
+<file path=ppt/slides/slide11.xml><?xml version="1.0" encoding="utf-8"?>
 <p:sld xmlns:a="http://schemas.openxmlformats.org/drawingml/2006/main" xmlns:r="http://schemas.openxmlformats.org/officeDocument/2006/relationships" xmlns:p="http://schemas.openxmlformats.org/presentationml/2006/main">
   <p:cSld>
     <p:spTree>
@@ -4194,10 +4256,10 @@
       </p:grpSpPr>
       <p:sp>
         <p:nvSpPr>
-          <p:cNvPr id="2" name="Titel 1">
-            <a:extLst>
-              <a:ext uri="{FF2B5EF4-FFF2-40B4-BE49-F238E27FC236}">
-                <a16:creationId xmlns:a16="http://schemas.microsoft.com/office/drawing/2014/main" id="{A0AF0F99-5B8C-4A5B-8805-CC5D24D3C564}"/>
+          <p:cNvPr id="6" name="Titel 5">
+            <a:extLst>
+              <a:ext uri="{FF2B5EF4-FFF2-40B4-BE49-F238E27FC236}">
+                <a16:creationId xmlns:a16="http://schemas.microsoft.com/office/drawing/2014/main" id="{5640FC08-8FC1-473A-A9C2-14D8F8007C76}"/>
               </a:ext>
             </a:extLst>
           </p:cNvPr>
@@ -4215,91 +4277,23 @@
           <a:p>
             <a:pPr algn="ctr"/>
             <a:r>
-              <a:rPr lang="en-US" dirty="0"/>
-              <a:t>Feature: first Ideas</a:t>
-            </a:r>
-          </a:p>
-        </p:txBody>
-      </p:sp>
-      <p:sp>
-        <p:nvSpPr>
-          <p:cNvPr id="3" name="Inhaltsplatzhalter 2">
-            <a:extLst>
-              <a:ext uri="{FF2B5EF4-FFF2-40B4-BE49-F238E27FC236}">
-                <a16:creationId xmlns:a16="http://schemas.microsoft.com/office/drawing/2014/main" id="{DC16FC26-A9C2-43DE-849D-CCD62E93A709}"/>
-              </a:ext>
-            </a:extLst>
-          </p:cNvPr>
-          <p:cNvSpPr>
-            <a:spLocks noGrp="1"/>
-          </p:cNvSpPr>
-          <p:nvPr>
-            <p:ph idx="1"/>
-          </p:nvPr>
-        </p:nvSpPr>
-        <p:spPr/>
-        <p:txBody>
-          <a:bodyPr/>
-          <a:lstStyle/>
-          <a:p>
-            <a:r>
-              <a:rPr lang="en-US" dirty="0"/>
-              <a:t>Select cutoffs for comparison of SNAP and BLOSUM scores</a:t>
-            </a:r>
-          </a:p>
-          <a:p>
-            <a:r>
-              <a:rPr lang="en-US" dirty="0"/>
-              <a:t>Cutoffs:</a:t>
-            </a:r>
-          </a:p>
-          <a:p>
-            <a:pPr marL="457200" lvl="1" indent="0">
-              <a:buNone/>
-            </a:pPr>
-            <a:r>
-              <a:rPr lang="en-US" dirty="0"/>
-              <a:t>-4: 90, -3: 80, -2:70, -1: 60, 0:50, 1:40, 2:30, 3:0</a:t>
-            </a:r>
-          </a:p>
-          <a:p>
-            <a:pPr marL="457200" lvl="1" indent="0">
-              <a:buNone/>
-            </a:pPr>
-            <a:r>
-              <a:rPr lang="en-US" dirty="0"/>
-              <a:t>BLOSUM diagonal can be ignored</a:t>
-            </a:r>
-          </a:p>
-          <a:p>
-            <a:r>
-              <a:rPr lang="en-US" dirty="0"/>
-              <a:t>Result:</a:t>
-            </a:r>
-          </a:p>
-          <a:p>
-            <a:pPr marL="0" indent="0">
-              <a:buNone/>
-            </a:pPr>
-            <a:r>
-              <a:rPr lang="en-US" dirty="0"/>
-              <a:t>	[-1, 1, -1, -1, -1, 1, 1, -1, -1, -1, -1, 1, 0, -1, 1, 1, 1, 1, -1, -1]</a:t>
-            </a:r>
-          </a:p>
-          <a:p>
-            <a:endParaRPr lang="en-US" dirty="0"/>
-          </a:p>
-          <a:p>
-            <a:endParaRPr lang="en-US" dirty="0"/>
-          </a:p>
-        </p:txBody>
-      </p:sp>
-      <p:sp>
-        <p:nvSpPr>
-          <p:cNvPr id="4" name="Foliennummernplatzhalter 3">
-            <a:extLst>
-              <a:ext uri="{FF2B5EF4-FFF2-40B4-BE49-F238E27FC236}">
-                <a16:creationId xmlns:a16="http://schemas.microsoft.com/office/drawing/2014/main" id="{6ECE49BF-46DA-4F97-8631-C0E5C689DF62}"/>
+              <a:rPr lang="de-DE" dirty="0"/>
+              <a:t>Hyperparameter: Grid </a:t>
+            </a:r>
+            <a:r>
+              <a:rPr lang="de-DE" dirty="0" err="1"/>
+              <a:t>search</a:t>
+            </a:r>
+            <a:endParaRPr lang="de-DE" dirty="0"/>
+          </a:p>
+        </p:txBody>
+      </p:sp>
+      <p:sp>
+        <p:nvSpPr>
+          <p:cNvPr id="5" name="Foliennummernplatzhalter 4">
+            <a:extLst>
+              <a:ext uri="{FF2B5EF4-FFF2-40B4-BE49-F238E27FC236}">
+                <a16:creationId xmlns:a16="http://schemas.microsoft.com/office/drawing/2014/main" id="{68D86FEF-829F-4780-8DAE-A88725F0C506}"/>
               </a:ext>
             </a:extLst>
           </p:cNvPr>
@@ -4317,16 +4311,51 @@
           <a:p>
             <a:fld id="{CCAAE293-A3DA-4FFC-871C-7F0F209F7CB2}" type="slidenum">
               <a:rPr lang="en-US" smtClean="0"/>
-              <a:t>2</a:t>
+              <a:t>11</a:t>
             </a:fld>
             <a:endParaRPr lang="en-US"/>
           </a:p>
         </p:txBody>
       </p:sp>
+      <p:pic>
+        <p:nvPicPr>
+          <p:cNvPr id="8" name="BestCutoff.png" descr="BestCutoff.png">
+            <a:extLst>
+              <a:ext uri="{FF2B5EF4-FFF2-40B4-BE49-F238E27FC236}">
+                <a16:creationId xmlns:a16="http://schemas.microsoft.com/office/drawing/2014/main" id="{A6F39EBE-441F-4084-B4B7-A4F3853478A0}"/>
+              </a:ext>
+            </a:extLst>
+          </p:cNvPr>
+          <p:cNvPicPr>
+            <a:picLocks noGrp="1" noChangeAspect="1"/>
+          </p:cNvPicPr>
+          <p:nvPr>
+            <p:ph idx="1"/>
+          </p:nvPr>
+        </p:nvPicPr>
+        <p:blipFill>
+          <a:blip r:embed="rId2"/>
+          <a:stretch>
+            <a:fillRect/>
+          </a:stretch>
+        </p:blipFill>
+        <p:spPr>
+          <a:xfrm>
+            <a:off x="3661685" y="1825625"/>
+            <a:ext cx="4868629" cy="4351338"/>
+          </a:xfrm>
+          <a:prstGeom prst="rect">
+            <a:avLst/>
+          </a:prstGeom>
+          <a:ln w="12700">
+            <a:miter lim="400000"/>
+          </a:ln>
+        </p:spPr>
+      </p:pic>
     </p:spTree>
     <p:extLst>
       <p:ext uri="{BB962C8B-B14F-4D97-AF65-F5344CB8AC3E}">
-        <p14:creationId xmlns:p14="http://schemas.microsoft.com/office/powerpoint/2010/main" val="2197693600"/>
+        <p14:creationId xmlns:p14="http://schemas.microsoft.com/office/powerpoint/2010/main" val="130984706"/>
       </p:ext>
     </p:extLst>
   </p:cSld>
@@ -4336,7 +4365,7 @@
 </p:sld>
 </file>
 
-<file path=ppt/slides/slide3.xml><?xml version="1.0" encoding="utf-8"?>
+<file path=ppt/slides/slide12.xml><?xml version="1.0" encoding="utf-8"?>
 <p:sld xmlns:a="http://schemas.openxmlformats.org/drawingml/2006/main" xmlns:r="http://schemas.openxmlformats.org/officeDocument/2006/relationships" xmlns:p="http://schemas.openxmlformats.org/presentationml/2006/main">
   <p:cSld>
     <p:spTree>
@@ -4358,7 +4387,7 @@
           <p:cNvPr id="2" name="Titel 1">
             <a:extLst>
               <a:ext uri="{FF2B5EF4-FFF2-40B4-BE49-F238E27FC236}">
-                <a16:creationId xmlns:a16="http://schemas.microsoft.com/office/drawing/2014/main" id="{9591C612-F88B-4465-8B3F-44166E3449EA}"/>
+                <a16:creationId xmlns:a16="http://schemas.microsoft.com/office/drawing/2014/main" id="{0DEB258A-EA2F-43B8-8736-0D3A0E6C84ED}"/>
               </a:ext>
             </a:extLst>
           </p:cNvPr>
@@ -4376,9 +4405,10 @@
           <a:p>
             <a:pPr algn="ctr"/>
             <a:r>
-              <a:rPr lang="en-US" dirty="0"/>
-              <a:t>Feature: raw scores</a:t>
-            </a:r>
+              <a:rPr lang="de-DE" dirty="0"/>
+              <a:t>Performance</a:t>
+            </a:r>
+            <a:endParaRPr lang="en-US" dirty="0"/>
           </a:p>
         </p:txBody>
       </p:sp>
@@ -4387,7 +4417,7 @@
           <p:cNvPr id="3" name="Inhaltsplatzhalter 2">
             <a:extLst>
               <a:ext uri="{FF2B5EF4-FFF2-40B4-BE49-F238E27FC236}">
-                <a16:creationId xmlns:a16="http://schemas.microsoft.com/office/drawing/2014/main" id="{5B3C0166-0693-45E2-8540-A3B3EA29A65E}"/>
+                <a16:creationId xmlns:a16="http://schemas.microsoft.com/office/drawing/2014/main" id="{2E9FA052-AC38-41D1-8D09-0E68D81B1A27}"/>
               </a:ext>
             </a:extLst>
           </p:cNvPr>
@@ -4403,44 +4433,8 @@
           <a:bodyPr/>
           <a:lstStyle/>
           <a:p>
-            <a:r>
-              <a:rPr lang="en-US" dirty="0"/>
-              <a:t>Problem: Too little Information to get meaningful results</a:t>
-            </a:r>
-          </a:p>
-          <a:p>
-            <a:r>
-              <a:rPr lang="en-US" dirty="0"/>
-              <a:t>Solution: input raw scores</a:t>
-            </a:r>
-          </a:p>
-          <a:p>
             <a:endParaRPr lang="en-US" dirty="0"/>
           </a:p>
-          <a:p>
-            <a:endParaRPr lang="en-US" dirty="0"/>
-          </a:p>
-          <a:p>
-            <a:pPr marL="0" indent="0">
-              <a:buNone/>
-            </a:pPr>
-            <a:r>
-              <a:rPr lang="en-US" dirty="0"/>
-              <a:t>[48, -1, 75, -1, 70, -2, 79, -3, 36, -1, 58, 0, 76, -2, 73, -3, 67, -2, 15, 1, </a:t>
-            </a:r>
-          </a:p>
-          <a:p>
-            <a:pPr marL="0" indent="0">
-              <a:buNone/>
-            </a:pPr>
-            <a:r>
-              <a:rPr lang="en-US" dirty="0"/>
-              <a:t>    24, 2, 76, -1, 0, 0, 30, 0, 79, -2, 65, -1, 62, -1, 68, -1, 51, -1, 27, 1]</a:t>
-            </a:r>
-          </a:p>
-          <a:p>
-            <a:endParaRPr lang="en-US" dirty="0"/>
-          </a:p>
         </p:txBody>
       </p:sp>
       <p:sp>
@@ -4448,7 +4442,7 @@
           <p:cNvPr id="4" name="Foliennummernplatzhalter 3">
             <a:extLst>
               <a:ext uri="{FF2B5EF4-FFF2-40B4-BE49-F238E27FC236}">
-                <a16:creationId xmlns:a16="http://schemas.microsoft.com/office/drawing/2014/main" id="{74F85361-5C17-48B6-93DB-1EDA5C35426C}"/>
+                <a16:creationId xmlns:a16="http://schemas.microsoft.com/office/drawing/2014/main" id="{8C263FC9-5E80-48A3-9AF3-EA7E37B395B4}"/>
               </a:ext>
             </a:extLst>
           </p:cNvPr>
@@ -4466,7 +4460,7 @@
           <a:p>
             <a:fld id="{CCAAE293-A3DA-4FFC-871C-7F0F209F7CB2}" type="slidenum">
               <a:rPr lang="en-US" smtClean="0"/>
-              <a:t>3</a:t>
+              <a:t>12</a:t>
             </a:fld>
             <a:endParaRPr lang="en-US"/>
           </a:p>
@@ -4475,7 +4469,7 @@
     </p:spTree>
     <p:extLst>
       <p:ext uri="{BB962C8B-B14F-4D97-AF65-F5344CB8AC3E}">
-        <p14:creationId xmlns:p14="http://schemas.microsoft.com/office/powerpoint/2010/main" val="67827862"/>
+        <p14:creationId xmlns:p14="http://schemas.microsoft.com/office/powerpoint/2010/main" val="2640396146"/>
       </p:ext>
     </p:extLst>
   </p:cSld>
@@ -4485,7 +4479,7 @@
 </p:sld>
 </file>
 
-<file path=ppt/slides/slide4.xml><?xml version="1.0" encoding="utf-8"?>
+<file path=ppt/slides/slide13.xml><?xml version="1.0" encoding="utf-8"?>
 <p:sld xmlns:a="http://schemas.openxmlformats.org/drawingml/2006/main" xmlns:r="http://schemas.openxmlformats.org/officeDocument/2006/relationships" xmlns:p="http://schemas.openxmlformats.org/presentationml/2006/main">
   <p:cSld>
     <p:spTree>
@@ -4504,119 +4498,10 @@
       </p:grpSpPr>
       <p:sp>
         <p:nvSpPr>
-          <p:cNvPr id="2" name="Titel 1">
-            <a:extLst>
-              <a:ext uri="{FF2B5EF4-FFF2-40B4-BE49-F238E27FC236}">
-                <a16:creationId xmlns:a16="http://schemas.microsoft.com/office/drawing/2014/main" id="{60F4F9F7-1F09-4688-9724-856BD95194F1}"/>
-              </a:ext>
-            </a:extLst>
-          </p:cNvPr>
-          <p:cNvSpPr>
-            <a:spLocks noGrp="1"/>
-          </p:cNvSpPr>
-          <p:nvPr>
-            <p:ph type="title"/>
-          </p:nvPr>
-        </p:nvSpPr>
-        <p:spPr/>
-        <p:txBody>
-          <a:bodyPr/>
-          <a:lstStyle/>
-          <a:p>
-            <a:pPr algn="ctr"/>
-            <a:r>
-              <a:rPr lang="en-US" dirty="0"/>
-              <a:t>Feature</a:t>
-            </a:r>
-            <a:r>
-              <a:rPr lang="de-DE" dirty="0"/>
-              <a:t>: </a:t>
-            </a:r>
-            <a:r>
-              <a:rPr lang="de-DE" dirty="0" err="1"/>
-              <a:t>scaled</a:t>
-            </a:r>
-            <a:r>
-              <a:rPr lang="de-DE" dirty="0"/>
-              <a:t> Values</a:t>
-            </a:r>
-            <a:endParaRPr lang="en-US" dirty="0"/>
-          </a:p>
-        </p:txBody>
-      </p:sp>
-      <p:sp>
-        <p:nvSpPr>
-          <p:cNvPr id="3" name="Inhaltsplatzhalter 2">
-            <a:extLst>
-              <a:ext uri="{FF2B5EF4-FFF2-40B4-BE49-F238E27FC236}">
-                <a16:creationId xmlns:a16="http://schemas.microsoft.com/office/drawing/2014/main" id="{DABFB4CD-55BA-4B9D-9388-099CEA4FC0CC}"/>
-              </a:ext>
-            </a:extLst>
-          </p:cNvPr>
-          <p:cNvSpPr>
-            <a:spLocks noGrp="1"/>
-          </p:cNvSpPr>
-          <p:nvPr>
-            <p:ph idx="1"/>
-          </p:nvPr>
-        </p:nvSpPr>
-        <p:spPr/>
-        <p:txBody>
-          <a:bodyPr/>
-          <a:lstStyle/>
-          <a:p>
-            <a:r>
-              <a:rPr lang="en-US" dirty="0"/>
-              <a:t>BLOSUM scores are very small compared to SNAP scores</a:t>
-            </a:r>
-          </a:p>
-          <a:p>
-            <a:pPr marL="0" indent="0">
-              <a:buNone/>
-            </a:pPr>
-            <a:endParaRPr lang="en-US" dirty="0"/>
-          </a:p>
-          <a:p>
-            <a:pPr marL="0" indent="0">
-              <a:buNone/>
-            </a:pPr>
-            <a:endParaRPr lang="en-US" dirty="0"/>
-          </a:p>
-          <a:p>
-            <a:pPr marL="0" indent="0">
-              <a:buNone/>
-            </a:pPr>
-            <a:r>
-              <a:rPr lang="en-US" dirty="0"/>
-              <a:t>[48, -25, 75, -25, 70, -50, 79, -75, 36, -25, 58, 0, 76, -50, 73, -75, 67, </a:t>
-            </a:r>
-          </a:p>
-          <a:p>
-            <a:pPr marL="0" indent="0">
-              <a:buNone/>
-            </a:pPr>
-            <a:r>
-              <a:rPr lang="en-US" dirty="0"/>
-              <a:t>   -50, 15, 33, 24, 66, 76, -25, 0, 0, 30, 0, 79, -50, 65, -25, 62, -25, 68, </a:t>
-            </a:r>
-          </a:p>
-          <a:p>
-            <a:pPr marL="0" indent="0">
-              <a:buNone/>
-            </a:pPr>
-            <a:r>
-              <a:rPr lang="en-US" dirty="0"/>
-              <a:t>   -25, 51, -25, 27, 33]</a:t>
-            </a:r>
-          </a:p>
-        </p:txBody>
-      </p:sp>
-      <p:sp>
-        <p:nvSpPr>
           <p:cNvPr id="4" name="Foliennummernplatzhalter 3">
             <a:extLst>
               <a:ext uri="{FF2B5EF4-FFF2-40B4-BE49-F238E27FC236}">
-                <a16:creationId xmlns:a16="http://schemas.microsoft.com/office/drawing/2014/main" id="{CBB3139C-6890-4543-90A0-FAE3AA3EE102}"/>
+                <a16:creationId xmlns:a16="http://schemas.microsoft.com/office/drawing/2014/main" id="{768EA576-5302-4115-88A4-24E38051F977}"/>
               </a:ext>
             </a:extLst>
           </p:cNvPr>
@@ -4634,16 +4519,120 @@
           <a:p>
             <a:fld id="{CCAAE293-A3DA-4FFC-871C-7F0F209F7CB2}" type="slidenum">
               <a:rPr lang="en-US" smtClean="0"/>
-              <a:t>4</a:t>
+              <a:t>13</a:t>
             </a:fld>
             <a:endParaRPr lang="en-US"/>
           </a:p>
         </p:txBody>
       </p:sp>
+      <p:sp>
+        <p:nvSpPr>
+          <p:cNvPr id="5" name="Titel 1">
+            <a:extLst>
+              <a:ext uri="{FF2B5EF4-FFF2-40B4-BE49-F238E27FC236}">
+                <a16:creationId xmlns:a16="http://schemas.microsoft.com/office/drawing/2014/main" id="{5D5ECCAA-D705-44AC-9F3D-4C3336649971}"/>
+              </a:ext>
+            </a:extLst>
+          </p:cNvPr>
+          <p:cNvSpPr txBox="1">
+            <a:spLocks/>
+          </p:cNvSpPr>
+          <p:nvPr/>
+        </p:nvSpPr>
+        <p:spPr>
+          <a:xfrm>
+            <a:off x="838200" y="187325"/>
+            <a:ext cx="10515600" cy="1325563"/>
+          </a:xfrm>
+          <a:prstGeom prst="rect">
+            <a:avLst/>
+          </a:prstGeom>
+        </p:spPr>
+        <p:txBody>
+          <a:bodyPr vert="horz" lIns="91440" tIns="45720" rIns="91440" bIns="45720" rtlCol="0" anchor="ctr">
+            <a:normAutofit/>
+          </a:bodyPr>
+          <a:lstStyle>
+            <a:lvl1pPr algn="ctr" defTabSz="914400" rtl="0" eaLnBrk="1" latinLnBrk="0" hangingPunct="1">
+              <a:lnSpc>
+                <a:spcPct val="90000"/>
+              </a:lnSpc>
+              <a:spcBef>
+                <a:spcPct val="0"/>
+              </a:spcBef>
+              <a:buNone/>
+              <a:defRPr sz="4400" kern="1200">
+                <a:solidFill>
+                  <a:schemeClr val="tx1"/>
+                </a:solidFill>
+                <a:latin typeface="+mj-lt"/>
+                <a:ea typeface="+mj-ea"/>
+                <a:cs typeface="+mj-cs"/>
+              </a:defRPr>
+            </a:lvl1pPr>
+          </a:lstStyle>
+          <a:p>
+            <a:r>
+              <a:rPr lang="de-DE" dirty="0" err="1"/>
+              <a:t>Testing</a:t>
+            </a:r>
+            <a:r>
+              <a:rPr lang="de-DE" dirty="0"/>
+              <a:t> </a:t>
+            </a:r>
+            <a:r>
+              <a:rPr lang="de-DE" dirty="0" err="1"/>
+              <a:t>for</a:t>
+            </a:r>
+            <a:r>
+              <a:rPr lang="de-DE" dirty="0"/>
+              <a:t> </a:t>
+            </a:r>
+            <a:r>
+              <a:rPr lang="de-DE" dirty="0" err="1"/>
+              <a:t>Overfitting</a:t>
+            </a:r>
+            <a:endParaRPr lang="de-DE" dirty="0"/>
+          </a:p>
+        </p:txBody>
+      </p:sp>
+      <p:pic>
+        <p:nvPicPr>
+          <p:cNvPr id="6" name="EpochMCC.png" descr="EpochMCC.png">
+            <a:extLst>
+              <a:ext uri="{FF2B5EF4-FFF2-40B4-BE49-F238E27FC236}">
+                <a16:creationId xmlns:a16="http://schemas.microsoft.com/office/drawing/2014/main" id="{E150C75D-108D-4EBC-9AC1-443D4F3AFBA8}"/>
+              </a:ext>
+            </a:extLst>
+          </p:cNvPr>
+          <p:cNvPicPr>
+            <a:picLocks noChangeAspect="1"/>
+          </p:cNvPicPr>
+          <p:nvPr/>
+        </p:nvPicPr>
+        <p:blipFill>
+          <a:blip r:embed="rId2"/>
+          <a:stretch>
+            <a:fillRect/>
+          </a:stretch>
+        </p:blipFill>
+        <p:spPr>
+          <a:xfrm>
+            <a:off x="3395082" y="1534089"/>
+            <a:ext cx="5401836" cy="4825640"/>
+          </a:xfrm>
+          <a:prstGeom prst="rect">
+            <a:avLst/>
+          </a:prstGeom>
+          <a:ln w="12700">
+            <a:miter lim="400000"/>
+          </a:ln>
+        </p:spPr>
+      </p:pic>
     </p:spTree>
     <p:extLst>
       <p:ext uri="{BB962C8B-B14F-4D97-AF65-F5344CB8AC3E}">
-        <p14:creationId xmlns:p14="http://schemas.microsoft.com/office/powerpoint/2010/main" val="2783528183"/>
+        <p14:creationId xmlns:p14="http://schemas.microsoft.com/office/powerpoint/2010/main" val="3442862283"/>
       </p:ext>
     </p:extLst>
   </p:cSld>
@@ -4653,7 +4642,7 @@
 </p:sld>
 </file>
 
-<file path=ppt/slides/slide5.xml><?xml version="1.0" encoding="utf-8"?>
+<file path=ppt/slides/slide14.xml><?xml version="1.0" encoding="utf-8"?>
 <p:sld xmlns:a="http://schemas.openxmlformats.org/drawingml/2006/main" xmlns:r="http://schemas.openxmlformats.org/officeDocument/2006/relationships" xmlns:p="http://schemas.openxmlformats.org/presentationml/2006/main">
   <p:cSld>
     <p:spTree>
@@ -4675,658 +4664,6 @@
           <p:cNvPr id="2" name="Titel 1">
             <a:extLst>
               <a:ext uri="{FF2B5EF4-FFF2-40B4-BE49-F238E27FC236}">
-                <a16:creationId xmlns:a16="http://schemas.microsoft.com/office/drawing/2014/main" id="{6019DB3D-05C1-487C-84EB-B488DE6B8C90}"/>
-              </a:ext>
-            </a:extLst>
-          </p:cNvPr>
-          <p:cNvSpPr>
-            <a:spLocks noGrp="1"/>
-          </p:cNvSpPr>
-          <p:nvPr>
-            <p:ph type="title"/>
-          </p:nvPr>
-        </p:nvSpPr>
-        <p:spPr/>
-        <p:txBody>
-          <a:bodyPr/>
-          <a:lstStyle/>
-          <a:p>
-            <a:pPr algn="ctr"/>
-            <a:r>
-              <a:rPr lang="de-DE" dirty="0"/>
-              <a:t>Distribution </a:t>
-            </a:r>
-            <a:r>
-              <a:rPr lang="de-DE" dirty="0" err="1"/>
-              <a:t>of</a:t>
-            </a:r>
-            <a:r>
-              <a:rPr lang="de-DE" dirty="0"/>
-              <a:t> </a:t>
-            </a:r>
-            <a:r>
-              <a:rPr lang="de-DE" dirty="0" err="1"/>
-              <a:t>scores</a:t>
-            </a:r>
-            <a:endParaRPr lang="en-US" dirty="0"/>
-          </a:p>
-        </p:txBody>
-      </p:sp>
-      <p:sp>
-        <p:nvSpPr>
-          <p:cNvPr id="3" name="Inhaltsplatzhalter 2">
-            <a:extLst>
-              <a:ext uri="{FF2B5EF4-FFF2-40B4-BE49-F238E27FC236}">
-                <a16:creationId xmlns:a16="http://schemas.microsoft.com/office/drawing/2014/main" id="{CD0770F5-D525-437C-ACB7-DD8EC82346EE}"/>
-              </a:ext>
-            </a:extLst>
-          </p:cNvPr>
-          <p:cNvSpPr>
-            <a:spLocks noGrp="1"/>
-          </p:cNvSpPr>
-          <p:nvPr>
-            <p:ph sz="half" idx="1"/>
-          </p:nvPr>
-        </p:nvSpPr>
-        <p:spPr/>
-        <p:txBody>
-          <a:bodyPr/>
-          <a:lstStyle/>
-          <a:p>
-            <a:endParaRPr lang="en-US" dirty="0"/>
-          </a:p>
-        </p:txBody>
-      </p:sp>
-      <p:sp>
-        <p:nvSpPr>
-          <p:cNvPr id="12" name="Inhaltsplatzhalter 11">
-            <a:extLst>
-              <a:ext uri="{FF2B5EF4-FFF2-40B4-BE49-F238E27FC236}">
-                <a16:creationId xmlns:a16="http://schemas.microsoft.com/office/drawing/2014/main" id="{64AAC6DE-3E9E-434C-A568-C6C7E8491525}"/>
-              </a:ext>
-            </a:extLst>
-          </p:cNvPr>
-          <p:cNvSpPr>
-            <a:spLocks noGrp="1"/>
-          </p:cNvSpPr>
-          <p:nvPr>
-            <p:ph sz="half" idx="2"/>
-          </p:nvPr>
-        </p:nvSpPr>
-        <p:spPr/>
-        <p:txBody>
-          <a:bodyPr/>
-          <a:lstStyle/>
-          <a:p>
-            <a:endParaRPr lang="en-US" dirty="0"/>
-          </a:p>
-        </p:txBody>
-      </p:sp>
-      <p:sp>
-        <p:nvSpPr>
-          <p:cNvPr id="13" name="Foliennummernplatzhalter 12">
-            <a:extLst>
-              <a:ext uri="{FF2B5EF4-FFF2-40B4-BE49-F238E27FC236}">
-                <a16:creationId xmlns:a16="http://schemas.microsoft.com/office/drawing/2014/main" id="{9AB9A42C-1858-4BAA-ACA3-234429D562F4}"/>
-              </a:ext>
-            </a:extLst>
-          </p:cNvPr>
-          <p:cNvSpPr>
-            <a:spLocks noGrp="1"/>
-          </p:cNvSpPr>
-          <p:nvPr>
-            <p:ph type="sldNum" sz="quarter" idx="12"/>
-          </p:nvPr>
-        </p:nvSpPr>
-        <p:spPr/>
-        <p:txBody>
-          <a:bodyPr/>
-          <a:lstStyle/>
-          <a:p>
-            <a:fld id="{CCAAE293-A3DA-4FFC-871C-7F0F209F7CB2}" type="slidenum">
-              <a:rPr lang="en-US" smtClean="0"/>
-              <a:t>5</a:t>
-            </a:fld>
-            <a:endParaRPr lang="en-US"/>
-          </a:p>
-        </p:txBody>
-      </p:sp>
-    </p:spTree>
-    <p:extLst>
-      <p:ext uri="{BB962C8B-B14F-4D97-AF65-F5344CB8AC3E}">
-        <p14:creationId xmlns:p14="http://schemas.microsoft.com/office/powerpoint/2010/main" val="498417232"/>
-      </p:ext>
-    </p:extLst>
-  </p:cSld>
-  <p:clrMapOvr>
-    <a:masterClrMapping/>
-  </p:clrMapOvr>
-</p:sld>
-</file>
-
-<file path=ppt/slides/slide6.xml><?xml version="1.0" encoding="utf-8"?>
-<p:sld xmlns:a="http://schemas.openxmlformats.org/drawingml/2006/main" xmlns:r="http://schemas.openxmlformats.org/officeDocument/2006/relationships" xmlns:p="http://schemas.openxmlformats.org/presentationml/2006/main">
-  <p:cSld>
-    <p:spTree>
-      <p:nvGrpSpPr>
-        <p:cNvPr id="1" name=""/>
-        <p:cNvGrpSpPr/>
-        <p:nvPr/>
-      </p:nvGrpSpPr>
-      <p:grpSpPr>
-        <a:xfrm>
-          <a:off x="0" y="0"/>
-          <a:ext cx="0" cy="0"/>
-          <a:chOff x="0" y="0"/>
-          <a:chExt cx="0" cy="0"/>
-        </a:xfrm>
-      </p:grpSpPr>
-      <p:sp>
-        <p:nvSpPr>
-          <p:cNvPr id="6" name="Titel 5">
-            <a:extLst>
-              <a:ext uri="{FF2B5EF4-FFF2-40B4-BE49-F238E27FC236}">
-                <a16:creationId xmlns:a16="http://schemas.microsoft.com/office/drawing/2014/main" id="{C2F4D9AB-ECE1-4815-911C-FC8E234DA8C2}"/>
-              </a:ext>
-            </a:extLst>
-          </p:cNvPr>
-          <p:cNvSpPr>
-            <a:spLocks noGrp="1"/>
-          </p:cNvSpPr>
-          <p:nvPr>
-            <p:ph type="title"/>
-          </p:nvPr>
-        </p:nvSpPr>
-        <p:spPr/>
-        <p:txBody>
-          <a:bodyPr/>
-          <a:lstStyle/>
-          <a:p>
-            <a:pPr algn="ctr"/>
-            <a:r>
-              <a:rPr lang="de-DE" dirty="0" err="1"/>
-              <a:t>Algorithm</a:t>
-            </a:r>
-            <a:endParaRPr lang="en-US" dirty="0"/>
-          </a:p>
-        </p:txBody>
-      </p:sp>
-      <p:sp>
-        <p:nvSpPr>
-          <p:cNvPr id="7" name="Inhaltsplatzhalter 6">
-            <a:extLst>
-              <a:ext uri="{FF2B5EF4-FFF2-40B4-BE49-F238E27FC236}">
-                <a16:creationId xmlns:a16="http://schemas.microsoft.com/office/drawing/2014/main" id="{9C5E56EF-BBBF-4283-AADE-6481E86CC294}"/>
-              </a:ext>
-            </a:extLst>
-          </p:cNvPr>
-          <p:cNvSpPr>
-            <a:spLocks noGrp="1"/>
-          </p:cNvSpPr>
-          <p:nvPr>
-            <p:ph idx="1"/>
-          </p:nvPr>
-        </p:nvSpPr>
-        <p:spPr/>
-        <p:txBody>
-          <a:bodyPr/>
-          <a:lstStyle/>
-          <a:p>
-            <a:r>
-              <a:rPr lang="de-DE" dirty="0"/>
-              <a:t>Single </a:t>
-            </a:r>
-            <a:r>
-              <a:rPr lang="de-DE" dirty="0" err="1"/>
-              <a:t>layer</a:t>
-            </a:r>
-            <a:r>
-              <a:rPr lang="de-DE" dirty="0"/>
-              <a:t> ANN</a:t>
-            </a:r>
-          </a:p>
-          <a:p>
-            <a:pPr marL="0" indent="0">
-              <a:buNone/>
-            </a:pPr>
-            <a:endParaRPr lang="de-DE" dirty="0"/>
-          </a:p>
-          <a:p>
-            <a:r>
-              <a:rPr lang="de-DE" dirty="0"/>
-              <a:t>40 </a:t>
-            </a:r>
-            <a:r>
-              <a:rPr lang="de-DE" dirty="0" err="1"/>
-              <a:t>input</a:t>
-            </a:r>
-            <a:r>
-              <a:rPr lang="de-DE" dirty="0"/>
-              <a:t> </a:t>
-            </a:r>
-            <a:r>
-              <a:rPr lang="de-DE" dirty="0" err="1"/>
-              <a:t>units</a:t>
-            </a:r>
-            <a:r>
-              <a:rPr lang="de-DE" dirty="0"/>
-              <a:t>, 1 </a:t>
-            </a:r>
-            <a:r>
-              <a:rPr lang="de-DE" dirty="0" err="1"/>
-              <a:t>output</a:t>
-            </a:r>
-            <a:r>
-              <a:rPr lang="de-DE" dirty="0"/>
-              <a:t> </a:t>
-            </a:r>
-            <a:r>
-              <a:rPr lang="de-DE" dirty="0" err="1"/>
-              <a:t>unit</a:t>
-            </a:r>
-            <a:endParaRPr lang="de-DE" dirty="0"/>
-          </a:p>
-          <a:p>
-            <a:r>
-              <a:rPr lang="de-DE" dirty="0"/>
-              <a:t>200 </a:t>
-            </a:r>
-            <a:r>
-              <a:rPr lang="de-DE" dirty="0" err="1"/>
-              <a:t>hidden</a:t>
-            </a:r>
-            <a:r>
-              <a:rPr lang="de-DE" dirty="0"/>
-              <a:t> </a:t>
-            </a:r>
-            <a:r>
-              <a:rPr lang="de-DE" dirty="0" err="1"/>
-              <a:t>units</a:t>
-            </a:r>
-            <a:endParaRPr lang="de-DE" dirty="0"/>
-          </a:p>
-          <a:p>
-            <a:endParaRPr lang="de-DE" dirty="0"/>
-          </a:p>
-          <a:p>
-            <a:r>
-              <a:rPr lang="de-DE" dirty="0" err="1"/>
-              <a:t>Weigthed</a:t>
-            </a:r>
-            <a:r>
-              <a:rPr lang="de-DE" dirty="0"/>
-              <a:t> </a:t>
-            </a:r>
-            <a:r>
-              <a:rPr lang="de-DE" dirty="0" err="1"/>
-              <a:t>loss</a:t>
-            </a:r>
-            <a:endParaRPr lang="de-DE" dirty="0"/>
-          </a:p>
-        </p:txBody>
-      </p:sp>
-      <p:sp>
-        <p:nvSpPr>
-          <p:cNvPr id="5" name="Foliennummernplatzhalter 4">
-            <a:extLst>
-              <a:ext uri="{FF2B5EF4-FFF2-40B4-BE49-F238E27FC236}">
-                <a16:creationId xmlns:a16="http://schemas.microsoft.com/office/drawing/2014/main" id="{C48CAD59-3574-40C3-9200-27CBA16B4671}"/>
-              </a:ext>
-            </a:extLst>
-          </p:cNvPr>
-          <p:cNvSpPr>
-            <a:spLocks noGrp="1"/>
-          </p:cNvSpPr>
-          <p:nvPr>
-            <p:ph type="sldNum" sz="quarter" idx="12"/>
-          </p:nvPr>
-        </p:nvSpPr>
-        <p:spPr/>
-        <p:txBody>
-          <a:bodyPr/>
-          <a:lstStyle/>
-          <a:p>
-            <a:fld id="{CCAAE293-A3DA-4FFC-871C-7F0F209F7CB2}" type="slidenum">
-              <a:rPr lang="en-US" smtClean="0"/>
-              <a:t>6</a:t>
-            </a:fld>
-            <a:endParaRPr lang="en-US"/>
-          </a:p>
-        </p:txBody>
-      </p:sp>
-    </p:spTree>
-    <p:extLst>
-      <p:ext uri="{BB962C8B-B14F-4D97-AF65-F5344CB8AC3E}">
-        <p14:creationId xmlns:p14="http://schemas.microsoft.com/office/powerpoint/2010/main" val="396671851"/>
-      </p:ext>
-    </p:extLst>
-  </p:cSld>
-  <p:clrMapOvr>
-    <a:masterClrMapping/>
-  </p:clrMapOvr>
-</p:sld>
-</file>
-
-<file path=ppt/slides/slide7.xml><?xml version="1.0" encoding="utf-8"?>
-<p:sld xmlns:a="http://schemas.openxmlformats.org/drawingml/2006/main" xmlns:r="http://schemas.openxmlformats.org/officeDocument/2006/relationships" xmlns:p="http://schemas.openxmlformats.org/presentationml/2006/main">
-  <p:cSld>
-    <p:spTree>
-      <p:nvGrpSpPr>
-        <p:cNvPr id="1" name=""/>
-        <p:cNvGrpSpPr/>
-        <p:nvPr/>
-      </p:nvGrpSpPr>
-      <p:grpSpPr>
-        <a:xfrm>
-          <a:off x="0" y="0"/>
-          <a:ext cx="0" cy="0"/>
-          <a:chOff x="0" y="0"/>
-          <a:chExt cx="0" cy="0"/>
-        </a:xfrm>
-      </p:grpSpPr>
-      <p:sp>
-        <p:nvSpPr>
-          <p:cNvPr id="2" name="Titel 1">
-            <a:extLst>
-              <a:ext uri="{FF2B5EF4-FFF2-40B4-BE49-F238E27FC236}">
-                <a16:creationId xmlns:a16="http://schemas.microsoft.com/office/drawing/2014/main" id="{90DA7BD1-7036-4062-A3E7-109EE85AC270}"/>
-              </a:ext>
-            </a:extLst>
-          </p:cNvPr>
-          <p:cNvSpPr>
-            <a:spLocks noGrp="1"/>
-          </p:cNvSpPr>
-          <p:nvPr>
-            <p:ph type="title"/>
-          </p:nvPr>
-        </p:nvSpPr>
-        <p:spPr/>
-        <p:txBody>
-          <a:bodyPr/>
-          <a:lstStyle/>
-          <a:p>
-            <a:pPr algn="ctr"/>
-            <a:r>
-              <a:rPr lang="de-DE" dirty="0"/>
-              <a:t>Hyperparameters</a:t>
-            </a:r>
-            <a:endParaRPr lang="en-US" dirty="0"/>
-          </a:p>
-        </p:txBody>
-      </p:sp>
-      <p:sp>
-        <p:nvSpPr>
-          <p:cNvPr id="3" name="Inhaltsplatzhalter 2">
-            <a:extLst>
-              <a:ext uri="{FF2B5EF4-FFF2-40B4-BE49-F238E27FC236}">
-                <a16:creationId xmlns:a16="http://schemas.microsoft.com/office/drawing/2014/main" id="{08A62452-8D0B-487B-BF6E-8C680AB179B6}"/>
-              </a:ext>
-            </a:extLst>
-          </p:cNvPr>
-          <p:cNvSpPr>
-            <a:spLocks noGrp="1"/>
-          </p:cNvSpPr>
-          <p:nvPr>
-            <p:ph idx="1"/>
-          </p:nvPr>
-        </p:nvSpPr>
-        <p:spPr/>
-        <p:txBody>
-          <a:bodyPr>
-            <a:normAutofit lnSpcReduction="10000"/>
-          </a:bodyPr>
-          <a:lstStyle/>
-          <a:p>
-            <a:r>
-              <a:rPr lang="de-DE" dirty="0" err="1"/>
-              <a:t>Weigths</a:t>
-            </a:r>
-            <a:r>
-              <a:rPr lang="de-DE" dirty="0"/>
-              <a:t>: Binding 0.6; Non-</a:t>
-            </a:r>
-            <a:r>
-              <a:rPr lang="de-DE" dirty="0" err="1"/>
-              <a:t>binding</a:t>
-            </a:r>
-            <a:r>
-              <a:rPr lang="de-DE" dirty="0"/>
-              <a:t> 0.4</a:t>
-            </a:r>
-          </a:p>
-          <a:p>
-            <a:endParaRPr lang="de-DE" dirty="0"/>
-          </a:p>
-          <a:p>
-            <a:r>
-              <a:rPr lang="de-DE" dirty="0"/>
-              <a:t>Learning rate:</a:t>
-            </a:r>
-          </a:p>
-          <a:p>
-            <a:endParaRPr lang="de-DE" dirty="0"/>
-          </a:p>
-          <a:p>
-            <a:r>
-              <a:rPr lang="de-DE" dirty="0" err="1"/>
-              <a:t>Prediction</a:t>
-            </a:r>
-            <a:r>
-              <a:rPr lang="de-DE" dirty="0"/>
-              <a:t> </a:t>
-            </a:r>
-            <a:r>
-              <a:rPr lang="de-DE" dirty="0" err="1"/>
-              <a:t>Cutoff</a:t>
-            </a:r>
-            <a:r>
-              <a:rPr lang="de-DE" dirty="0"/>
-              <a:t>: 0.4</a:t>
-            </a:r>
-          </a:p>
-          <a:p>
-            <a:endParaRPr lang="de-DE" dirty="0"/>
-          </a:p>
-          <a:p>
-            <a:r>
-              <a:rPr lang="de-DE" dirty="0"/>
-              <a:t>Momentum</a:t>
-            </a:r>
-          </a:p>
-          <a:p>
-            <a:endParaRPr lang="de-DE" dirty="0"/>
-          </a:p>
-          <a:p>
-            <a:r>
-              <a:rPr lang="de-DE" dirty="0" err="1"/>
-              <a:t>Epochs</a:t>
-            </a:r>
-            <a:r>
-              <a:rPr lang="de-DE" dirty="0"/>
-              <a:t>: 500</a:t>
-            </a:r>
-            <a:endParaRPr lang="en-US" dirty="0"/>
-          </a:p>
-        </p:txBody>
-      </p:sp>
-      <p:sp>
-        <p:nvSpPr>
-          <p:cNvPr id="4" name="Foliennummernplatzhalter 3">
-            <a:extLst>
-              <a:ext uri="{FF2B5EF4-FFF2-40B4-BE49-F238E27FC236}">
-                <a16:creationId xmlns:a16="http://schemas.microsoft.com/office/drawing/2014/main" id="{5BC1D8A0-0EDC-4692-8350-8E5C893B0A2A}"/>
-              </a:ext>
-            </a:extLst>
-          </p:cNvPr>
-          <p:cNvSpPr>
-            <a:spLocks noGrp="1"/>
-          </p:cNvSpPr>
-          <p:nvPr>
-            <p:ph type="sldNum" sz="quarter" idx="12"/>
-          </p:nvPr>
-        </p:nvSpPr>
-        <p:spPr/>
-        <p:txBody>
-          <a:bodyPr/>
-          <a:lstStyle/>
-          <a:p>
-            <a:fld id="{CCAAE293-A3DA-4FFC-871C-7F0F209F7CB2}" type="slidenum">
-              <a:rPr lang="en-US" smtClean="0"/>
-              <a:t>7</a:t>
-            </a:fld>
-            <a:endParaRPr lang="en-US"/>
-          </a:p>
-        </p:txBody>
-      </p:sp>
-    </p:spTree>
-    <p:extLst>
-      <p:ext uri="{BB962C8B-B14F-4D97-AF65-F5344CB8AC3E}">
-        <p14:creationId xmlns:p14="http://schemas.microsoft.com/office/powerpoint/2010/main" val="3829208825"/>
-      </p:ext>
-    </p:extLst>
-  </p:cSld>
-  <p:clrMapOvr>
-    <a:masterClrMapping/>
-  </p:clrMapOvr>
-</p:sld>
-</file>
-
-<file path=ppt/slides/slide8.xml><?xml version="1.0" encoding="utf-8"?>
-<p:sld xmlns:a="http://schemas.openxmlformats.org/drawingml/2006/main" xmlns:r="http://schemas.openxmlformats.org/officeDocument/2006/relationships" xmlns:p="http://schemas.openxmlformats.org/presentationml/2006/main">
-  <p:cSld>
-    <p:spTree>
-      <p:nvGrpSpPr>
-        <p:cNvPr id="1" name=""/>
-        <p:cNvGrpSpPr/>
-        <p:nvPr/>
-      </p:nvGrpSpPr>
-      <p:grpSpPr>
-        <a:xfrm>
-          <a:off x="0" y="0"/>
-          <a:ext cx="0" cy="0"/>
-          <a:chOff x="0" y="0"/>
-          <a:chExt cx="0" cy="0"/>
-        </a:xfrm>
-      </p:grpSpPr>
-      <p:sp>
-        <p:nvSpPr>
-          <p:cNvPr id="2" name="Titel 1">
-            <a:extLst>
-              <a:ext uri="{FF2B5EF4-FFF2-40B4-BE49-F238E27FC236}">
-                <a16:creationId xmlns:a16="http://schemas.microsoft.com/office/drawing/2014/main" id="{0DEB258A-EA2F-43B8-8736-0D3A0E6C84ED}"/>
-              </a:ext>
-            </a:extLst>
-          </p:cNvPr>
-          <p:cNvSpPr>
-            <a:spLocks noGrp="1"/>
-          </p:cNvSpPr>
-          <p:nvPr>
-            <p:ph type="title"/>
-          </p:nvPr>
-        </p:nvSpPr>
-        <p:spPr/>
-        <p:txBody>
-          <a:bodyPr/>
-          <a:lstStyle/>
-          <a:p>
-            <a:pPr algn="ctr"/>
-            <a:r>
-              <a:rPr lang="de-DE" dirty="0"/>
-              <a:t>Performance</a:t>
-            </a:r>
-            <a:endParaRPr lang="en-US" dirty="0"/>
-          </a:p>
-        </p:txBody>
-      </p:sp>
-      <p:sp>
-        <p:nvSpPr>
-          <p:cNvPr id="3" name="Inhaltsplatzhalter 2">
-            <a:extLst>
-              <a:ext uri="{FF2B5EF4-FFF2-40B4-BE49-F238E27FC236}">
-                <a16:creationId xmlns:a16="http://schemas.microsoft.com/office/drawing/2014/main" id="{2E9FA052-AC38-41D1-8D09-0E68D81B1A27}"/>
-              </a:ext>
-            </a:extLst>
-          </p:cNvPr>
-          <p:cNvSpPr>
-            <a:spLocks noGrp="1"/>
-          </p:cNvSpPr>
-          <p:nvPr>
-            <p:ph idx="1"/>
-          </p:nvPr>
-        </p:nvSpPr>
-        <p:spPr/>
-        <p:txBody>
-          <a:bodyPr/>
-          <a:lstStyle/>
-          <a:p>
-            <a:endParaRPr lang="en-US" dirty="0"/>
-          </a:p>
-        </p:txBody>
-      </p:sp>
-      <p:sp>
-        <p:nvSpPr>
-          <p:cNvPr id="4" name="Foliennummernplatzhalter 3">
-            <a:extLst>
-              <a:ext uri="{FF2B5EF4-FFF2-40B4-BE49-F238E27FC236}">
-                <a16:creationId xmlns:a16="http://schemas.microsoft.com/office/drawing/2014/main" id="{8C263FC9-5E80-48A3-9AF3-EA7E37B395B4}"/>
-              </a:ext>
-            </a:extLst>
-          </p:cNvPr>
-          <p:cNvSpPr>
-            <a:spLocks noGrp="1"/>
-          </p:cNvSpPr>
-          <p:nvPr>
-            <p:ph type="sldNum" sz="quarter" idx="12"/>
-          </p:nvPr>
-        </p:nvSpPr>
-        <p:spPr/>
-        <p:txBody>
-          <a:bodyPr/>
-          <a:lstStyle/>
-          <a:p>
-            <a:fld id="{CCAAE293-A3DA-4FFC-871C-7F0F209F7CB2}" type="slidenum">
-              <a:rPr lang="en-US" smtClean="0"/>
-              <a:t>8</a:t>
-            </a:fld>
-            <a:endParaRPr lang="en-US"/>
-          </a:p>
-        </p:txBody>
-      </p:sp>
-    </p:spTree>
-    <p:extLst>
-      <p:ext uri="{BB962C8B-B14F-4D97-AF65-F5344CB8AC3E}">
-        <p14:creationId xmlns:p14="http://schemas.microsoft.com/office/powerpoint/2010/main" val="2640396146"/>
-      </p:ext>
-    </p:extLst>
-  </p:cSld>
-  <p:clrMapOvr>
-    <a:masterClrMapping/>
-  </p:clrMapOvr>
-</p:sld>
-</file>
-
-<file path=ppt/slides/slide9.xml><?xml version="1.0" encoding="utf-8"?>
-<p:sld xmlns:a="http://schemas.openxmlformats.org/drawingml/2006/main" xmlns:r="http://schemas.openxmlformats.org/officeDocument/2006/relationships" xmlns:p="http://schemas.openxmlformats.org/presentationml/2006/main">
-  <p:cSld>
-    <p:spTree>
-      <p:nvGrpSpPr>
-        <p:cNvPr id="1" name=""/>
-        <p:cNvGrpSpPr/>
-        <p:nvPr/>
-      </p:nvGrpSpPr>
-      <p:grpSpPr>
-        <a:xfrm>
-          <a:off x="0" y="0"/>
-          <a:ext cx="0" cy="0"/>
-          <a:chOff x="0" y="0"/>
-          <a:chExt cx="0" cy="0"/>
-        </a:xfrm>
-      </p:grpSpPr>
-      <p:sp>
-        <p:nvSpPr>
-          <p:cNvPr id="2" name="Titel 1">
-            <a:extLst>
-              <a:ext uri="{FF2B5EF4-FFF2-40B4-BE49-F238E27FC236}">
                 <a16:creationId xmlns:a16="http://schemas.microsoft.com/office/drawing/2014/main" id="{B9AD5918-EEF6-4302-BDEC-7DB1795BB59D}"/>
               </a:ext>
             </a:extLst>
@@ -5372,13 +4709,13 @@
             <p:ph idx="1"/>
             <p:extLst>
               <p:ext uri="{D42A27DB-BD31-4B8C-83A1-F6EECF244321}">
-                <p14:modId xmlns:p14="http://schemas.microsoft.com/office/powerpoint/2010/main" val="1514224770"/>
+                <p14:modId xmlns:p14="http://schemas.microsoft.com/office/powerpoint/2010/main" val="1251011395"/>
               </p:ext>
             </p:extLst>
           </p:nvPr>
         </p:nvGraphicFramePr>
         <p:xfrm>
-          <a:off x="2961850" y="2324099"/>
+          <a:off x="2961850" y="2245353"/>
           <a:ext cx="6268300" cy="3556332"/>
         </p:xfrm>
         <a:graphic>
@@ -5704,7 +5041,7 @@
           <a:p>
             <a:fld id="{CCAAE293-A3DA-4FFC-871C-7F0F209F7CB2}" type="slidenum">
               <a:rPr lang="en-US" smtClean="0"/>
-              <a:t>9</a:t>
+              <a:t>14</a:t>
             </a:fld>
             <a:endParaRPr lang="en-US"/>
           </a:p>
@@ -5714,6 +5051,2394 @@
     <p:extLst>
       <p:ext uri="{BB962C8B-B14F-4D97-AF65-F5344CB8AC3E}">
         <p14:creationId xmlns:p14="http://schemas.microsoft.com/office/powerpoint/2010/main" val="404757192"/>
+      </p:ext>
+    </p:extLst>
+  </p:cSld>
+  <p:clrMapOvr>
+    <a:masterClrMapping/>
+  </p:clrMapOvr>
+</p:sld>
+</file>
+
+<file path=ppt/slides/slide15.xml><?xml version="1.0" encoding="utf-8"?>
+<p:sld xmlns:a="http://schemas.openxmlformats.org/drawingml/2006/main" xmlns:r="http://schemas.openxmlformats.org/officeDocument/2006/relationships" xmlns:p="http://schemas.openxmlformats.org/presentationml/2006/main">
+  <p:cSld>
+    <p:spTree>
+      <p:nvGrpSpPr>
+        <p:cNvPr id="1" name=""/>
+        <p:cNvGrpSpPr/>
+        <p:nvPr/>
+      </p:nvGrpSpPr>
+      <p:grpSpPr>
+        <a:xfrm>
+          <a:off x="0" y="0"/>
+          <a:ext cx="0" cy="0"/>
+          <a:chOff x="0" y="0"/>
+          <a:chExt cx="0" cy="0"/>
+        </a:xfrm>
+      </p:grpSpPr>
+      <p:sp>
+        <p:nvSpPr>
+          <p:cNvPr id="2" name="Titel 1">
+            <a:extLst>
+              <a:ext uri="{FF2B5EF4-FFF2-40B4-BE49-F238E27FC236}">
+                <a16:creationId xmlns:a16="http://schemas.microsoft.com/office/drawing/2014/main" id="{9AAD7AF3-C7AB-4BF9-89CA-026B27F5932E}"/>
+              </a:ext>
+            </a:extLst>
+          </p:cNvPr>
+          <p:cNvSpPr>
+            <a:spLocks noGrp="1"/>
+          </p:cNvSpPr>
+          <p:nvPr>
+            <p:ph type="title"/>
+          </p:nvPr>
+        </p:nvSpPr>
+        <p:spPr>
+          <a:xfrm>
+            <a:off x="838200" y="280859"/>
+            <a:ext cx="10515600" cy="1325563"/>
+          </a:xfrm>
+        </p:spPr>
+        <p:txBody>
+          <a:bodyPr/>
+          <a:lstStyle/>
+          <a:p>
+            <a:pPr algn="ctr"/>
+            <a:r>
+              <a:rPr lang="de-DE" dirty="0"/>
+              <a:t>…</a:t>
+            </a:r>
+            <a:r>
+              <a:rPr lang="de-DE" dirty="0" err="1"/>
+              <a:t>compared</a:t>
+            </a:r>
+            <a:r>
+              <a:rPr lang="de-DE" dirty="0"/>
+              <a:t> </a:t>
+            </a:r>
+            <a:r>
+              <a:rPr lang="de-DE" dirty="0" err="1"/>
+              <a:t>to</a:t>
+            </a:r>
+            <a:r>
+              <a:rPr lang="de-DE" dirty="0"/>
+              <a:t> </a:t>
+            </a:r>
+            <a:r>
+              <a:rPr lang="de-DE" dirty="0" err="1"/>
+              <a:t>random</a:t>
+            </a:r>
+            <a:endParaRPr lang="de-DE" dirty="0"/>
+          </a:p>
+        </p:txBody>
+      </p:sp>
+      <p:pic>
+        <p:nvPicPr>
+          <p:cNvPr id="7" name="Inhaltsplatzhalter 6">
+            <a:extLst>
+              <a:ext uri="{FF2B5EF4-FFF2-40B4-BE49-F238E27FC236}">
+                <a16:creationId xmlns:a16="http://schemas.microsoft.com/office/drawing/2014/main" id="{72831144-3B64-4A13-BACA-C5A92F768FDD}"/>
+              </a:ext>
+            </a:extLst>
+          </p:cNvPr>
+          <p:cNvPicPr>
+            <a:picLocks noGrp="1" noChangeAspect="1"/>
+          </p:cNvPicPr>
+          <p:nvPr>
+            <p:ph sz="half" idx="1"/>
+          </p:nvPr>
+        </p:nvPicPr>
+        <p:blipFill>
+          <a:blip r:embed="rId2"/>
+          <a:stretch>
+            <a:fillRect/>
+          </a:stretch>
+        </p:blipFill>
+        <p:spPr>
+          <a:xfrm>
+            <a:off x="755073" y="2529078"/>
+            <a:ext cx="5181600" cy="2944432"/>
+          </a:xfrm>
+          <a:prstGeom prst="rect">
+            <a:avLst/>
+          </a:prstGeom>
+        </p:spPr>
+      </p:pic>
+      <p:sp>
+        <p:nvSpPr>
+          <p:cNvPr id="5" name="Foliennummernplatzhalter 4">
+            <a:extLst>
+              <a:ext uri="{FF2B5EF4-FFF2-40B4-BE49-F238E27FC236}">
+                <a16:creationId xmlns:a16="http://schemas.microsoft.com/office/drawing/2014/main" id="{843605C4-ACF3-478C-8BD3-69A43C96C2CD}"/>
+              </a:ext>
+            </a:extLst>
+          </p:cNvPr>
+          <p:cNvSpPr>
+            <a:spLocks noGrp="1"/>
+          </p:cNvSpPr>
+          <p:nvPr>
+            <p:ph type="sldNum" sz="quarter" idx="12"/>
+          </p:nvPr>
+        </p:nvSpPr>
+        <p:spPr/>
+        <p:txBody>
+          <a:bodyPr/>
+          <a:lstStyle/>
+          <a:p>
+            <a:fld id="{CCAAE293-A3DA-4FFC-871C-7F0F209F7CB2}" type="slidenum">
+              <a:rPr lang="en-US" smtClean="0"/>
+              <a:t>15</a:t>
+            </a:fld>
+            <a:endParaRPr lang="en-US"/>
+          </a:p>
+        </p:txBody>
+      </p:sp>
+      <p:graphicFrame>
+        <p:nvGraphicFramePr>
+          <p:cNvPr id="11" name="Inhaltsplatzhalter 10">
+            <a:extLst>
+              <a:ext uri="{FF2B5EF4-FFF2-40B4-BE49-F238E27FC236}">
+                <a16:creationId xmlns:a16="http://schemas.microsoft.com/office/drawing/2014/main" id="{9BCDB30C-E004-4593-B69C-0814F5E99BCD}"/>
+              </a:ext>
+            </a:extLst>
+          </p:cNvPr>
+          <p:cNvGraphicFramePr>
+            <a:graphicFrameLocks noGrp="1"/>
+          </p:cNvGraphicFramePr>
+          <p:nvPr>
+            <p:ph sz="half" idx="2"/>
+            <p:extLst>
+              <p:ext uri="{D42A27DB-BD31-4B8C-83A1-F6EECF244321}">
+                <p14:modId xmlns:p14="http://schemas.microsoft.com/office/powerpoint/2010/main" val="4087130935"/>
+              </p:ext>
+            </p:extLst>
+          </p:nvPr>
+        </p:nvGraphicFramePr>
+        <p:xfrm>
+          <a:off x="6172201" y="2529078"/>
+          <a:ext cx="4689762" cy="2944433"/>
+        </p:xfrm>
+        <a:graphic>
+          <a:graphicData uri="http://schemas.openxmlformats.org/drawingml/2006/table">
+            <a:tbl>
+              <a:tblPr bandRow="1">
+                <a:tableStyleId>{5C22544A-7EE6-4342-B048-85BDC9FD1C3A}</a:tableStyleId>
+              </a:tblPr>
+              <a:tblGrid>
+                <a:gridCol w="1563254">
+                  <a:extLst>
+                    <a:ext uri="{9D8B030D-6E8A-4147-A177-3AD203B41FA5}">
+                      <a16:colId xmlns:a16="http://schemas.microsoft.com/office/drawing/2014/main" val="3236838075"/>
+                    </a:ext>
+                  </a:extLst>
+                </a:gridCol>
+                <a:gridCol w="1563254">
+                  <a:extLst>
+                    <a:ext uri="{9D8B030D-6E8A-4147-A177-3AD203B41FA5}">
+                      <a16:colId xmlns:a16="http://schemas.microsoft.com/office/drawing/2014/main" val="3248146459"/>
+                    </a:ext>
+                  </a:extLst>
+                </a:gridCol>
+                <a:gridCol w="1563254">
+                  <a:extLst>
+                    <a:ext uri="{9D8B030D-6E8A-4147-A177-3AD203B41FA5}">
+                      <a16:colId xmlns:a16="http://schemas.microsoft.com/office/drawing/2014/main" val="4170304363"/>
+                    </a:ext>
+                  </a:extLst>
+                </a:gridCol>
+              </a:tblGrid>
+              <a:tr h="596039">
+                <a:tc>
+                  <a:txBody>
+                    <a:bodyPr/>
+                    <a:lstStyle/>
+                    <a:p>
+                      <a:endParaRPr lang="de-DE" dirty="0"/>
+                    </a:p>
+                  </a:txBody>
+                  <a:tcPr anchor="ctr" anchorCtr="1">
+                    <a:solidFill>
+                      <a:schemeClr val="bg2"/>
+                    </a:solidFill>
+                  </a:tcPr>
+                </a:tc>
+                <a:tc>
+                  <a:txBody>
+                    <a:bodyPr/>
+                    <a:lstStyle/>
+                    <a:p>
+                      <a:r>
+                        <a:rPr lang="de-DE" sz="1600" dirty="0"/>
+                        <a:t>True</a:t>
+                      </a:r>
+                    </a:p>
+                  </a:txBody>
+                  <a:tcPr anchor="ctr" anchorCtr="1">
+                    <a:solidFill>
+                      <a:schemeClr val="bg2"/>
+                    </a:solidFill>
+                  </a:tcPr>
+                </a:tc>
+                <a:tc>
+                  <a:txBody>
+                    <a:bodyPr/>
+                    <a:lstStyle/>
+                    <a:p>
+                      <a:r>
+                        <a:rPr lang="de-DE" sz="1600" dirty="0" err="1"/>
+                        <a:t>False</a:t>
+                      </a:r>
+                      <a:endParaRPr lang="de-DE" sz="1600" dirty="0"/>
+                    </a:p>
+                  </a:txBody>
+                  <a:tcPr anchor="ctr" anchorCtr="1">
+                    <a:solidFill>
+                      <a:schemeClr val="bg2"/>
+                    </a:solidFill>
+                  </a:tcPr>
+                </a:tc>
+                <a:extLst>
+                  <a:ext uri="{0D108BD9-81ED-4DB2-BD59-A6C34878D82A}">
+                    <a16:rowId xmlns:a16="http://schemas.microsoft.com/office/drawing/2014/main" val="1558527104"/>
+                  </a:ext>
+                </a:extLst>
+              </a:tr>
+              <a:tr h="1174197">
+                <a:tc>
+                  <a:txBody>
+                    <a:bodyPr/>
+                    <a:lstStyle/>
+                    <a:p>
+                      <a:r>
+                        <a:rPr lang="de-DE" sz="1600" dirty="0" err="1"/>
+                        <a:t>Predicted</a:t>
+                      </a:r>
+                      <a:r>
+                        <a:rPr lang="de-DE" sz="1600" dirty="0"/>
+                        <a:t> True</a:t>
+                      </a:r>
+                    </a:p>
+                  </a:txBody>
+                  <a:tcPr anchor="ctr" anchorCtr="1">
+                    <a:solidFill>
+                      <a:schemeClr val="bg2"/>
+                    </a:solidFill>
+                  </a:tcPr>
+                </a:tc>
+                <a:tc>
+                  <a:txBody>
+                    <a:bodyPr/>
+                    <a:lstStyle/>
+                    <a:p>
+                      <a:pPr algn="ctr"/>
+                      <a:r>
+                        <a:rPr lang="de-DE" sz="1600" dirty="0"/>
+                        <a:t>277</a:t>
+                      </a:r>
+                    </a:p>
+                    <a:p>
+                      <a:pPr algn="ctr"/>
+                      <a:r>
+                        <a:rPr lang="de-DE" sz="1600" dirty="0"/>
+                        <a:t>~0.8%</a:t>
+                      </a:r>
+                    </a:p>
+                  </a:txBody>
+                  <a:tcPr anchor="ctr" anchorCtr="1">
+                    <a:solidFill>
+                      <a:srgbClr val="00B050"/>
+                    </a:solidFill>
+                  </a:tcPr>
+                </a:tc>
+                <a:tc>
+                  <a:txBody>
+                    <a:bodyPr/>
+                    <a:lstStyle/>
+                    <a:p>
+                      <a:pPr algn="ctr"/>
+                      <a:r>
+                        <a:rPr lang="de-DE" sz="1600" dirty="0"/>
+                        <a:t>2377</a:t>
+                      </a:r>
+                    </a:p>
+                    <a:p>
+                      <a:pPr algn="ctr"/>
+                      <a:r>
+                        <a:rPr lang="de-DE" sz="1600" dirty="0"/>
+                        <a:t>~7.4%</a:t>
+                      </a:r>
+                    </a:p>
+                  </a:txBody>
+                  <a:tcPr anchor="ctr" anchorCtr="1">
+                    <a:solidFill>
+                      <a:srgbClr val="FF0000"/>
+                    </a:solidFill>
+                  </a:tcPr>
+                </a:tc>
+                <a:extLst>
+                  <a:ext uri="{0D108BD9-81ED-4DB2-BD59-A6C34878D82A}">
+                    <a16:rowId xmlns:a16="http://schemas.microsoft.com/office/drawing/2014/main" val="3121859317"/>
+                  </a:ext>
+                </a:extLst>
+              </a:tr>
+              <a:tr h="1174197">
+                <a:tc>
+                  <a:txBody>
+                    <a:bodyPr/>
+                    <a:lstStyle/>
+                    <a:p>
+                      <a:r>
+                        <a:rPr lang="de-DE" sz="1600" dirty="0" err="1"/>
+                        <a:t>Predicted</a:t>
+                      </a:r>
+                      <a:r>
+                        <a:rPr lang="de-DE" sz="1600" dirty="0"/>
+                        <a:t> </a:t>
+                      </a:r>
+                      <a:r>
+                        <a:rPr lang="de-DE" sz="1600" dirty="0" err="1"/>
+                        <a:t>False</a:t>
+                      </a:r>
+                      <a:endParaRPr lang="de-DE" sz="1600" dirty="0"/>
+                    </a:p>
+                  </a:txBody>
+                  <a:tcPr anchor="ctr" anchorCtr="1">
+                    <a:solidFill>
+                      <a:schemeClr val="bg2"/>
+                    </a:solidFill>
+                  </a:tcPr>
+                </a:tc>
+                <a:tc>
+                  <a:txBody>
+                    <a:bodyPr/>
+                    <a:lstStyle/>
+                    <a:p>
+                      <a:pPr algn="ctr"/>
+                      <a:r>
+                        <a:rPr lang="de-DE" sz="1600" dirty="0"/>
+                        <a:t>3084</a:t>
+                      </a:r>
+                    </a:p>
+                    <a:p>
+                      <a:pPr algn="ctr"/>
+                      <a:r>
+                        <a:rPr lang="de-DE" sz="1600" dirty="0"/>
+                        <a:t>~9.6%</a:t>
+                      </a:r>
+                    </a:p>
+                  </a:txBody>
+                  <a:tcPr anchor="ctr" anchorCtr="1">
+                    <a:solidFill>
+                      <a:srgbClr val="FF0000"/>
+                    </a:solidFill>
+                  </a:tcPr>
+                </a:tc>
+                <a:tc>
+                  <a:txBody>
+                    <a:bodyPr/>
+                    <a:lstStyle/>
+                    <a:p>
+                      <a:pPr algn="ctr"/>
+                      <a:r>
+                        <a:rPr lang="de-DE" sz="1600" dirty="0"/>
+                        <a:t>26089</a:t>
+                      </a:r>
+                    </a:p>
+                    <a:p>
+                      <a:pPr algn="ctr"/>
+                      <a:r>
+                        <a:rPr lang="de-DE" sz="1600" dirty="0"/>
+                        <a:t>~81.9%</a:t>
+                      </a:r>
+                    </a:p>
+                  </a:txBody>
+                  <a:tcPr anchor="ctr" anchorCtr="1">
+                    <a:solidFill>
+                      <a:srgbClr val="00B050"/>
+                    </a:solidFill>
+                  </a:tcPr>
+                </a:tc>
+                <a:extLst>
+                  <a:ext uri="{0D108BD9-81ED-4DB2-BD59-A6C34878D82A}">
+                    <a16:rowId xmlns:a16="http://schemas.microsoft.com/office/drawing/2014/main" val="3568018224"/>
+                  </a:ext>
+                </a:extLst>
+              </a:tr>
+            </a:tbl>
+          </a:graphicData>
+        </a:graphic>
+      </p:graphicFrame>
+      <p:sp>
+        <p:nvSpPr>
+          <p:cNvPr id="3" name="Textfeld 2">
+            <a:extLst>
+              <a:ext uri="{FF2B5EF4-FFF2-40B4-BE49-F238E27FC236}">
+                <a16:creationId xmlns:a16="http://schemas.microsoft.com/office/drawing/2014/main" id="{B13F8BF6-3CC8-4F06-9172-3ADE26C0E263}"/>
+              </a:ext>
+            </a:extLst>
+          </p:cNvPr>
+          <p:cNvSpPr txBox="1"/>
+          <p:nvPr/>
+        </p:nvSpPr>
+        <p:spPr>
+          <a:xfrm>
+            <a:off x="1623291" y="1895855"/>
+            <a:ext cx="3445164" cy="369332"/>
+          </a:xfrm>
+          <a:prstGeom prst="rect">
+            <a:avLst/>
+          </a:prstGeom>
+          <a:noFill/>
+        </p:spPr>
+        <p:txBody>
+          <a:bodyPr wrap="square" rtlCol="0">
+            <a:spAutoFit/>
+          </a:bodyPr>
+          <a:lstStyle/>
+          <a:p>
+            <a:pPr algn="ctr"/>
+            <a:r>
+              <a:rPr lang="de-DE" dirty="0" err="1"/>
+              <a:t>Our</a:t>
+            </a:r>
+            <a:r>
+              <a:rPr lang="de-DE" dirty="0"/>
+              <a:t> </a:t>
+            </a:r>
+            <a:r>
+              <a:rPr lang="de-DE" dirty="0" err="1"/>
+              <a:t>Prediction</a:t>
+            </a:r>
+            <a:endParaRPr lang="de-DE" dirty="0"/>
+          </a:p>
+        </p:txBody>
+      </p:sp>
+      <p:sp>
+        <p:nvSpPr>
+          <p:cNvPr id="8" name="Textfeld 7">
+            <a:extLst>
+              <a:ext uri="{FF2B5EF4-FFF2-40B4-BE49-F238E27FC236}">
+                <a16:creationId xmlns:a16="http://schemas.microsoft.com/office/drawing/2014/main" id="{4F4DF90A-A0CB-4A59-829F-EEBC0073BB9A}"/>
+              </a:ext>
+            </a:extLst>
+          </p:cNvPr>
+          <p:cNvSpPr txBox="1"/>
+          <p:nvPr/>
+        </p:nvSpPr>
+        <p:spPr>
+          <a:xfrm>
+            <a:off x="6692900" y="1895855"/>
+            <a:ext cx="3445164" cy="369332"/>
+          </a:xfrm>
+          <a:prstGeom prst="rect">
+            <a:avLst/>
+          </a:prstGeom>
+          <a:noFill/>
+        </p:spPr>
+        <p:txBody>
+          <a:bodyPr wrap="square" rtlCol="0">
+            <a:spAutoFit/>
+          </a:bodyPr>
+          <a:lstStyle/>
+          <a:p>
+            <a:pPr algn="ctr"/>
+            <a:r>
+              <a:rPr lang="de-DE" dirty="0"/>
+              <a:t>Random </a:t>
+            </a:r>
+            <a:r>
+              <a:rPr lang="de-DE" dirty="0" err="1"/>
+              <a:t>Prediction</a:t>
+            </a:r>
+            <a:endParaRPr lang="de-DE" dirty="0"/>
+          </a:p>
+        </p:txBody>
+      </p:sp>
+      <p:sp>
+        <p:nvSpPr>
+          <p:cNvPr id="4" name="Textfeld 3">
+            <a:extLst>
+              <a:ext uri="{FF2B5EF4-FFF2-40B4-BE49-F238E27FC236}">
+                <a16:creationId xmlns:a16="http://schemas.microsoft.com/office/drawing/2014/main" id="{3037C15C-5721-4F03-A700-647C4F89B653}"/>
+              </a:ext>
+            </a:extLst>
+          </p:cNvPr>
+          <p:cNvSpPr txBox="1"/>
+          <p:nvPr/>
+        </p:nvSpPr>
+        <p:spPr>
+          <a:xfrm>
+            <a:off x="6948054" y="5597236"/>
+            <a:ext cx="3325091" cy="369332"/>
+          </a:xfrm>
+          <a:prstGeom prst="rect">
+            <a:avLst/>
+          </a:prstGeom>
+          <a:noFill/>
+        </p:spPr>
+        <p:txBody>
+          <a:bodyPr wrap="square" rtlCol="0">
+            <a:spAutoFit/>
+          </a:bodyPr>
+          <a:lstStyle/>
+          <a:p>
+            <a:r>
+              <a:rPr lang="de-DE" dirty="0"/>
+              <a:t>MCC: -0.0012085301496811804</a:t>
+            </a:r>
+          </a:p>
+        </p:txBody>
+      </p:sp>
+      <p:sp>
+        <p:nvSpPr>
+          <p:cNvPr id="6" name="Textfeld 5">
+            <a:extLst>
+              <a:ext uri="{FF2B5EF4-FFF2-40B4-BE49-F238E27FC236}">
+                <a16:creationId xmlns:a16="http://schemas.microsoft.com/office/drawing/2014/main" id="{B82480D3-87EB-46BE-A8AE-66648AFE8119}"/>
+              </a:ext>
+            </a:extLst>
+          </p:cNvPr>
+          <p:cNvSpPr txBox="1"/>
+          <p:nvPr/>
+        </p:nvSpPr>
+        <p:spPr>
+          <a:xfrm>
+            <a:off x="1189182" y="5597236"/>
+            <a:ext cx="4313382" cy="369332"/>
+          </a:xfrm>
+          <a:prstGeom prst="rect">
+            <a:avLst/>
+          </a:prstGeom>
+          <a:noFill/>
+        </p:spPr>
+        <p:txBody>
+          <a:bodyPr wrap="square" rtlCol="0">
+            <a:spAutoFit/>
+          </a:bodyPr>
+          <a:lstStyle/>
+          <a:p>
+            <a:pPr algn="ctr"/>
+            <a:r>
+              <a:rPr lang="de-DE" dirty="0"/>
+              <a:t>MCC: </a:t>
+            </a:r>
+            <a:r>
+              <a:rPr lang="en-US" dirty="0"/>
+              <a:t>0.23597300754427067</a:t>
+            </a:r>
+            <a:r>
+              <a:rPr lang="de-DE" dirty="0"/>
+              <a:t> </a:t>
+            </a:r>
+          </a:p>
+        </p:txBody>
+      </p:sp>
+    </p:spTree>
+    <p:extLst>
+      <p:ext uri="{BB962C8B-B14F-4D97-AF65-F5344CB8AC3E}">
+        <p14:creationId xmlns:p14="http://schemas.microsoft.com/office/powerpoint/2010/main" val="3249446876"/>
+      </p:ext>
+    </p:extLst>
+  </p:cSld>
+  <p:clrMapOvr>
+    <a:masterClrMapping/>
+  </p:clrMapOvr>
+</p:sld>
+</file>
+
+<file path=ppt/slides/slide16.xml><?xml version="1.0" encoding="utf-8"?>
+<p:sld xmlns:a="http://schemas.openxmlformats.org/drawingml/2006/main" xmlns:r="http://schemas.openxmlformats.org/officeDocument/2006/relationships" xmlns:p="http://schemas.openxmlformats.org/presentationml/2006/main">
+  <p:cSld>
+    <p:spTree>
+      <p:nvGrpSpPr>
+        <p:cNvPr id="1" name=""/>
+        <p:cNvGrpSpPr/>
+        <p:nvPr/>
+      </p:nvGrpSpPr>
+      <p:grpSpPr>
+        <a:xfrm>
+          <a:off x="0" y="0"/>
+          <a:ext cx="0" cy="0"/>
+          <a:chOff x="0" y="0"/>
+          <a:chExt cx="0" cy="0"/>
+        </a:xfrm>
+      </p:grpSpPr>
+      <p:sp>
+        <p:nvSpPr>
+          <p:cNvPr id="2" name="Titel 1">
+            <a:extLst>
+              <a:ext uri="{FF2B5EF4-FFF2-40B4-BE49-F238E27FC236}">
+                <a16:creationId xmlns:a16="http://schemas.microsoft.com/office/drawing/2014/main" id="{9D97ED67-0983-40BA-B344-DFF1A8F9D645}"/>
+              </a:ext>
+            </a:extLst>
+          </p:cNvPr>
+          <p:cNvSpPr>
+            <a:spLocks noGrp="1"/>
+          </p:cNvSpPr>
+          <p:nvPr>
+            <p:ph type="title"/>
+          </p:nvPr>
+        </p:nvSpPr>
+        <p:spPr/>
+        <p:txBody>
+          <a:bodyPr/>
+          <a:lstStyle/>
+          <a:p>
+            <a:r>
+              <a:rPr lang="en-US" dirty="0"/>
+              <a:t>stats</a:t>
+            </a:r>
+          </a:p>
+        </p:txBody>
+      </p:sp>
+      <p:sp>
+        <p:nvSpPr>
+          <p:cNvPr id="3" name="Inhaltsplatzhalter 2">
+            <a:extLst>
+              <a:ext uri="{FF2B5EF4-FFF2-40B4-BE49-F238E27FC236}">
+                <a16:creationId xmlns:a16="http://schemas.microsoft.com/office/drawing/2014/main" id="{2EB22B1B-35DF-494F-B9F2-FC28829ED749}"/>
+              </a:ext>
+            </a:extLst>
+          </p:cNvPr>
+          <p:cNvSpPr>
+            <a:spLocks noGrp="1"/>
+          </p:cNvSpPr>
+          <p:nvPr>
+            <p:ph idx="1"/>
+          </p:nvPr>
+        </p:nvSpPr>
+        <p:spPr/>
+        <p:txBody>
+          <a:bodyPr>
+            <a:normAutofit lnSpcReduction="10000"/>
+          </a:bodyPr>
+          <a:lstStyle/>
+          <a:p>
+            <a:r>
+              <a:rPr lang="en-US" dirty="0"/>
+              <a:t>TP:	519</a:t>
+            </a:r>
+          </a:p>
+          <a:p>
+            <a:r>
+              <a:rPr lang="en-US" dirty="0"/>
+              <a:t>FP:	517</a:t>
+            </a:r>
+          </a:p>
+          <a:p>
+            <a:r>
+              <a:rPr lang="en-US" dirty="0"/>
+              <a:t>TN:	27949</a:t>
+            </a:r>
+          </a:p>
+          <a:p>
+            <a:r>
+              <a:rPr lang="en-US" dirty="0"/>
+              <a:t>FN:	2842</a:t>
+            </a:r>
+          </a:p>
+          <a:p>
+            <a:r>
+              <a:rPr lang="en-US" dirty="0"/>
+              <a:t>FPR:	0.01816201784585119</a:t>
+            </a:r>
+          </a:p>
+          <a:p>
+            <a:r>
+              <a:rPr lang="en-US" dirty="0"/>
+              <a:t>Precision:	0.500965250965251</a:t>
+            </a:r>
+          </a:p>
+          <a:p>
+            <a:r>
+              <a:rPr lang="en-US" dirty="0"/>
+              <a:t>Recall/TPR:	0.15441832787860757</a:t>
+            </a:r>
+          </a:p>
+          <a:p>
+            <a:r>
+              <a:rPr lang="en-US" dirty="0"/>
+              <a:t>F1-score:	0.2360700477598363</a:t>
+            </a:r>
+          </a:p>
+          <a:p>
+            <a:r>
+              <a:rPr lang="en-US" dirty="0"/>
+              <a:t>MCC:	0.23597300754427067+- 0.05293743405150672(stderr)</a:t>
+            </a:r>
+          </a:p>
+        </p:txBody>
+      </p:sp>
+      <p:sp>
+        <p:nvSpPr>
+          <p:cNvPr id="4" name="Foliennummernplatzhalter 3">
+            <a:extLst>
+              <a:ext uri="{FF2B5EF4-FFF2-40B4-BE49-F238E27FC236}">
+                <a16:creationId xmlns:a16="http://schemas.microsoft.com/office/drawing/2014/main" id="{FA0D585C-CC90-4B30-90DD-73F0D164A1C9}"/>
+              </a:ext>
+            </a:extLst>
+          </p:cNvPr>
+          <p:cNvSpPr>
+            <a:spLocks noGrp="1"/>
+          </p:cNvSpPr>
+          <p:nvPr>
+            <p:ph type="sldNum" sz="quarter" idx="12"/>
+          </p:nvPr>
+        </p:nvSpPr>
+        <p:spPr/>
+        <p:txBody>
+          <a:bodyPr/>
+          <a:lstStyle/>
+          <a:p>
+            <a:fld id="{CCAAE293-A3DA-4FFC-871C-7F0F209F7CB2}" type="slidenum">
+              <a:rPr lang="en-US" smtClean="0"/>
+              <a:t>16</a:t>
+            </a:fld>
+            <a:endParaRPr lang="en-US"/>
+          </a:p>
+        </p:txBody>
+      </p:sp>
+    </p:spTree>
+    <p:extLst>
+      <p:ext uri="{BB962C8B-B14F-4D97-AF65-F5344CB8AC3E}">
+        <p14:creationId xmlns:p14="http://schemas.microsoft.com/office/powerpoint/2010/main" val="4122554641"/>
+      </p:ext>
+    </p:extLst>
+  </p:cSld>
+  <p:clrMapOvr>
+    <a:masterClrMapping/>
+  </p:clrMapOvr>
+</p:sld>
+</file>
+
+<file path=ppt/slides/slide2.xml><?xml version="1.0" encoding="utf-8"?>
+<p:sld xmlns:a="http://schemas.openxmlformats.org/drawingml/2006/main" xmlns:r="http://schemas.openxmlformats.org/officeDocument/2006/relationships" xmlns:p="http://schemas.openxmlformats.org/presentationml/2006/main">
+  <p:cSld>
+    <p:spTree>
+      <p:nvGrpSpPr>
+        <p:cNvPr id="1" name=""/>
+        <p:cNvGrpSpPr/>
+        <p:nvPr/>
+      </p:nvGrpSpPr>
+      <p:grpSpPr>
+        <a:xfrm>
+          <a:off x="0" y="0"/>
+          <a:ext cx="0" cy="0"/>
+          <a:chOff x="0" y="0"/>
+          <a:chExt cx="0" cy="0"/>
+        </a:xfrm>
+      </p:grpSpPr>
+      <p:sp>
+        <p:nvSpPr>
+          <p:cNvPr id="2" name="Titel 1">
+            <a:extLst>
+              <a:ext uri="{FF2B5EF4-FFF2-40B4-BE49-F238E27FC236}">
+                <a16:creationId xmlns:a16="http://schemas.microsoft.com/office/drawing/2014/main" id="{A0AF0F99-5B8C-4A5B-8805-CC5D24D3C564}"/>
+              </a:ext>
+            </a:extLst>
+          </p:cNvPr>
+          <p:cNvSpPr>
+            <a:spLocks noGrp="1"/>
+          </p:cNvSpPr>
+          <p:nvPr>
+            <p:ph type="title"/>
+          </p:nvPr>
+        </p:nvSpPr>
+        <p:spPr/>
+        <p:txBody>
+          <a:bodyPr/>
+          <a:lstStyle/>
+          <a:p>
+            <a:pPr algn="ctr"/>
+            <a:r>
+              <a:rPr lang="en-US" dirty="0"/>
+              <a:t>Feature: first Ideas</a:t>
+            </a:r>
+          </a:p>
+        </p:txBody>
+      </p:sp>
+      <p:sp>
+        <p:nvSpPr>
+          <p:cNvPr id="3" name="Inhaltsplatzhalter 2">
+            <a:extLst>
+              <a:ext uri="{FF2B5EF4-FFF2-40B4-BE49-F238E27FC236}">
+                <a16:creationId xmlns:a16="http://schemas.microsoft.com/office/drawing/2014/main" id="{DC16FC26-A9C2-43DE-849D-CCD62E93A709}"/>
+              </a:ext>
+            </a:extLst>
+          </p:cNvPr>
+          <p:cNvSpPr>
+            <a:spLocks noGrp="1"/>
+          </p:cNvSpPr>
+          <p:nvPr>
+            <p:ph idx="1"/>
+          </p:nvPr>
+        </p:nvSpPr>
+        <p:spPr/>
+        <p:txBody>
+          <a:bodyPr/>
+          <a:lstStyle/>
+          <a:p>
+            <a:pPr marL="196596" indent="-196596" defTabSz="786384">
+              <a:spcBef>
+                <a:spcPts val="800"/>
+              </a:spcBef>
+              <a:defRPr sz="2408"/>
+            </a:pPr>
+            <a:r>
+              <a:rPr lang="en-US" dirty="0"/>
+              <a:t>Large (-) BLOSUM =&gt; Very unlikely substitution =&gt; Strong functional effect</a:t>
+            </a:r>
+          </a:p>
+          <a:p>
+            <a:pPr marL="589788" lvl="1" indent="-196596" defTabSz="786384">
+              <a:spcBef>
+                <a:spcPts val="800"/>
+              </a:spcBef>
+              <a:defRPr sz="2408"/>
+            </a:pPr>
+            <a:r>
+              <a:rPr lang="en-US" dirty="0"/>
+              <a:t>Requires high SNAP2 to be functionally significant (i.e. binding)</a:t>
+            </a:r>
+          </a:p>
+          <a:p>
+            <a:pPr marL="196596" indent="-196596" defTabSz="786384">
+              <a:spcBef>
+                <a:spcPts val="800"/>
+              </a:spcBef>
+              <a:defRPr sz="2408"/>
+            </a:pPr>
+            <a:r>
+              <a:rPr lang="en-US" dirty="0"/>
+              <a:t>Large (+) BLOSUM =&gt; Very likely substitution =&gt; Weak functional effect</a:t>
+            </a:r>
+          </a:p>
+          <a:p>
+            <a:pPr marL="589788" lvl="1" indent="-196596" defTabSz="786384">
+              <a:spcBef>
+                <a:spcPts val="800"/>
+              </a:spcBef>
+              <a:defRPr sz="2408"/>
+            </a:pPr>
+            <a:r>
+              <a:rPr lang="en-US" dirty="0"/>
+              <a:t>Small SNAP2 can still imply functional significance (i.e. binding)</a:t>
+            </a:r>
+          </a:p>
+          <a:p>
+            <a:pPr marL="589788" lvl="1" indent="-196596" defTabSz="786384">
+              <a:spcBef>
+                <a:spcPts val="800"/>
+              </a:spcBef>
+              <a:defRPr sz="2408"/>
+            </a:pPr>
+            <a:endParaRPr lang="en-US" dirty="0"/>
+          </a:p>
+          <a:p>
+            <a:r>
+              <a:rPr lang="en-US" sz="2400" dirty="0"/>
+              <a:t>Cutoffs:</a:t>
+            </a:r>
+          </a:p>
+          <a:p>
+            <a:pPr marL="457200" lvl="1" indent="0">
+              <a:buNone/>
+            </a:pPr>
+            <a:r>
+              <a:rPr lang="en-US" dirty="0"/>
+              <a:t>-4: 90, -3: 80, -2:70, -1: 60, 0:50, 1:40, 2:30, 3:0</a:t>
+            </a:r>
+          </a:p>
+          <a:p>
+            <a:pPr marL="457200" lvl="1" indent="0">
+              <a:buNone/>
+            </a:pPr>
+            <a:r>
+              <a:rPr lang="en-US" dirty="0"/>
+              <a:t>BLOSUM diagonal can be ignored</a:t>
+            </a:r>
+          </a:p>
+          <a:p>
+            <a:r>
+              <a:rPr lang="en-US" sz="2400" dirty="0"/>
+              <a:t>Result:</a:t>
+            </a:r>
+          </a:p>
+          <a:p>
+            <a:pPr marL="0" indent="0">
+              <a:buNone/>
+            </a:pPr>
+            <a:r>
+              <a:rPr lang="en-US" sz="2400" dirty="0"/>
+              <a:t>	[-1, 1, -1, -1, -1, 1, 1, -1, -1, -1, -1, 1, 0, -1, 1, 1, 1, 1, -1, -1]</a:t>
+            </a:r>
+          </a:p>
+          <a:p>
+            <a:endParaRPr lang="en-US" dirty="0"/>
+          </a:p>
+          <a:p>
+            <a:endParaRPr lang="en-US" dirty="0"/>
+          </a:p>
+        </p:txBody>
+      </p:sp>
+      <p:sp>
+        <p:nvSpPr>
+          <p:cNvPr id="4" name="Foliennummernplatzhalter 3">
+            <a:extLst>
+              <a:ext uri="{FF2B5EF4-FFF2-40B4-BE49-F238E27FC236}">
+                <a16:creationId xmlns:a16="http://schemas.microsoft.com/office/drawing/2014/main" id="{6ECE49BF-46DA-4F97-8631-C0E5C689DF62}"/>
+              </a:ext>
+            </a:extLst>
+          </p:cNvPr>
+          <p:cNvSpPr>
+            <a:spLocks noGrp="1"/>
+          </p:cNvSpPr>
+          <p:nvPr>
+            <p:ph type="sldNum" sz="quarter" idx="12"/>
+          </p:nvPr>
+        </p:nvSpPr>
+        <p:spPr/>
+        <p:txBody>
+          <a:bodyPr/>
+          <a:lstStyle/>
+          <a:p>
+            <a:fld id="{CCAAE293-A3DA-4FFC-871C-7F0F209F7CB2}" type="slidenum">
+              <a:rPr lang="en-US" smtClean="0"/>
+              <a:t>2</a:t>
+            </a:fld>
+            <a:endParaRPr lang="en-US"/>
+          </a:p>
+        </p:txBody>
+      </p:sp>
+    </p:spTree>
+    <p:extLst>
+      <p:ext uri="{BB962C8B-B14F-4D97-AF65-F5344CB8AC3E}">
+        <p14:creationId xmlns:p14="http://schemas.microsoft.com/office/powerpoint/2010/main" val="2197693600"/>
+      </p:ext>
+    </p:extLst>
+  </p:cSld>
+  <p:clrMapOvr>
+    <a:masterClrMapping/>
+  </p:clrMapOvr>
+</p:sld>
+</file>
+
+<file path=ppt/slides/slide3.xml><?xml version="1.0" encoding="utf-8"?>
+<p:sld xmlns:a="http://schemas.openxmlformats.org/drawingml/2006/main" xmlns:r="http://schemas.openxmlformats.org/officeDocument/2006/relationships" xmlns:p="http://schemas.openxmlformats.org/presentationml/2006/main">
+  <p:cSld>
+    <p:spTree>
+      <p:nvGrpSpPr>
+        <p:cNvPr id="1" name=""/>
+        <p:cNvGrpSpPr/>
+        <p:nvPr/>
+      </p:nvGrpSpPr>
+      <p:grpSpPr>
+        <a:xfrm>
+          <a:off x="0" y="0"/>
+          <a:ext cx="0" cy="0"/>
+          <a:chOff x="0" y="0"/>
+          <a:chExt cx="0" cy="0"/>
+        </a:xfrm>
+      </p:grpSpPr>
+      <p:sp>
+        <p:nvSpPr>
+          <p:cNvPr id="2" name="Titel 1">
+            <a:extLst>
+              <a:ext uri="{FF2B5EF4-FFF2-40B4-BE49-F238E27FC236}">
+                <a16:creationId xmlns:a16="http://schemas.microsoft.com/office/drawing/2014/main" id="{9591C612-F88B-4465-8B3F-44166E3449EA}"/>
+              </a:ext>
+            </a:extLst>
+          </p:cNvPr>
+          <p:cNvSpPr>
+            <a:spLocks noGrp="1"/>
+          </p:cNvSpPr>
+          <p:nvPr>
+            <p:ph type="title"/>
+          </p:nvPr>
+        </p:nvSpPr>
+        <p:spPr/>
+        <p:txBody>
+          <a:bodyPr/>
+          <a:lstStyle/>
+          <a:p>
+            <a:pPr algn="ctr"/>
+            <a:r>
+              <a:rPr lang="en-US" dirty="0"/>
+              <a:t>Feature: raw scores</a:t>
+            </a:r>
+          </a:p>
+        </p:txBody>
+      </p:sp>
+      <p:sp>
+        <p:nvSpPr>
+          <p:cNvPr id="3" name="Inhaltsplatzhalter 2">
+            <a:extLst>
+              <a:ext uri="{FF2B5EF4-FFF2-40B4-BE49-F238E27FC236}">
+                <a16:creationId xmlns:a16="http://schemas.microsoft.com/office/drawing/2014/main" id="{5B3C0166-0693-45E2-8540-A3B3EA29A65E}"/>
+              </a:ext>
+            </a:extLst>
+          </p:cNvPr>
+          <p:cNvSpPr>
+            <a:spLocks noGrp="1"/>
+          </p:cNvSpPr>
+          <p:nvPr>
+            <p:ph idx="1"/>
+          </p:nvPr>
+        </p:nvSpPr>
+        <p:spPr/>
+        <p:txBody>
+          <a:bodyPr/>
+          <a:lstStyle/>
+          <a:p>
+            <a:r>
+              <a:rPr lang="en-US" dirty="0"/>
+              <a:t>Problem: Too little Information to get meaningful results</a:t>
+            </a:r>
+          </a:p>
+          <a:p>
+            <a:r>
+              <a:rPr lang="en-US" dirty="0"/>
+              <a:t>Solution: input raw scores</a:t>
+            </a:r>
+          </a:p>
+          <a:p>
+            <a:endParaRPr lang="en-US" dirty="0"/>
+          </a:p>
+          <a:p>
+            <a:endParaRPr lang="en-US" dirty="0"/>
+          </a:p>
+          <a:p>
+            <a:pPr marL="0" indent="0">
+              <a:buNone/>
+            </a:pPr>
+            <a:r>
+              <a:rPr lang="en-US" dirty="0"/>
+              <a:t>[48, -1, 75, -1, 70, -2, 79, -3, 36, -1, 58, 0, 76, -2, 73, -3, 67, -2, 15, 1, </a:t>
+            </a:r>
+          </a:p>
+          <a:p>
+            <a:pPr marL="0" indent="0">
+              <a:buNone/>
+            </a:pPr>
+            <a:r>
+              <a:rPr lang="en-US" dirty="0"/>
+              <a:t>    24, 2, 76, -1, 0, 0, 30, 0, 79, -2, 65, -1, 62, -1, 68, -1, 51, -1, 27, 1]</a:t>
+            </a:r>
+          </a:p>
+          <a:p>
+            <a:endParaRPr lang="en-US" dirty="0"/>
+          </a:p>
+        </p:txBody>
+      </p:sp>
+      <p:sp>
+        <p:nvSpPr>
+          <p:cNvPr id="4" name="Foliennummernplatzhalter 3">
+            <a:extLst>
+              <a:ext uri="{FF2B5EF4-FFF2-40B4-BE49-F238E27FC236}">
+                <a16:creationId xmlns:a16="http://schemas.microsoft.com/office/drawing/2014/main" id="{74F85361-5C17-48B6-93DB-1EDA5C35426C}"/>
+              </a:ext>
+            </a:extLst>
+          </p:cNvPr>
+          <p:cNvSpPr>
+            <a:spLocks noGrp="1"/>
+          </p:cNvSpPr>
+          <p:nvPr>
+            <p:ph type="sldNum" sz="quarter" idx="12"/>
+          </p:nvPr>
+        </p:nvSpPr>
+        <p:spPr/>
+        <p:txBody>
+          <a:bodyPr/>
+          <a:lstStyle/>
+          <a:p>
+            <a:fld id="{CCAAE293-A3DA-4FFC-871C-7F0F209F7CB2}" type="slidenum">
+              <a:rPr lang="en-US" smtClean="0"/>
+              <a:t>3</a:t>
+            </a:fld>
+            <a:endParaRPr lang="en-US"/>
+          </a:p>
+        </p:txBody>
+      </p:sp>
+    </p:spTree>
+    <p:extLst>
+      <p:ext uri="{BB962C8B-B14F-4D97-AF65-F5344CB8AC3E}">
+        <p14:creationId xmlns:p14="http://schemas.microsoft.com/office/powerpoint/2010/main" val="67827862"/>
+      </p:ext>
+    </p:extLst>
+  </p:cSld>
+  <p:clrMapOvr>
+    <a:masterClrMapping/>
+  </p:clrMapOvr>
+</p:sld>
+</file>
+
+<file path=ppt/slides/slide4.xml><?xml version="1.0" encoding="utf-8"?>
+<p:sld xmlns:a="http://schemas.openxmlformats.org/drawingml/2006/main" xmlns:r="http://schemas.openxmlformats.org/officeDocument/2006/relationships" xmlns:p="http://schemas.openxmlformats.org/presentationml/2006/main">
+  <p:cSld>
+    <p:spTree>
+      <p:nvGrpSpPr>
+        <p:cNvPr id="1" name=""/>
+        <p:cNvGrpSpPr/>
+        <p:nvPr/>
+      </p:nvGrpSpPr>
+      <p:grpSpPr>
+        <a:xfrm>
+          <a:off x="0" y="0"/>
+          <a:ext cx="0" cy="0"/>
+          <a:chOff x="0" y="0"/>
+          <a:chExt cx="0" cy="0"/>
+        </a:xfrm>
+      </p:grpSpPr>
+      <p:sp>
+        <p:nvSpPr>
+          <p:cNvPr id="2" name="Titel 1">
+            <a:extLst>
+              <a:ext uri="{FF2B5EF4-FFF2-40B4-BE49-F238E27FC236}">
+                <a16:creationId xmlns:a16="http://schemas.microsoft.com/office/drawing/2014/main" id="{60F4F9F7-1F09-4688-9724-856BD95194F1}"/>
+              </a:ext>
+            </a:extLst>
+          </p:cNvPr>
+          <p:cNvSpPr>
+            <a:spLocks noGrp="1"/>
+          </p:cNvSpPr>
+          <p:nvPr>
+            <p:ph type="title"/>
+          </p:nvPr>
+        </p:nvSpPr>
+        <p:spPr/>
+        <p:txBody>
+          <a:bodyPr/>
+          <a:lstStyle/>
+          <a:p>
+            <a:pPr algn="ctr"/>
+            <a:r>
+              <a:rPr lang="en-US" dirty="0"/>
+              <a:t>Feature</a:t>
+            </a:r>
+            <a:r>
+              <a:rPr lang="de-DE" dirty="0"/>
+              <a:t>: </a:t>
+            </a:r>
+            <a:r>
+              <a:rPr lang="de-DE" dirty="0" err="1"/>
+              <a:t>scaled</a:t>
+            </a:r>
+            <a:r>
+              <a:rPr lang="de-DE" dirty="0"/>
+              <a:t> Values</a:t>
+            </a:r>
+            <a:endParaRPr lang="en-US" dirty="0"/>
+          </a:p>
+        </p:txBody>
+      </p:sp>
+      <p:sp>
+        <p:nvSpPr>
+          <p:cNvPr id="3" name="Inhaltsplatzhalter 2">
+            <a:extLst>
+              <a:ext uri="{FF2B5EF4-FFF2-40B4-BE49-F238E27FC236}">
+                <a16:creationId xmlns:a16="http://schemas.microsoft.com/office/drawing/2014/main" id="{DABFB4CD-55BA-4B9D-9388-099CEA4FC0CC}"/>
+              </a:ext>
+            </a:extLst>
+          </p:cNvPr>
+          <p:cNvSpPr>
+            <a:spLocks noGrp="1"/>
+          </p:cNvSpPr>
+          <p:nvPr>
+            <p:ph idx="1"/>
+          </p:nvPr>
+        </p:nvSpPr>
+        <p:spPr/>
+        <p:txBody>
+          <a:bodyPr/>
+          <a:lstStyle/>
+          <a:p>
+            <a:r>
+              <a:rPr lang="en-US" dirty="0"/>
+              <a:t>BLOSUM scores are very small compared to SNAP scores</a:t>
+            </a:r>
+          </a:p>
+          <a:p>
+            <a:pPr marL="0" indent="0">
+              <a:buNone/>
+            </a:pPr>
+            <a:endParaRPr lang="en-US" dirty="0"/>
+          </a:p>
+          <a:p>
+            <a:pPr marL="0" indent="0">
+              <a:buNone/>
+            </a:pPr>
+            <a:endParaRPr lang="en-US" dirty="0"/>
+          </a:p>
+          <a:p>
+            <a:pPr marL="0" indent="0">
+              <a:buNone/>
+            </a:pPr>
+            <a:r>
+              <a:rPr lang="en-US" dirty="0"/>
+              <a:t>[48, -25, 75, -25, 70, -50, 79, -75, 36, -25, 58, 0, 76, -50, 73, -75, 67, </a:t>
+            </a:r>
+          </a:p>
+          <a:p>
+            <a:pPr marL="0" indent="0">
+              <a:buNone/>
+            </a:pPr>
+            <a:r>
+              <a:rPr lang="en-US" dirty="0"/>
+              <a:t>   -50, 15, 33, 24, 66, 76, -25, 0, 0, 30, 0, 79, -50, 65, -25, 62, -25, 68, </a:t>
+            </a:r>
+          </a:p>
+          <a:p>
+            <a:pPr marL="0" indent="0">
+              <a:buNone/>
+            </a:pPr>
+            <a:r>
+              <a:rPr lang="en-US" dirty="0"/>
+              <a:t>   -25, 51, -25, 27, 33]</a:t>
+            </a:r>
+          </a:p>
+        </p:txBody>
+      </p:sp>
+      <p:sp>
+        <p:nvSpPr>
+          <p:cNvPr id="4" name="Foliennummernplatzhalter 3">
+            <a:extLst>
+              <a:ext uri="{FF2B5EF4-FFF2-40B4-BE49-F238E27FC236}">
+                <a16:creationId xmlns:a16="http://schemas.microsoft.com/office/drawing/2014/main" id="{CBB3139C-6890-4543-90A0-FAE3AA3EE102}"/>
+              </a:ext>
+            </a:extLst>
+          </p:cNvPr>
+          <p:cNvSpPr>
+            <a:spLocks noGrp="1"/>
+          </p:cNvSpPr>
+          <p:nvPr>
+            <p:ph type="sldNum" sz="quarter" idx="12"/>
+          </p:nvPr>
+        </p:nvSpPr>
+        <p:spPr/>
+        <p:txBody>
+          <a:bodyPr/>
+          <a:lstStyle/>
+          <a:p>
+            <a:fld id="{CCAAE293-A3DA-4FFC-871C-7F0F209F7CB2}" type="slidenum">
+              <a:rPr lang="en-US" smtClean="0"/>
+              <a:t>4</a:t>
+            </a:fld>
+            <a:endParaRPr lang="en-US"/>
+          </a:p>
+        </p:txBody>
+      </p:sp>
+    </p:spTree>
+    <p:extLst>
+      <p:ext uri="{BB962C8B-B14F-4D97-AF65-F5344CB8AC3E}">
+        <p14:creationId xmlns:p14="http://schemas.microsoft.com/office/powerpoint/2010/main" val="2783528183"/>
+      </p:ext>
+    </p:extLst>
+  </p:cSld>
+  <p:clrMapOvr>
+    <a:masterClrMapping/>
+  </p:clrMapOvr>
+</p:sld>
+</file>
+
+<file path=ppt/slides/slide5.xml><?xml version="1.0" encoding="utf-8"?>
+<p:sld xmlns:a="http://schemas.openxmlformats.org/drawingml/2006/main" xmlns:r="http://schemas.openxmlformats.org/officeDocument/2006/relationships" xmlns:p="http://schemas.openxmlformats.org/presentationml/2006/main">
+  <p:cSld>
+    <p:spTree>
+      <p:nvGrpSpPr>
+        <p:cNvPr id="1" name=""/>
+        <p:cNvGrpSpPr/>
+        <p:nvPr/>
+      </p:nvGrpSpPr>
+      <p:grpSpPr>
+        <a:xfrm>
+          <a:off x="0" y="0"/>
+          <a:ext cx="0" cy="0"/>
+          <a:chOff x="0" y="0"/>
+          <a:chExt cx="0" cy="0"/>
+        </a:xfrm>
+      </p:grpSpPr>
+      <p:sp>
+        <p:nvSpPr>
+          <p:cNvPr id="2" name="Titel 1">
+            <a:extLst>
+              <a:ext uri="{FF2B5EF4-FFF2-40B4-BE49-F238E27FC236}">
+                <a16:creationId xmlns:a16="http://schemas.microsoft.com/office/drawing/2014/main" id="{6019DB3D-05C1-487C-84EB-B488DE6B8C90}"/>
+              </a:ext>
+            </a:extLst>
+          </p:cNvPr>
+          <p:cNvSpPr>
+            <a:spLocks noGrp="1"/>
+          </p:cNvSpPr>
+          <p:nvPr>
+            <p:ph type="title"/>
+          </p:nvPr>
+        </p:nvSpPr>
+        <p:spPr/>
+        <p:txBody>
+          <a:bodyPr/>
+          <a:lstStyle/>
+          <a:p>
+            <a:pPr algn="ctr"/>
+            <a:r>
+              <a:rPr lang="de-DE" dirty="0"/>
+              <a:t>Distribution </a:t>
+            </a:r>
+            <a:r>
+              <a:rPr lang="de-DE" dirty="0" err="1"/>
+              <a:t>of</a:t>
+            </a:r>
+            <a:r>
+              <a:rPr lang="de-DE" dirty="0"/>
+              <a:t> </a:t>
+            </a:r>
+            <a:r>
+              <a:rPr lang="de-DE" dirty="0" err="1"/>
+              <a:t>scores</a:t>
+            </a:r>
+            <a:endParaRPr lang="en-US" dirty="0"/>
+          </a:p>
+        </p:txBody>
+      </p:sp>
+      <p:pic>
+        <p:nvPicPr>
+          <p:cNvPr id="11" name="Inhaltsplatzhalter 10" descr="Ein Bild, das Screenshot enthält.&#10;&#10;Automatisch generierte Beschreibung">
+            <a:extLst>
+              <a:ext uri="{FF2B5EF4-FFF2-40B4-BE49-F238E27FC236}">
+                <a16:creationId xmlns:a16="http://schemas.microsoft.com/office/drawing/2014/main" id="{98F218A4-E584-4C5A-8A10-3838E334E267}"/>
+              </a:ext>
+            </a:extLst>
+          </p:cNvPr>
+          <p:cNvPicPr>
+            <a:picLocks noGrp="1" noChangeAspect="1"/>
+          </p:cNvPicPr>
+          <p:nvPr>
+            <p:ph sz="half" idx="2"/>
+          </p:nvPr>
+        </p:nvPicPr>
+        <p:blipFill>
+          <a:blip r:embed="rId2">
+            <a:extLst>
+              <a:ext uri="{28A0092B-C50C-407E-A947-70E740481C1C}">
+                <a14:useLocalDpi xmlns:a14="http://schemas.microsoft.com/office/drawing/2010/main" val="0"/>
+              </a:ext>
+            </a:extLst>
+          </a:blip>
+          <a:stretch>
+            <a:fillRect/>
+          </a:stretch>
+        </p:blipFill>
+        <p:spPr>
+          <a:xfrm>
+            <a:off x="6172200" y="2058194"/>
+            <a:ext cx="5181600" cy="3886200"/>
+          </a:xfrm>
+        </p:spPr>
+      </p:pic>
+      <p:sp>
+        <p:nvSpPr>
+          <p:cNvPr id="13" name="Foliennummernplatzhalter 12">
+            <a:extLst>
+              <a:ext uri="{FF2B5EF4-FFF2-40B4-BE49-F238E27FC236}">
+                <a16:creationId xmlns:a16="http://schemas.microsoft.com/office/drawing/2014/main" id="{9AB9A42C-1858-4BAA-ACA3-234429D562F4}"/>
+              </a:ext>
+            </a:extLst>
+          </p:cNvPr>
+          <p:cNvSpPr>
+            <a:spLocks noGrp="1"/>
+          </p:cNvSpPr>
+          <p:nvPr>
+            <p:ph type="sldNum" sz="quarter" idx="12"/>
+          </p:nvPr>
+        </p:nvSpPr>
+        <p:spPr/>
+        <p:txBody>
+          <a:bodyPr/>
+          <a:lstStyle/>
+          <a:p>
+            <a:fld id="{CCAAE293-A3DA-4FFC-871C-7F0F209F7CB2}" type="slidenum">
+              <a:rPr lang="en-US" smtClean="0"/>
+              <a:t>5</a:t>
+            </a:fld>
+            <a:endParaRPr lang="en-US"/>
+          </a:p>
+        </p:txBody>
+      </p:sp>
+      <p:pic>
+        <p:nvPicPr>
+          <p:cNvPr id="9" name="Inhaltsplatzhalter 8" descr="Ein Bild, das Screenshot enthält.&#10;&#10;Automatisch generierte Beschreibung">
+            <a:extLst>
+              <a:ext uri="{FF2B5EF4-FFF2-40B4-BE49-F238E27FC236}">
+                <a16:creationId xmlns:a16="http://schemas.microsoft.com/office/drawing/2014/main" id="{C805BA6A-2D70-47A9-8E99-1F3417F791C1}"/>
+              </a:ext>
+            </a:extLst>
+          </p:cNvPr>
+          <p:cNvPicPr>
+            <a:picLocks noGrp="1" noChangeAspect="1"/>
+          </p:cNvPicPr>
+          <p:nvPr>
+            <p:ph sz="half" idx="1"/>
+          </p:nvPr>
+        </p:nvPicPr>
+        <p:blipFill>
+          <a:blip r:embed="rId3">
+            <a:extLst>
+              <a:ext uri="{28A0092B-C50C-407E-A947-70E740481C1C}">
+                <a14:useLocalDpi xmlns:a14="http://schemas.microsoft.com/office/drawing/2010/main" val="0"/>
+              </a:ext>
+            </a:extLst>
+          </a:blip>
+          <a:stretch>
+            <a:fillRect/>
+          </a:stretch>
+        </p:blipFill>
+        <p:spPr>
+          <a:xfrm>
+            <a:off x="838200" y="2058194"/>
+            <a:ext cx="5181600" cy="3886200"/>
+          </a:xfrm>
+        </p:spPr>
+      </p:pic>
+    </p:spTree>
+    <p:extLst>
+      <p:ext uri="{BB962C8B-B14F-4D97-AF65-F5344CB8AC3E}">
+        <p14:creationId xmlns:p14="http://schemas.microsoft.com/office/powerpoint/2010/main" val="498417232"/>
+      </p:ext>
+    </p:extLst>
+  </p:cSld>
+  <p:clrMapOvr>
+    <a:masterClrMapping/>
+  </p:clrMapOvr>
+</p:sld>
+</file>
+
+<file path=ppt/slides/slide6.xml><?xml version="1.0" encoding="utf-8"?>
+<p:sld xmlns:a="http://schemas.openxmlformats.org/drawingml/2006/main" xmlns:r="http://schemas.openxmlformats.org/officeDocument/2006/relationships" xmlns:p="http://schemas.openxmlformats.org/presentationml/2006/main">
+  <p:cSld>
+    <p:spTree>
+      <p:nvGrpSpPr>
+        <p:cNvPr id="1" name=""/>
+        <p:cNvGrpSpPr/>
+        <p:nvPr/>
+      </p:nvGrpSpPr>
+      <p:grpSpPr>
+        <a:xfrm>
+          <a:off x="0" y="0"/>
+          <a:ext cx="0" cy="0"/>
+          <a:chOff x="0" y="0"/>
+          <a:chExt cx="0" cy="0"/>
+        </a:xfrm>
+      </p:grpSpPr>
+      <p:sp>
+        <p:nvSpPr>
+          <p:cNvPr id="6" name="Titel 5">
+            <a:extLst>
+              <a:ext uri="{FF2B5EF4-FFF2-40B4-BE49-F238E27FC236}">
+                <a16:creationId xmlns:a16="http://schemas.microsoft.com/office/drawing/2014/main" id="{C2F4D9AB-ECE1-4815-911C-FC8E234DA8C2}"/>
+              </a:ext>
+            </a:extLst>
+          </p:cNvPr>
+          <p:cNvSpPr>
+            <a:spLocks noGrp="1"/>
+          </p:cNvSpPr>
+          <p:nvPr>
+            <p:ph type="title"/>
+          </p:nvPr>
+        </p:nvSpPr>
+        <p:spPr/>
+        <p:txBody>
+          <a:bodyPr/>
+          <a:lstStyle/>
+          <a:p>
+            <a:pPr algn="ctr"/>
+            <a:r>
+              <a:rPr lang="de-DE" dirty="0" err="1"/>
+              <a:t>Algorithm</a:t>
+            </a:r>
+            <a:endParaRPr lang="en-US" dirty="0"/>
+          </a:p>
+        </p:txBody>
+      </p:sp>
+      <p:sp>
+        <p:nvSpPr>
+          <p:cNvPr id="7" name="Inhaltsplatzhalter 6">
+            <a:extLst>
+              <a:ext uri="{FF2B5EF4-FFF2-40B4-BE49-F238E27FC236}">
+                <a16:creationId xmlns:a16="http://schemas.microsoft.com/office/drawing/2014/main" id="{9C5E56EF-BBBF-4283-AADE-6481E86CC294}"/>
+              </a:ext>
+            </a:extLst>
+          </p:cNvPr>
+          <p:cNvSpPr>
+            <a:spLocks noGrp="1"/>
+          </p:cNvSpPr>
+          <p:nvPr>
+            <p:ph idx="1"/>
+          </p:nvPr>
+        </p:nvSpPr>
+        <p:spPr/>
+        <p:txBody>
+          <a:bodyPr/>
+          <a:lstStyle/>
+          <a:p>
+            <a:r>
+              <a:rPr lang="de-DE" dirty="0"/>
+              <a:t>Single </a:t>
+            </a:r>
+            <a:r>
+              <a:rPr lang="de-DE" dirty="0" err="1"/>
+              <a:t>layer</a:t>
+            </a:r>
+            <a:r>
+              <a:rPr lang="de-DE" dirty="0"/>
+              <a:t> ANN</a:t>
+            </a:r>
+          </a:p>
+          <a:p>
+            <a:pPr marL="0" indent="0">
+              <a:buNone/>
+            </a:pPr>
+            <a:endParaRPr lang="de-DE" dirty="0"/>
+          </a:p>
+          <a:p>
+            <a:r>
+              <a:rPr lang="de-DE" dirty="0"/>
+              <a:t>40 </a:t>
+            </a:r>
+            <a:r>
+              <a:rPr lang="de-DE" dirty="0" err="1"/>
+              <a:t>input</a:t>
+            </a:r>
+            <a:r>
+              <a:rPr lang="de-DE" dirty="0"/>
+              <a:t> </a:t>
+            </a:r>
+            <a:r>
+              <a:rPr lang="de-DE" dirty="0" err="1"/>
+              <a:t>units</a:t>
+            </a:r>
+            <a:r>
+              <a:rPr lang="de-DE" dirty="0"/>
+              <a:t>, 1 </a:t>
+            </a:r>
+            <a:r>
+              <a:rPr lang="de-DE" dirty="0" err="1"/>
+              <a:t>output</a:t>
+            </a:r>
+            <a:r>
+              <a:rPr lang="de-DE" dirty="0"/>
+              <a:t> </a:t>
+            </a:r>
+            <a:r>
+              <a:rPr lang="de-DE" dirty="0" err="1"/>
+              <a:t>unit</a:t>
+            </a:r>
+            <a:endParaRPr lang="de-DE" dirty="0"/>
+          </a:p>
+          <a:p>
+            <a:r>
+              <a:rPr lang="de-DE" dirty="0"/>
+              <a:t>200 </a:t>
+            </a:r>
+            <a:r>
+              <a:rPr lang="de-DE" dirty="0" err="1"/>
+              <a:t>hidden</a:t>
+            </a:r>
+            <a:r>
+              <a:rPr lang="de-DE" dirty="0"/>
+              <a:t> </a:t>
+            </a:r>
+            <a:r>
+              <a:rPr lang="de-DE" dirty="0" err="1"/>
+              <a:t>units</a:t>
+            </a:r>
+            <a:endParaRPr lang="de-DE" dirty="0"/>
+          </a:p>
+          <a:p>
+            <a:endParaRPr lang="de-DE" dirty="0"/>
+          </a:p>
+          <a:p>
+            <a:r>
+              <a:rPr lang="de-DE" dirty="0" err="1"/>
+              <a:t>Weigthed</a:t>
+            </a:r>
+            <a:r>
+              <a:rPr lang="de-DE" dirty="0"/>
+              <a:t> </a:t>
+            </a:r>
+            <a:r>
+              <a:rPr lang="de-DE" dirty="0" err="1"/>
+              <a:t>loss</a:t>
+            </a:r>
+            <a:endParaRPr lang="de-DE" dirty="0"/>
+          </a:p>
+        </p:txBody>
+      </p:sp>
+      <p:sp>
+        <p:nvSpPr>
+          <p:cNvPr id="5" name="Foliennummernplatzhalter 4">
+            <a:extLst>
+              <a:ext uri="{FF2B5EF4-FFF2-40B4-BE49-F238E27FC236}">
+                <a16:creationId xmlns:a16="http://schemas.microsoft.com/office/drawing/2014/main" id="{C48CAD59-3574-40C3-9200-27CBA16B4671}"/>
+              </a:ext>
+            </a:extLst>
+          </p:cNvPr>
+          <p:cNvSpPr>
+            <a:spLocks noGrp="1"/>
+          </p:cNvSpPr>
+          <p:nvPr>
+            <p:ph type="sldNum" sz="quarter" idx="12"/>
+          </p:nvPr>
+        </p:nvSpPr>
+        <p:spPr/>
+        <p:txBody>
+          <a:bodyPr/>
+          <a:lstStyle/>
+          <a:p>
+            <a:fld id="{CCAAE293-A3DA-4FFC-871C-7F0F209F7CB2}" type="slidenum">
+              <a:rPr lang="en-US" smtClean="0"/>
+              <a:t>6</a:t>
+            </a:fld>
+            <a:endParaRPr lang="en-US"/>
+          </a:p>
+        </p:txBody>
+      </p:sp>
+      <p:grpSp>
+        <p:nvGrpSpPr>
+          <p:cNvPr id="10" name="Gruppieren 9">
+            <a:extLst>
+              <a:ext uri="{FF2B5EF4-FFF2-40B4-BE49-F238E27FC236}">
+                <a16:creationId xmlns:a16="http://schemas.microsoft.com/office/drawing/2014/main" id="{749007E2-E5B2-41B4-A07C-CCC8FED2E8C5}"/>
+              </a:ext>
+            </a:extLst>
+          </p:cNvPr>
+          <p:cNvGrpSpPr/>
+          <p:nvPr/>
+        </p:nvGrpSpPr>
+        <p:grpSpPr>
+          <a:xfrm>
+            <a:off x="6640013" y="1357195"/>
+            <a:ext cx="4814455" cy="4625821"/>
+            <a:chOff x="6539345" y="1340417"/>
+            <a:chExt cx="4814455" cy="4625821"/>
+          </a:xfrm>
+        </p:grpSpPr>
+        <p:pic>
+          <p:nvPicPr>
+            <p:cNvPr id="8" name="NetworkExample.png" descr="NetworkExample.png">
+              <a:extLst>
+                <a:ext uri="{FF2B5EF4-FFF2-40B4-BE49-F238E27FC236}">
+                  <a16:creationId xmlns:a16="http://schemas.microsoft.com/office/drawing/2014/main" id="{07E901A6-F9BD-4768-8F41-B5133FB5489D}"/>
+                </a:ext>
+              </a:extLst>
+            </p:cNvPr>
+            <p:cNvPicPr>
+              <a:picLocks noChangeAspect="1"/>
+            </p:cNvPicPr>
+            <p:nvPr/>
+          </p:nvPicPr>
+          <p:blipFill>
+            <a:blip r:embed="rId2"/>
+            <a:stretch>
+              <a:fillRect/>
+            </a:stretch>
+          </p:blipFill>
+          <p:spPr>
+            <a:xfrm>
+              <a:off x="6630917" y="1646238"/>
+              <a:ext cx="4343437" cy="4320000"/>
+            </a:xfrm>
+            <a:prstGeom prst="rect">
+              <a:avLst/>
+            </a:prstGeom>
+            <a:ln w="12700">
+              <a:miter lim="400000"/>
+            </a:ln>
+          </p:spPr>
+        </p:pic>
+        <p:sp>
+          <p:nvSpPr>
+            <p:cNvPr id="2" name="Textfeld 1">
+              <a:extLst>
+                <a:ext uri="{FF2B5EF4-FFF2-40B4-BE49-F238E27FC236}">
+                  <a16:creationId xmlns:a16="http://schemas.microsoft.com/office/drawing/2014/main" id="{2EC9F021-62B5-4C66-87FF-E10A10409799}"/>
+                </a:ext>
+              </a:extLst>
+            </p:cNvPr>
+            <p:cNvSpPr txBox="1"/>
+            <p:nvPr/>
+          </p:nvSpPr>
+          <p:spPr>
+            <a:xfrm>
+              <a:off x="10402455" y="3146930"/>
+              <a:ext cx="951345" cy="371764"/>
+            </a:xfrm>
+            <a:prstGeom prst="rect">
+              <a:avLst/>
+            </a:prstGeom>
+            <a:noFill/>
+          </p:spPr>
+          <p:txBody>
+            <a:bodyPr wrap="square" rtlCol="0">
+              <a:spAutoFit/>
+            </a:bodyPr>
+            <a:lstStyle/>
+            <a:p>
+              <a:r>
+                <a:rPr lang="de-DE" dirty="0"/>
+                <a:t>[0, 1]</a:t>
+              </a:r>
+            </a:p>
+          </p:txBody>
+        </p:sp>
+        <p:sp>
+          <p:nvSpPr>
+            <p:cNvPr id="3" name="Textfeld 2">
+              <a:extLst>
+                <a:ext uri="{FF2B5EF4-FFF2-40B4-BE49-F238E27FC236}">
+                  <a16:creationId xmlns:a16="http://schemas.microsoft.com/office/drawing/2014/main" id="{698B642F-A9AC-4C9D-8BAA-A4540084A686}"/>
+                </a:ext>
+              </a:extLst>
+            </p:cNvPr>
+            <p:cNvSpPr txBox="1"/>
+            <p:nvPr/>
+          </p:nvSpPr>
+          <p:spPr>
+            <a:xfrm>
+              <a:off x="6779491" y="2429164"/>
+              <a:ext cx="480291" cy="369332"/>
+            </a:xfrm>
+            <a:prstGeom prst="rect">
+              <a:avLst/>
+            </a:prstGeom>
+            <a:noFill/>
+          </p:spPr>
+          <p:txBody>
+            <a:bodyPr wrap="square" rtlCol="0">
+              <a:spAutoFit/>
+            </a:bodyPr>
+            <a:lstStyle/>
+            <a:p>
+              <a:r>
+                <a:rPr lang="de-DE" dirty="0"/>
+                <a:t>40</a:t>
+              </a:r>
+            </a:p>
+          </p:txBody>
+        </p:sp>
+        <p:sp>
+          <p:nvSpPr>
+            <p:cNvPr id="4" name="Textfeld 3">
+              <a:extLst>
+                <a:ext uri="{FF2B5EF4-FFF2-40B4-BE49-F238E27FC236}">
+                  <a16:creationId xmlns:a16="http://schemas.microsoft.com/office/drawing/2014/main" id="{63595A7D-332E-4C0E-96C5-9F46B2DAAB3C}"/>
+                </a:ext>
+              </a:extLst>
+            </p:cNvPr>
+            <p:cNvSpPr txBox="1"/>
+            <p:nvPr/>
+          </p:nvSpPr>
+          <p:spPr>
+            <a:xfrm>
+              <a:off x="8451649" y="1340417"/>
+              <a:ext cx="627695" cy="369332"/>
+            </a:xfrm>
+            <a:prstGeom prst="rect">
+              <a:avLst/>
+            </a:prstGeom>
+            <a:noFill/>
+          </p:spPr>
+          <p:txBody>
+            <a:bodyPr wrap="square" rtlCol="0">
+              <a:spAutoFit/>
+            </a:bodyPr>
+            <a:lstStyle/>
+            <a:p>
+              <a:r>
+                <a:rPr lang="de-DE" dirty="0"/>
+                <a:t>200</a:t>
+              </a:r>
+            </a:p>
+          </p:txBody>
+        </p:sp>
+        <p:sp>
+          <p:nvSpPr>
+            <p:cNvPr id="9" name="Textfeld 8">
+              <a:extLst>
+                <a:ext uri="{FF2B5EF4-FFF2-40B4-BE49-F238E27FC236}">
+                  <a16:creationId xmlns:a16="http://schemas.microsoft.com/office/drawing/2014/main" id="{745455BE-4861-43FB-9C3D-856DEE3D724F}"/>
+                </a:ext>
+              </a:extLst>
+            </p:cNvPr>
+            <p:cNvSpPr txBox="1"/>
+            <p:nvPr/>
+          </p:nvSpPr>
+          <p:spPr>
+            <a:xfrm>
+              <a:off x="6539345" y="2871147"/>
+              <a:ext cx="480291" cy="1277273"/>
+            </a:xfrm>
+            <a:prstGeom prst="rect">
+              <a:avLst/>
+            </a:prstGeom>
+            <a:noFill/>
+          </p:spPr>
+          <p:txBody>
+            <a:bodyPr wrap="square" rtlCol="0">
+              <a:spAutoFit/>
+            </a:bodyPr>
+            <a:lstStyle/>
+            <a:p>
+              <a:r>
+                <a:rPr lang="de-DE" sz="1100" dirty="0"/>
+                <a:t> 48</a:t>
+              </a:r>
+            </a:p>
+            <a:p>
+              <a:r>
+                <a:rPr lang="de-DE" sz="1100" dirty="0"/>
+                <a:t>-25</a:t>
+              </a:r>
+            </a:p>
+            <a:p>
+              <a:r>
+                <a:rPr lang="de-DE" sz="1100" dirty="0"/>
+                <a:t> 75</a:t>
+              </a:r>
+            </a:p>
+            <a:p>
+              <a:r>
+                <a:rPr lang="de-DE" sz="1100" dirty="0"/>
+                <a:t>-25</a:t>
+              </a:r>
+            </a:p>
+            <a:p>
+              <a:r>
+                <a:rPr lang="de-DE" sz="1100" dirty="0"/>
+                <a:t>  :</a:t>
+              </a:r>
+            </a:p>
+            <a:p>
+              <a:r>
+                <a:rPr lang="de-DE" sz="1100" dirty="0"/>
+                <a:t>  :</a:t>
+              </a:r>
+            </a:p>
+            <a:p>
+              <a:r>
+                <a:rPr lang="de-DE" sz="1100" dirty="0"/>
+                <a:t>  :</a:t>
+              </a:r>
+            </a:p>
+          </p:txBody>
+        </p:sp>
+      </p:grpSp>
+    </p:spTree>
+    <p:extLst>
+      <p:ext uri="{BB962C8B-B14F-4D97-AF65-F5344CB8AC3E}">
+        <p14:creationId xmlns:p14="http://schemas.microsoft.com/office/powerpoint/2010/main" val="396671851"/>
+      </p:ext>
+    </p:extLst>
+  </p:cSld>
+  <p:clrMapOvr>
+    <a:masterClrMapping/>
+  </p:clrMapOvr>
+</p:sld>
+</file>
+
+<file path=ppt/slides/slide7.xml><?xml version="1.0" encoding="utf-8"?>
+<p:sld xmlns:a="http://schemas.openxmlformats.org/drawingml/2006/main" xmlns:r="http://schemas.openxmlformats.org/officeDocument/2006/relationships" xmlns:p="http://schemas.openxmlformats.org/presentationml/2006/main">
+  <p:cSld>
+    <p:spTree>
+      <p:nvGrpSpPr>
+        <p:cNvPr id="1" name=""/>
+        <p:cNvGrpSpPr/>
+        <p:nvPr/>
+      </p:nvGrpSpPr>
+      <p:grpSpPr>
+        <a:xfrm>
+          <a:off x="0" y="0"/>
+          <a:ext cx="0" cy="0"/>
+          <a:chOff x="0" y="0"/>
+          <a:chExt cx="0" cy="0"/>
+        </a:xfrm>
+      </p:grpSpPr>
+      <p:sp>
+        <p:nvSpPr>
+          <p:cNvPr id="2" name="Titel 1">
+            <a:extLst>
+              <a:ext uri="{FF2B5EF4-FFF2-40B4-BE49-F238E27FC236}">
+                <a16:creationId xmlns:a16="http://schemas.microsoft.com/office/drawing/2014/main" id="{90DA7BD1-7036-4062-A3E7-109EE85AC270}"/>
+              </a:ext>
+            </a:extLst>
+          </p:cNvPr>
+          <p:cNvSpPr>
+            <a:spLocks noGrp="1"/>
+          </p:cNvSpPr>
+          <p:nvPr>
+            <p:ph type="title"/>
+          </p:nvPr>
+        </p:nvSpPr>
+        <p:spPr/>
+        <p:txBody>
+          <a:bodyPr/>
+          <a:lstStyle/>
+          <a:p>
+            <a:pPr algn="ctr"/>
+            <a:r>
+              <a:rPr lang="de-DE" dirty="0"/>
+              <a:t>Hyperparameter</a:t>
+            </a:r>
+            <a:endParaRPr lang="en-US" dirty="0"/>
+          </a:p>
+        </p:txBody>
+      </p:sp>
+      <p:sp>
+        <p:nvSpPr>
+          <p:cNvPr id="3" name="Inhaltsplatzhalter 2">
+            <a:extLst>
+              <a:ext uri="{FF2B5EF4-FFF2-40B4-BE49-F238E27FC236}">
+                <a16:creationId xmlns:a16="http://schemas.microsoft.com/office/drawing/2014/main" id="{08A62452-8D0B-487B-BF6E-8C680AB179B6}"/>
+              </a:ext>
+            </a:extLst>
+          </p:cNvPr>
+          <p:cNvSpPr>
+            <a:spLocks noGrp="1"/>
+          </p:cNvSpPr>
+          <p:nvPr>
+            <p:ph idx="1"/>
+          </p:nvPr>
+        </p:nvSpPr>
+        <p:spPr/>
+        <p:txBody>
+          <a:bodyPr>
+            <a:normAutofit lnSpcReduction="10000"/>
+          </a:bodyPr>
+          <a:lstStyle/>
+          <a:p>
+            <a:r>
+              <a:rPr lang="de-DE" dirty="0" err="1"/>
+              <a:t>Weigths</a:t>
+            </a:r>
+            <a:r>
+              <a:rPr lang="de-DE" dirty="0"/>
+              <a:t>: Binding 0.6; Non-</a:t>
+            </a:r>
+            <a:r>
+              <a:rPr lang="de-DE" dirty="0" err="1"/>
+              <a:t>binding</a:t>
+            </a:r>
+            <a:r>
+              <a:rPr lang="de-DE" dirty="0"/>
+              <a:t> 0.4</a:t>
+            </a:r>
+          </a:p>
+          <a:p>
+            <a:endParaRPr lang="de-DE" dirty="0"/>
+          </a:p>
+          <a:p>
+            <a:r>
+              <a:rPr lang="de-DE" dirty="0"/>
+              <a:t>Learning rate: 0.003</a:t>
+            </a:r>
+          </a:p>
+          <a:p>
+            <a:endParaRPr lang="de-DE" dirty="0"/>
+          </a:p>
+          <a:p>
+            <a:r>
+              <a:rPr lang="de-DE" dirty="0" err="1"/>
+              <a:t>Prediction</a:t>
+            </a:r>
+            <a:r>
+              <a:rPr lang="de-DE" dirty="0"/>
+              <a:t> </a:t>
+            </a:r>
+            <a:r>
+              <a:rPr lang="de-DE" dirty="0" err="1"/>
+              <a:t>Cutoff</a:t>
+            </a:r>
+            <a:r>
+              <a:rPr lang="de-DE" dirty="0"/>
+              <a:t>: 0.4</a:t>
+            </a:r>
+          </a:p>
+          <a:p>
+            <a:endParaRPr lang="de-DE" dirty="0"/>
+          </a:p>
+          <a:p>
+            <a:r>
+              <a:rPr lang="de-DE" dirty="0"/>
+              <a:t>Momentum: 0.9</a:t>
+            </a:r>
+          </a:p>
+          <a:p>
+            <a:endParaRPr lang="de-DE" dirty="0"/>
+          </a:p>
+          <a:p>
+            <a:r>
+              <a:rPr lang="de-DE" dirty="0" err="1"/>
+              <a:t>Epochs</a:t>
+            </a:r>
+            <a:r>
+              <a:rPr lang="de-DE" dirty="0"/>
+              <a:t>: 200</a:t>
+            </a:r>
+            <a:endParaRPr lang="en-US" dirty="0"/>
+          </a:p>
+        </p:txBody>
+      </p:sp>
+      <p:sp>
+        <p:nvSpPr>
+          <p:cNvPr id="4" name="Foliennummernplatzhalter 3">
+            <a:extLst>
+              <a:ext uri="{FF2B5EF4-FFF2-40B4-BE49-F238E27FC236}">
+                <a16:creationId xmlns:a16="http://schemas.microsoft.com/office/drawing/2014/main" id="{5BC1D8A0-0EDC-4692-8350-8E5C893B0A2A}"/>
+              </a:ext>
+            </a:extLst>
+          </p:cNvPr>
+          <p:cNvSpPr>
+            <a:spLocks noGrp="1"/>
+          </p:cNvSpPr>
+          <p:nvPr>
+            <p:ph type="sldNum" sz="quarter" idx="12"/>
+          </p:nvPr>
+        </p:nvSpPr>
+        <p:spPr/>
+        <p:txBody>
+          <a:bodyPr/>
+          <a:lstStyle/>
+          <a:p>
+            <a:fld id="{CCAAE293-A3DA-4FFC-871C-7F0F209F7CB2}" type="slidenum">
+              <a:rPr lang="en-US" smtClean="0"/>
+              <a:t>7</a:t>
+            </a:fld>
+            <a:endParaRPr lang="en-US"/>
+          </a:p>
+        </p:txBody>
+      </p:sp>
+    </p:spTree>
+    <p:extLst>
+      <p:ext uri="{BB962C8B-B14F-4D97-AF65-F5344CB8AC3E}">
+        <p14:creationId xmlns:p14="http://schemas.microsoft.com/office/powerpoint/2010/main" val="3829208825"/>
+      </p:ext>
+    </p:extLst>
+  </p:cSld>
+  <p:clrMapOvr>
+    <a:masterClrMapping/>
+  </p:clrMapOvr>
+</p:sld>
+</file>
+
+<file path=ppt/slides/slide8.xml><?xml version="1.0" encoding="utf-8"?>
+<p:sld xmlns:a="http://schemas.openxmlformats.org/drawingml/2006/main" xmlns:r="http://schemas.openxmlformats.org/officeDocument/2006/relationships" xmlns:p="http://schemas.openxmlformats.org/presentationml/2006/main">
+  <p:cSld>
+    <p:spTree>
+      <p:nvGrpSpPr>
+        <p:cNvPr id="1" name=""/>
+        <p:cNvGrpSpPr/>
+        <p:nvPr/>
+      </p:nvGrpSpPr>
+      <p:grpSpPr>
+        <a:xfrm>
+          <a:off x="0" y="0"/>
+          <a:ext cx="0" cy="0"/>
+          <a:chOff x="0" y="0"/>
+          <a:chExt cx="0" cy="0"/>
+        </a:xfrm>
+      </p:grpSpPr>
+      <p:sp>
+        <p:nvSpPr>
+          <p:cNvPr id="5" name="Titel 4">
+            <a:extLst>
+              <a:ext uri="{FF2B5EF4-FFF2-40B4-BE49-F238E27FC236}">
+                <a16:creationId xmlns:a16="http://schemas.microsoft.com/office/drawing/2014/main" id="{ACFF07FE-4BFA-4138-9A63-E2152340D587}"/>
+              </a:ext>
+            </a:extLst>
+          </p:cNvPr>
+          <p:cNvSpPr>
+            <a:spLocks noGrp="1"/>
+          </p:cNvSpPr>
+          <p:nvPr>
+            <p:ph type="title"/>
+          </p:nvPr>
+        </p:nvSpPr>
+        <p:spPr/>
+        <p:txBody>
+          <a:bodyPr/>
+          <a:lstStyle/>
+          <a:p>
+            <a:pPr algn="ctr"/>
+            <a:r>
+              <a:rPr lang="de-DE" dirty="0"/>
+              <a:t>Hyperparameter: Grid </a:t>
+            </a:r>
+            <a:r>
+              <a:rPr lang="de-DE" dirty="0" err="1"/>
+              <a:t>search</a:t>
+            </a:r>
+            <a:endParaRPr lang="de-DE" dirty="0"/>
+          </a:p>
+        </p:txBody>
+      </p:sp>
+      <p:pic>
+        <p:nvPicPr>
+          <p:cNvPr id="8" name="Inhaltsplatzhalter 7">
+            <a:extLst>
+              <a:ext uri="{FF2B5EF4-FFF2-40B4-BE49-F238E27FC236}">
+                <a16:creationId xmlns:a16="http://schemas.microsoft.com/office/drawing/2014/main" id="{DD13C4F1-21ED-4973-B770-7D5C0CD37A89}"/>
+              </a:ext>
+            </a:extLst>
+          </p:cNvPr>
+          <p:cNvPicPr>
+            <a:picLocks noGrp="1" noChangeAspect="1"/>
+          </p:cNvPicPr>
+          <p:nvPr>
+            <p:ph sz="half" idx="1"/>
+          </p:nvPr>
+        </p:nvPicPr>
+        <p:blipFill>
+          <a:blip r:embed="rId2"/>
+          <a:stretch>
+            <a:fillRect/>
+          </a:stretch>
+        </p:blipFill>
+        <p:spPr>
+          <a:xfrm>
+            <a:off x="1249491" y="2053453"/>
+            <a:ext cx="4359018" cy="3895682"/>
+          </a:xfrm>
+          <a:prstGeom prst="rect">
+            <a:avLst/>
+          </a:prstGeom>
+        </p:spPr>
+      </p:pic>
+      <p:pic>
+        <p:nvPicPr>
+          <p:cNvPr id="9" name="Inhaltsplatzhalter 8">
+            <a:extLst>
+              <a:ext uri="{FF2B5EF4-FFF2-40B4-BE49-F238E27FC236}">
+                <a16:creationId xmlns:a16="http://schemas.microsoft.com/office/drawing/2014/main" id="{D9478754-314A-47F3-8298-65235AA2C335}"/>
+              </a:ext>
+            </a:extLst>
+          </p:cNvPr>
+          <p:cNvPicPr>
+            <a:picLocks noGrp="1" noChangeAspect="1"/>
+          </p:cNvPicPr>
+          <p:nvPr>
+            <p:ph sz="half" idx="2"/>
+          </p:nvPr>
+        </p:nvPicPr>
+        <p:blipFill>
+          <a:blip r:embed="rId3"/>
+          <a:stretch>
+            <a:fillRect/>
+          </a:stretch>
+        </p:blipFill>
+        <p:spPr>
+          <a:xfrm>
+            <a:off x="6644456" y="2108322"/>
+            <a:ext cx="4237087" cy="3785944"/>
+          </a:xfrm>
+          <a:prstGeom prst="rect">
+            <a:avLst/>
+          </a:prstGeom>
+        </p:spPr>
+      </p:pic>
+      <p:sp>
+        <p:nvSpPr>
+          <p:cNvPr id="4" name="Foliennummernplatzhalter 3">
+            <a:extLst>
+              <a:ext uri="{FF2B5EF4-FFF2-40B4-BE49-F238E27FC236}">
+                <a16:creationId xmlns:a16="http://schemas.microsoft.com/office/drawing/2014/main" id="{41274183-5DF6-42AA-9AF2-97B73CC23AA2}"/>
+              </a:ext>
+            </a:extLst>
+          </p:cNvPr>
+          <p:cNvSpPr>
+            <a:spLocks noGrp="1"/>
+          </p:cNvSpPr>
+          <p:nvPr>
+            <p:ph type="sldNum" sz="quarter" idx="12"/>
+          </p:nvPr>
+        </p:nvSpPr>
+        <p:spPr/>
+        <p:txBody>
+          <a:bodyPr/>
+          <a:lstStyle/>
+          <a:p>
+            <a:fld id="{CCAAE293-A3DA-4FFC-871C-7F0F209F7CB2}" type="slidenum">
+              <a:rPr lang="en-US" smtClean="0"/>
+              <a:t>8</a:t>
+            </a:fld>
+            <a:endParaRPr lang="en-US"/>
+          </a:p>
+        </p:txBody>
+      </p:sp>
+    </p:spTree>
+    <p:extLst>
+      <p:ext uri="{BB962C8B-B14F-4D97-AF65-F5344CB8AC3E}">
+        <p14:creationId xmlns:p14="http://schemas.microsoft.com/office/powerpoint/2010/main" val="1355063638"/>
+      </p:ext>
+    </p:extLst>
+  </p:cSld>
+  <p:clrMapOvr>
+    <a:masterClrMapping/>
+  </p:clrMapOvr>
+</p:sld>
+</file>
+
+<file path=ppt/slides/slide9.xml><?xml version="1.0" encoding="utf-8"?>
+<p:sld xmlns:a="http://schemas.openxmlformats.org/drawingml/2006/main" xmlns:r="http://schemas.openxmlformats.org/officeDocument/2006/relationships" xmlns:p="http://schemas.openxmlformats.org/presentationml/2006/main">
+  <p:cSld>
+    <p:spTree>
+      <p:nvGrpSpPr>
+        <p:cNvPr id="1" name=""/>
+        <p:cNvGrpSpPr/>
+        <p:nvPr/>
+      </p:nvGrpSpPr>
+      <p:grpSpPr>
+        <a:xfrm>
+          <a:off x="0" y="0"/>
+          <a:ext cx="0" cy="0"/>
+          <a:chOff x="0" y="0"/>
+          <a:chExt cx="0" cy="0"/>
+        </a:xfrm>
+      </p:grpSpPr>
+      <p:sp>
+        <p:nvSpPr>
+          <p:cNvPr id="2" name="Titel 1">
+            <a:extLst>
+              <a:ext uri="{FF2B5EF4-FFF2-40B4-BE49-F238E27FC236}">
+                <a16:creationId xmlns:a16="http://schemas.microsoft.com/office/drawing/2014/main" id="{5E3917E8-C5E2-4F20-AEFC-8A7FF8A5F443}"/>
+              </a:ext>
+            </a:extLst>
+          </p:cNvPr>
+          <p:cNvSpPr>
+            <a:spLocks noGrp="1"/>
+          </p:cNvSpPr>
+          <p:nvPr>
+            <p:ph type="title"/>
+          </p:nvPr>
+        </p:nvSpPr>
+        <p:spPr/>
+        <p:txBody>
+          <a:bodyPr/>
+          <a:lstStyle/>
+          <a:p>
+            <a:pPr algn="ctr"/>
+            <a:r>
+              <a:rPr lang="de-DE" dirty="0"/>
+              <a:t>Hyperparameter: Grid </a:t>
+            </a:r>
+            <a:r>
+              <a:rPr lang="de-DE" dirty="0" err="1"/>
+              <a:t>search</a:t>
+            </a:r>
+            <a:endParaRPr lang="de-DE" dirty="0"/>
+          </a:p>
+        </p:txBody>
+      </p:sp>
+      <p:sp>
+        <p:nvSpPr>
+          <p:cNvPr id="5" name="Foliennummernplatzhalter 4">
+            <a:extLst>
+              <a:ext uri="{FF2B5EF4-FFF2-40B4-BE49-F238E27FC236}">
+                <a16:creationId xmlns:a16="http://schemas.microsoft.com/office/drawing/2014/main" id="{80A4DD8A-DF34-4E71-A690-0584852C452E}"/>
+              </a:ext>
+            </a:extLst>
+          </p:cNvPr>
+          <p:cNvSpPr>
+            <a:spLocks noGrp="1"/>
+          </p:cNvSpPr>
+          <p:nvPr>
+            <p:ph type="sldNum" sz="quarter" idx="12"/>
+          </p:nvPr>
+        </p:nvSpPr>
+        <p:spPr/>
+        <p:txBody>
+          <a:bodyPr/>
+          <a:lstStyle/>
+          <a:p>
+            <a:fld id="{CCAAE293-A3DA-4FFC-871C-7F0F209F7CB2}" type="slidenum">
+              <a:rPr lang="en-US" smtClean="0"/>
+              <a:t>9</a:t>
+            </a:fld>
+            <a:endParaRPr lang="en-US"/>
+          </a:p>
+        </p:txBody>
+      </p:sp>
+      <p:pic>
+        <p:nvPicPr>
+          <p:cNvPr id="6" name="WeightBinding.png" descr="WeightBinding.png">
+            <a:extLst>
+              <a:ext uri="{FF2B5EF4-FFF2-40B4-BE49-F238E27FC236}">
+                <a16:creationId xmlns:a16="http://schemas.microsoft.com/office/drawing/2014/main" id="{995238E6-4187-49DE-AE67-1E369E0B7125}"/>
+              </a:ext>
+            </a:extLst>
+          </p:cNvPr>
+          <p:cNvPicPr>
+            <a:picLocks noGrp="1" noChangeAspect="1"/>
+          </p:cNvPicPr>
+          <p:nvPr>
+            <p:ph sz="half" idx="1"/>
+          </p:nvPr>
+        </p:nvPicPr>
+        <p:blipFill>
+          <a:blip r:embed="rId2"/>
+          <a:stretch>
+            <a:fillRect/>
+          </a:stretch>
+        </p:blipFill>
+        <p:spPr>
+          <a:xfrm>
+            <a:off x="838200" y="2631408"/>
+            <a:ext cx="5181600" cy="2739771"/>
+          </a:xfrm>
+          <a:prstGeom prst="rect">
+            <a:avLst/>
+          </a:prstGeom>
+          <a:ln w="12700">
+            <a:miter lim="400000"/>
+          </a:ln>
+        </p:spPr>
+      </p:pic>
+      <p:pic>
+        <p:nvPicPr>
+          <p:cNvPr id="7" name="WeighNonBinding.png" descr="WeighNonBinding.png">
+            <a:extLst>
+              <a:ext uri="{FF2B5EF4-FFF2-40B4-BE49-F238E27FC236}">
+                <a16:creationId xmlns:a16="http://schemas.microsoft.com/office/drawing/2014/main" id="{077F4CB1-D396-4B8F-B6E9-6E47A270E277}"/>
+              </a:ext>
+            </a:extLst>
+          </p:cNvPr>
+          <p:cNvPicPr>
+            <a:picLocks noGrp="1" noChangeAspect="1"/>
+          </p:cNvPicPr>
+          <p:nvPr>
+            <p:ph sz="half" idx="2"/>
+          </p:nvPr>
+        </p:nvPicPr>
+        <p:blipFill>
+          <a:blip r:embed="rId3"/>
+          <a:stretch>
+            <a:fillRect/>
+          </a:stretch>
+        </p:blipFill>
+        <p:spPr>
+          <a:xfrm>
+            <a:off x="6172200" y="2631408"/>
+            <a:ext cx="5181600" cy="2739771"/>
+          </a:xfrm>
+          <a:prstGeom prst="rect">
+            <a:avLst/>
+          </a:prstGeom>
+          <a:ln w="12700">
+            <a:miter lim="400000"/>
+          </a:ln>
+        </p:spPr>
+      </p:pic>
+    </p:spTree>
+    <p:extLst>
+      <p:ext uri="{BB962C8B-B14F-4D97-AF65-F5344CB8AC3E}">
+        <p14:creationId xmlns:p14="http://schemas.microsoft.com/office/powerpoint/2010/main" val="3437600055"/>
       </p:ext>
     </p:extLst>
   </p:cSld>

</xml_diff>

<commit_message>
fixed Distribution of blosumscores
</commit_message>
<xml_diff>
--- a/BLOSUM_scorescompared to single SNAP scores.pptx
+++ b/BLOSUM_scorescompared to single SNAP scores.pptx
@@ -5,26 +5,27 @@
     <p:sldMasterId id="2147483648" r:id="rId1"/>
   </p:sldMasterIdLst>
   <p:notesMasterIdLst>
-    <p:notesMasterId r:id="rId19"/>
+    <p:notesMasterId r:id="rId20"/>
   </p:notesMasterIdLst>
   <p:sldIdLst>
     <p:sldId id="256" r:id="rId2"/>
     <p:sldId id="272" r:id="rId3"/>
-    <p:sldId id="259" r:id="rId4"/>
-    <p:sldId id="260" r:id="rId5"/>
-    <p:sldId id="261" r:id="rId6"/>
-    <p:sldId id="258" r:id="rId7"/>
-    <p:sldId id="262" r:id="rId8"/>
-    <p:sldId id="263" r:id="rId9"/>
-    <p:sldId id="268" r:id="rId10"/>
-    <p:sldId id="269" r:id="rId11"/>
-    <p:sldId id="270" r:id="rId12"/>
-    <p:sldId id="271" r:id="rId13"/>
-    <p:sldId id="264" r:id="rId14"/>
-    <p:sldId id="257" r:id="rId15"/>
-    <p:sldId id="267" r:id="rId16"/>
-    <p:sldId id="266" r:id="rId17"/>
-    <p:sldId id="265" r:id="rId18"/>
+    <p:sldId id="273" r:id="rId4"/>
+    <p:sldId id="258" r:id="rId5"/>
+    <p:sldId id="259" r:id="rId6"/>
+    <p:sldId id="260" r:id="rId7"/>
+    <p:sldId id="261" r:id="rId8"/>
+    <p:sldId id="262" r:id="rId9"/>
+    <p:sldId id="263" r:id="rId10"/>
+    <p:sldId id="268" r:id="rId11"/>
+    <p:sldId id="269" r:id="rId12"/>
+    <p:sldId id="270" r:id="rId13"/>
+    <p:sldId id="271" r:id="rId14"/>
+    <p:sldId id="264" r:id="rId15"/>
+    <p:sldId id="257" r:id="rId16"/>
+    <p:sldId id="267" r:id="rId17"/>
+    <p:sldId id="266" r:id="rId18"/>
+    <p:sldId id="265" r:id="rId19"/>
   </p:sldIdLst>
   <p:sldSz cx="12192000" cy="6858000"/>
   <p:notesSz cx="6858000" cy="9144000"/>
@@ -4094,10 +4095,10 @@
       </p:grpSpPr>
       <p:sp>
         <p:nvSpPr>
-          <p:cNvPr id="2" name="Titel 1">
-            <a:extLst>
-              <a:ext uri="{FF2B5EF4-FFF2-40B4-BE49-F238E27FC236}">
-                <a16:creationId xmlns:a16="http://schemas.microsoft.com/office/drawing/2014/main" id="{5E3917E8-C5E2-4F20-AEFC-8A7FF8A5F443}"/>
+          <p:cNvPr id="5" name="Titel 4">
+            <a:extLst>
+              <a:ext uri="{FF2B5EF4-FFF2-40B4-BE49-F238E27FC236}">
+                <a16:creationId xmlns:a16="http://schemas.microsoft.com/office/drawing/2014/main" id="{ACFF07FE-4BFA-4138-9A63-E2152340D587}"/>
               </a:ext>
             </a:extLst>
           </p:cNvPr>
@@ -4126,12 +4127,76 @@
           </a:p>
         </p:txBody>
       </p:sp>
-      <p:sp>
-        <p:nvSpPr>
-          <p:cNvPr id="5" name="Foliennummernplatzhalter 4">
-            <a:extLst>
-              <a:ext uri="{FF2B5EF4-FFF2-40B4-BE49-F238E27FC236}">
-                <a16:creationId xmlns:a16="http://schemas.microsoft.com/office/drawing/2014/main" id="{80A4DD8A-DF34-4E71-A690-0584852C452E}"/>
+      <p:pic>
+        <p:nvPicPr>
+          <p:cNvPr id="8" name="Inhaltsplatzhalter 7">
+            <a:extLst>
+              <a:ext uri="{FF2B5EF4-FFF2-40B4-BE49-F238E27FC236}">
+                <a16:creationId xmlns:a16="http://schemas.microsoft.com/office/drawing/2014/main" id="{DD13C4F1-21ED-4973-B770-7D5C0CD37A89}"/>
+              </a:ext>
+            </a:extLst>
+          </p:cNvPr>
+          <p:cNvPicPr>
+            <a:picLocks noGrp="1" noChangeAspect="1"/>
+          </p:cNvPicPr>
+          <p:nvPr>
+            <p:ph sz="half" idx="1"/>
+          </p:nvPr>
+        </p:nvPicPr>
+        <p:blipFill>
+          <a:blip r:embed="rId2"/>
+          <a:stretch>
+            <a:fillRect/>
+          </a:stretch>
+        </p:blipFill>
+        <p:spPr>
+          <a:xfrm>
+            <a:off x="1249491" y="2053453"/>
+            <a:ext cx="4359018" cy="3895682"/>
+          </a:xfrm>
+          <a:prstGeom prst="rect">
+            <a:avLst/>
+          </a:prstGeom>
+        </p:spPr>
+      </p:pic>
+      <p:pic>
+        <p:nvPicPr>
+          <p:cNvPr id="9" name="Inhaltsplatzhalter 8">
+            <a:extLst>
+              <a:ext uri="{FF2B5EF4-FFF2-40B4-BE49-F238E27FC236}">
+                <a16:creationId xmlns:a16="http://schemas.microsoft.com/office/drawing/2014/main" id="{D9478754-314A-47F3-8298-65235AA2C335}"/>
+              </a:ext>
+            </a:extLst>
+          </p:cNvPr>
+          <p:cNvPicPr>
+            <a:picLocks noGrp="1" noChangeAspect="1"/>
+          </p:cNvPicPr>
+          <p:nvPr>
+            <p:ph sz="half" idx="2"/>
+          </p:nvPr>
+        </p:nvPicPr>
+        <p:blipFill>
+          <a:blip r:embed="rId3"/>
+          <a:stretch>
+            <a:fillRect/>
+          </a:stretch>
+        </p:blipFill>
+        <p:spPr>
+          <a:xfrm>
+            <a:off x="6644456" y="2108322"/>
+            <a:ext cx="4237087" cy="3785944"/>
+          </a:xfrm>
+          <a:prstGeom prst="rect">
+            <a:avLst/>
+          </a:prstGeom>
+        </p:spPr>
+      </p:pic>
+      <p:sp>
+        <p:nvSpPr>
+          <p:cNvPr id="4" name="Foliennummernplatzhalter 3">
+            <a:extLst>
+              <a:ext uri="{FF2B5EF4-FFF2-40B4-BE49-F238E27FC236}">
+                <a16:creationId xmlns:a16="http://schemas.microsoft.com/office/drawing/2014/main" id="{41274183-5DF6-42AA-9AF2-97B73CC23AA2}"/>
               </a:ext>
             </a:extLst>
           </p:cNvPr>
@@ -4150,6 +4215,99 @@
             <a:fld id="{CCAAE293-A3DA-4FFC-871C-7F0F209F7CB2}" type="slidenum">
               <a:rPr lang="en-US" smtClean="0"/>
               <a:t>10</a:t>
+            </a:fld>
+            <a:endParaRPr lang="en-US"/>
+          </a:p>
+        </p:txBody>
+      </p:sp>
+    </p:spTree>
+    <p:extLst>
+      <p:ext uri="{BB962C8B-B14F-4D97-AF65-F5344CB8AC3E}">
+        <p14:creationId xmlns:p14="http://schemas.microsoft.com/office/powerpoint/2010/main" val="1355063638"/>
+      </p:ext>
+    </p:extLst>
+  </p:cSld>
+  <p:clrMapOvr>
+    <a:masterClrMapping/>
+  </p:clrMapOvr>
+</p:sld>
+</file>
+
+<file path=ppt/slides/slide11.xml><?xml version="1.0" encoding="utf-8"?>
+<p:sld xmlns:a="http://schemas.openxmlformats.org/drawingml/2006/main" xmlns:r="http://schemas.openxmlformats.org/officeDocument/2006/relationships" xmlns:p="http://schemas.openxmlformats.org/presentationml/2006/main">
+  <p:cSld>
+    <p:spTree>
+      <p:nvGrpSpPr>
+        <p:cNvPr id="1" name=""/>
+        <p:cNvGrpSpPr/>
+        <p:nvPr/>
+      </p:nvGrpSpPr>
+      <p:grpSpPr>
+        <a:xfrm>
+          <a:off x="0" y="0"/>
+          <a:ext cx="0" cy="0"/>
+          <a:chOff x="0" y="0"/>
+          <a:chExt cx="0" cy="0"/>
+        </a:xfrm>
+      </p:grpSpPr>
+      <p:sp>
+        <p:nvSpPr>
+          <p:cNvPr id="2" name="Titel 1">
+            <a:extLst>
+              <a:ext uri="{FF2B5EF4-FFF2-40B4-BE49-F238E27FC236}">
+                <a16:creationId xmlns:a16="http://schemas.microsoft.com/office/drawing/2014/main" id="{5E3917E8-C5E2-4F20-AEFC-8A7FF8A5F443}"/>
+              </a:ext>
+            </a:extLst>
+          </p:cNvPr>
+          <p:cNvSpPr>
+            <a:spLocks noGrp="1"/>
+          </p:cNvSpPr>
+          <p:nvPr>
+            <p:ph type="title"/>
+          </p:nvPr>
+        </p:nvSpPr>
+        <p:spPr/>
+        <p:txBody>
+          <a:bodyPr/>
+          <a:lstStyle/>
+          <a:p>
+            <a:pPr algn="ctr"/>
+            <a:r>
+              <a:rPr lang="de-DE" dirty="0"/>
+              <a:t>Hyperparameter: Grid </a:t>
+            </a:r>
+            <a:r>
+              <a:rPr lang="de-DE" dirty="0" err="1"/>
+              <a:t>search</a:t>
+            </a:r>
+            <a:endParaRPr lang="de-DE" dirty="0"/>
+          </a:p>
+        </p:txBody>
+      </p:sp>
+      <p:sp>
+        <p:nvSpPr>
+          <p:cNvPr id="5" name="Foliennummernplatzhalter 4">
+            <a:extLst>
+              <a:ext uri="{FF2B5EF4-FFF2-40B4-BE49-F238E27FC236}">
+                <a16:creationId xmlns:a16="http://schemas.microsoft.com/office/drawing/2014/main" id="{80A4DD8A-DF34-4E71-A690-0584852C452E}"/>
+              </a:ext>
+            </a:extLst>
+          </p:cNvPr>
+          <p:cNvSpPr>
+            <a:spLocks noGrp="1"/>
+          </p:cNvSpPr>
+          <p:nvPr>
+            <p:ph type="sldNum" sz="quarter" idx="12"/>
+          </p:nvPr>
+        </p:nvSpPr>
+        <p:spPr/>
+        <p:txBody>
+          <a:bodyPr/>
+          <a:lstStyle/>
+          <a:p>
+            <a:fld id="{CCAAE293-A3DA-4FFC-871C-7F0F209F7CB2}" type="slidenum">
+              <a:rPr lang="en-US" smtClean="0"/>
+              <a:t>11</a:t>
             </a:fld>
             <a:endParaRPr lang="en-US"/>
           </a:p>
@@ -4238,7 +4396,7 @@
 </p:sld>
 </file>
 
-<file path=ppt/slides/slide11.xml><?xml version="1.0" encoding="utf-8"?>
+<file path=ppt/slides/slide12.xml><?xml version="1.0" encoding="utf-8"?>
 <p:sld xmlns:a="http://schemas.openxmlformats.org/drawingml/2006/main" xmlns:r="http://schemas.openxmlformats.org/officeDocument/2006/relationships" xmlns:p="http://schemas.openxmlformats.org/presentationml/2006/main">
   <p:cSld>
     <p:spTree>
@@ -4312,7 +4470,7 @@
           <a:p>
             <a:fld id="{CCAAE293-A3DA-4FFC-871C-7F0F209F7CB2}" type="slidenum">
               <a:rPr lang="en-US" smtClean="0"/>
-              <a:t>11</a:t>
+              <a:t>12</a:t>
             </a:fld>
             <a:endParaRPr lang="en-US"/>
           </a:p>
@@ -4401,7 +4559,7 @@
 </p:sld>
 </file>
 
-<file path=ppt/slides/slide12.xml><?xml version="1.0" encoding="utf-8"?>
+<file path=ppt/slides/slide13.xml><?xml version="1.0" encoding="utf-8"?>
 <p:sld xmlns:a="http://schemas.openxmlformats.org/drawingml/2006/main" xmlns:r="http://schemas.openxmlformats.org/officeDocument/2006/relationships" xmlns:p="http://schemas.openxmlformats.org/presentationml/2006/main">
   <p:cSld>
     <p:spTree>
@@ -4475,7 +4633,7 @@
           <a:p>
             <a:fld id="{CCAAE293-A3DA-4FFC-871C-7F0F209F7CB2}" type="slidenum">
               <a:rPr lang="en-US" smtClean="0"/>
-              <a:t>12</a:t>
+              <a:t>13</a:t>
             </a:fld>
             <a:endParaRPr lang="en-US"/>
           </a:p>
@@ -4529,7 +4687,7 @@
 </p:sld>
 </file>
 
-<file path=ppt/slides/slide13.xml><?xml version="1.0" encoding="utf-8"?>
+<file path=ppt/slides/slide14.xml><?xml version="1.0" encoding="utf-8"?>
 <p:sld xmlns:a="http://schemas.openxmlformats.org/drawingml/2006/main" xmlns:r="http://schemas.openxmlformats.org/officeDocument/2006/relationships" xmlns:p="http://schemas.openxmlformats.org/presentationml/2006/main">
   <p:cSld>
     <p:spTree>
@@ -4656,7 +4814,7 @@
           <a:p>
             <a:fld id="{CCAAE293-A3DA-4FFC-871C-7F0F209F7CB2}" type="slidenum">
               <a:rPr lang="en-US" smtClean="0"/>
-              <a:t>13</a:t>
+              <a:t>14</a:t>
             </a:fld>
             <a:endParaRPr lang="en-US"/>
           </a:p>
@@ -4756,7 +4914,7 @@
 </p:sld>
 </file>
 
-<file path=ppt/slides/slide14.xml><?xml version="1.0" encoding="utf-8"?>
+<file path=ppt/slides/slide15.xml><?xml version="1.0" encoding="utf-8"?>
 <p:sld xmlns:a="http://schemas.openxmlformats.org/drawingml/2006/main" xmlns:r="http://schemas.openxmlformats.org/officeDocument/2006/relationships" xmlns:p="http://schemas.openxmlformats.org/presentationml/2006/main">
   <p:cSld>
     <p:spTree>
@@ -5169,7 +5327,7 @@
           <a:p>
             <a:fld id="{CCAAE293-A3DA-4FFC-871C-7F0F209F7CB2}" type="slidenum">
               <a:rPr lang="en-US" smtClean="0"/>
-              <a:t>14</a:t>
+              <a:t>15</a:t>
             </a:fld>
             <a:endParaRPr lang="en-US"/>
           </a:p>
@@ -5188,7 +5346,7 @@
 </p:sld>
 </file>
 
-<file path=ppt/slides/slide15.xml><?xml version="1.0" encoding="utf-8"?>
+<file path=ppt/slides/slide16.xml><?xml version="1.0" encoding="utf-8"?>
 <p:sld xmlns:a="http://schemas.openxmlformats.org/drawingml/2006/main" xmlns:r="http://schemas.openxmlformats.org/officeDocument/2006/relationships" xmlns:p="http://schemas.openxmlformats.org/presentationml/2006/main">
   <p:cSld>
     <p:spTree>
@@ -5283,7 +5441,7 @@
           <a:p>
             <a:fld id="{CCAAE293-A3DA-4FFC-871C-7F0F209F7CB2}" type="slidenum">
               <a:rPr lang="en-US" smtClean="0"/>
-              <a:t>15</a:t>
+              <a:t>16</a:t>
             </a:fld>
             <a:endParaRPr lang="en-US"/>
           </a:p>
@@ -5787,7 +5945,7 @@
 </p:sld>
 </file>
 
-<file path=ppt/slides/slide16.xml><?xml version="1.0" encoding="utf-8"?>
+<file path=ppt/slides/slide17.xml><?xml version="1.0" encoding="utf-8"?>
 <p:sld xmlns:a="http://schemas.openxmlformats.org/drawingml/2006/main" xmlns:r="http://schemas.openxmlformats.org/officeDocument/2006/relationships" xmlns:p="http://schemas.openxmlformats.org/presentationml/2006/main">
   <p:cSld>
     <p:spTree>
@@ -5827,7 +5985,7 @@
           <a:p>
             <a:fld id="{CCAAE293-A3DA-4FFC-871C-7F0F209F7CB2}" type="slidenum">
               <a:rPr lang="en-US" smtClean="0"/>
-              <a:t>16</a:t>
+              <a:t>17</a:t>
             </a:fld>
             <a:endParaRPr lang="en-US"/>
           </a:p>
@@ -5950,7 +6108,7 @@
 </p:sld>
 </file>
 
-<file path=ppt/slides/slide17.xml><?xml version="1.0" encoding="utf-8"?>
+<file path=ppt/slides/slide18.xml><?xml version="1.0" encoding="utf-8"?>
 <p:sld xmlns:a="http://schemas.openxmlformats.org/drawingml/2006/main" xmlns:r="http://schemas.openxmlformats.org/officeDocument/2006/relationships" xmlns:p="http://schemas.openxmlformats.org/presentationml/2006/main">
   <p:cSld>
     <p:spTree>
@@ -6096,7 +6254,7 @@
           <a:p>
             <a:fld id="{CCAAE293-A3DA-4FFC-871C-7F0F209F7CB2}" type="slidenum">
               <a:rPr lang="en-US" smtClean="0"/>
-              <a:t>17</a:t>
+              <a:t>18</a:t>
             </a:fld>
             <a:endParaRPr lang="en-US"/>
           </a:p>
@@ -6185,7 +6343,7 @@
           <a:p>
             <a:r>
               <a:rPr lang="de-DE" dirty="0"/>
-              <a:t>Feature –</a:t>
+              <a:t>Feature</a:t>
             </a:r>
           </a:p>
           <a:p>
@@ -6284,7 +6442,7 @@
           <p:cNvPr id="2" name="Titel 1">
             <a:extLst>
               <a:ext uri="{FF2B5EF4-FFF2-40B4-BE49-F238E27FC236}">
-                <a16:creationId xmlns:a16="http://schemas.microsoft.com/office/drawing/2014/main" id="{A0AF0F99-5B8C-4A5B-8805-CC5D24D3C564}"/>
+                <a16:creationId xmlns:a16="http://schemas.microsoft.com/office/drawing/2014/main" id="{D434AD1D-43C1-409A-A187-870F5AA93856}"/>
               </a:ext>
             </a:extLst>
           </p:cNvPr>
@@ -6302,26 +6460,31 @@
           <a:p>
             <a:pPr algn="ctr"/>
             <a:r>
-              <a:rPr lang="en-US" dirty="0"/>
-              <a:t>Feature: first Ideas</a:t>
-            </a:r>
-          </a:p>
-        </p:txBody>
-      </p:sp>
-      <p:sp>
-        <p:nvSpPr>
-          <p:cNvPr id="3" name="Inhaltsplatzhalter 2">
-            <a:extLst>
-              <a:ext uri="{FF2B5EF4-FFF2-40B4-BE49-F238E27FC236}">
-                <a16:creationId xmlns:a16="http://schemas.microsoft.com/office/drawing/2014/main" id="{DC16FC26-A9C2-43DE-849D-CCD62E93A709}"/>
-              </a:ext>
-            </a:extLst>
-          </p:cNvPr>
-          <p:cNvSpPr>
-            <a:spLocks noGrp="1"/>
-          </p:cNvSpPr>
-          <p:nvPr>
-            <p:ph idx="1"/>
+              <a:rPr lang="de-DE" dirty="0"/>
+              <a:t>Feature: </a:t>
+            </a:r>
+            <a:r>
+              <a:rPr lang="de-DE" dirty="0" err="1"/>
+              <a:t>Introduction</a:t>
+            </a:r>
+            <a:endParaRPr lang="de-DE" dirty="0"/>
+          </a:p>
+        </p:txBody>
+      </p:sp>
+      <p:sp>
+        <p:nvSpPr>
+          <p:cNvPr id="5" name="Inhaltsplatzhalter 4">
+            <a:extLst>
+              <a:ext uri="{FF2B5EF4-FFF2-40B4-BE49-F238E27FC236}">
+                <a16:creationId xmlns:a16="http://schemas.microsoft.com/office/drawing/2014/main" id="{7E4E278C-18DA-4438-BDDA-8E6B02BA5A72}"/>
+              </a:ext>
+            </a:extLst>
+          </p:cNvPr>
+          <p:cNvSpPr>
+            <a:spLocks noGrp="1"/>
+          </p:cNvSpPr>
+          <p:nvPr>
+            <p:ph sz="half" idx="1"/>
           </p:nvPr>
         </p:nvSpPr>
         <p:spPr/>
@@ -6329,106 +6492,43 @@
           <a:bodyPr/>
           <a:lstStyle/>
           <a:p>
-            <a:pPr marL="196596" indent="-196596" defTabSz="786384">
-              <a:spcBef>
-                <a:spcPts val="800"/>
-              </a:spcBef>
-              <a:defRPr sz="2408"/>
-            </a:pPr>
-            <a:r>
-              <a:rPr lang="en-US" dirty="0"/>
-              <a:t>Large (-) BLOSUM =&gt; Very unlikely substitution =&gt; Strong functional effect</a:t>
-            </a:r>
-          </a:p>
-          <a:p>
-            <a:pPr marL="589788" lvl="1" indent="-196596" defTabSz="786384">
-              <a:spcBef>
-                <a:spcPts val="800"/>
-              </a:spcBef>
-              <a:defRPr sz="2408"/>
-            </a:pPr>
-            <a:r>
-              <a:rPr lang="en-US" dirty="0"/>
-              <a:t>Requires high SNAP2 to be functionally significant (i.e. binding)</a:t>
-            </a:r>
-          </a:p>
-          <a:p>
-            <a:pPr marL="196596" indent="-196596" defTabSz="786384">
-              <a:spcBef>
-                <a:spcPts val="800"/>
-              </a:spcBef>
-              <a:defRPr sz="2408"/>
-            </a:pPr>
-            <a:r>
-              <a:rPr lang="en-US" dirty="0"/>
-              <a:t>Large (+) BLOSUM =&gt; Very likely substitution =&gt; Weak functional effect</a:t>
-            </a:r>
-          </a:p>
-          <a:p>
-            <a:pPr marL="589788" lvl="1" indent="-196596" defTabSz="786384">
-              <a:spcBef>
-                <a:spcPts val="800"/>
-              </a:spcBef>
-              <a:defRPr sz="2408"/>
-            </a:pPr>
-            <a:r>
-              <a:rPr lang="en-US" dirty="0"/>
-              <a:t>Small SNAP2 can still imply functional significance (i.e. binding)</a:t>
-            </a:r>
-          </a:p>
-          <a:p>
-            <a:pPr marL="589788" lvl="1" indent="-196596" defTabSz="786384">
-              <a:spcBef>
-                <a:spcPts val="800"/>
-              </a:spcBef>
-              <a:defRPr sz="2408"/>
-            </a:pPr>
-            <a:endParaRPr lang="en-US" dirty="0"/>
-          </a:p>
-          <a:p>
-            <a:r>
-              <a:rPr lang="en-US" sz="2400" dirty="0"/>
-              <a:t>Cutoffs:</a:t>
-            </a:r>
-          </a:p>
-          <a:p>
-            <a:pPr marL="457200" lvl="1" indent="0">
-              <a:buNone/>
-            </a:pPr>
-            <a:r>
-              <a:rPr lang="en-US" dirty="0"/>
-              <a:t>-4: 90, -3: 80, -2:70, -1: 60, 0:50, 1:40, 2:30, 3:0</a:t>
-            </a:r>
-          </a:p>
-          <a:p>
-            <a:pPr marL="457200" lvl="1" indent="0">
-              <a:buNone/>
-            </a:pPr>
-            <a:r>
-              <a:rPr lang="en-US" dirty="0"/>
-              <a:t>BLOSUM diagonal can be ignored</a:t>
-            </a:r>
-          </a:p>
-          <a:p>
-            <a:r>
-              <a:rPr lang="en-US" sz="2400" dirty="0"/>
-              <a:t>Result:</a:t>
-            </a:r>
-          </a:p>
-          <a:p>
-            <a:pPr marL="0" indent="0">
-              <a:buNone/>
-            </a:pPr>
-            <a:r>
-              <a:rPr lang="en-US" sz="2400" dirty="0"/>
-              <a:t>	[-1, 1, -1, -1, -1, 1, 1, -1, -1, -1, -1, 1, 0, -1, 1, 1, 1, 1, -1, -1]</a:t>
-            </a:r>
-          </a:p>
-          <a:p>
-            <a:endParaRPr lang="en-US" dirty="0"/>
-          </a:p>
-          <a:p>
-            <a:endParaRPr lang="en-US" dirty="0"/>
+            <a:r>
+              <a:rPr lang="de-DE" dirty="0"/>
+              <a:t>SNAP-</a:t>
+            </a:r>
+            <a:r>
+              <a:rPr lang="de-DE" dirty="0" err="1"/>
+              <a:t>scores</a:t>
+            </a:r>
+            <a:endParaRPr lang="de-DE" dirty="0"/>
+          </a:p>
+        </p:txBody>
+      </p:sp>
+      <p:sp>
+        <p:nvSpPr>
+          <p:cNvPr id="6" name="Inhaltsplatzhalter 5">
+            <a:extLst>
+              <a:ext uri="{FF2B5EF4-FFF2-40B4-BE49-F238E27FC236}">
+                <a16:creationId xmlns:a16="http://schemas.microsoft.com/office/drawing/2014/main" id="{44D49E19-C7F1-413A-87EE-8F883240E006}"/>
+              </a:ext>
+            </a:extLst>
+          </p:cNvPr>
+          <p:cNvSpPr>
+            <a:spLocks noGrp="1"/>
+          </p:cNvSpPr>
+          <p:nvPr>
+            <p:ph sz="half" idx="2"/>
+          </p:nvPr>
+        </p:nvSpPr>
+        <p:spPr/>
+        <p:txBody>
+          <a:bodyPr/>
+          <a:lstStyle/>
+          <a:p>
+            <a:r>
+              <a:rPr lang="de-DE" dirty="0"/>
+              <a:t>BLOSUM62-scores</a:t>
+            </a:r>
           </a:p>
         </p:txBody>
       </p:sp>
@@ -6437,7 +6537,7 @@
           <p:cNvPr id="4" name="Foliennummernplatzhalter 3">
             <a:extLst>
               <a:ext uri="{FF2B5EF4-FFF2-40B4-BE49-F238E27FC236}">
-                <a16:creationId xmlns:a16="http://schemas.microsoft.com/office/drawing/2014/main" id="{6ECE49BF-46DA-4F97-8631-C0E5C689DF62}"/>
+                <a16:creationId xmlns:a16="http://schemas.microsoft.com/office/drawing/2014/main" id="{EC7DA07D-533C-48A1-8B19-941C0381EB94}"/>
               </a:ext>
             </a:extLst>
           </p:cNvPr>
@@ -6461,10 +6561,82 @@
           </a:p>
         </p:txBody>
       </p:sp>
+      <p:pic>
+        <p:nvPicPr>
+          <p:cNvPr id="8" name="Grafik 7">
+            <a:extLst>
+              <a:ext uri="{FF2B5EF4-FFF2-40B4-BE49-F238E27FC236}">
+                <a16:creationId xmlns:a16="http://schemas.microsoft.com/office/drawing/2014/main" id="{A153FEE9-3E33-4FCB-8F1B-41251BAAEDBE}"/>
+              </a:ext>
+            </a:extLst>
+          </p:cNvPr>
+          <p:cNvPicPr>
+            <a:picLocks noChangeAspect="1"/>
+          </p:cNvPicPr>
+          <p:nvPr/>
+        </p:nvPicPr>
+        <p:blipFill>
+          <a:blip r:embed="rId2">
+            <a:extLst>
+              <a:ext uri="{28A0092B-C50C-407E-A947-70E740481C1C}">
+                <a14:useLocalDpi xmlns:a14="http://schemas.microsoft.com/office/drawing/2010/main" val="0"/>
+              </a:ext>
+            </a:extLst>
+          </a:blip>
+          <a:stretch>
+            <a:fillRect/>
+          </a:stretch>
+        </p:blipFill>
+        <p:spPr>
+          <a:xfrm>
+            <a:off x="5674529" y="2576963"/>
+            <a:ext cx="5872141" cy="3240000"/>
+          </a:xfrm>
+          <a:prstGeom prst="rect">
+            <a:avLst/>
+          </a:prstGeom>
+        </p:spPr>
+      </p:pic>
+      <p:pic>
+        <p:nvPicPr>
+          <p:cNvPr id="10" name="Grafik 9">
+            <a:extLst>
+              <a:ext uri="{FF2B5EF4-FFF2-40B4-BE49-F238E27FC236}">
+                <a16:creationId xmlns:a16="http://schemas.microsoft.com/office/drawing/2014/main" id="{5D21204F-0C04-41B4-95D0-53CF0C2D2D50}"/>
+              </a:ext>
+            </a:extLst>
+          </p:cNvPr>
+          <p:cNvPicPr>
+            <a:picLocks noChangeAspect="1"/>
+          </p:cNvPicPr>
+          <p:nvPr/>
+        </p:nvPicPr>
+        <p:blipFill>
+          <a:blip r:embed="rId3">
+            <a:extLst>
+              <a:ext uri="{28A0092B-C50C-407E-A947-70E740481C1C}">
+                <a14:useLocalDpi xmlns:a14="http://schemas.microsoft.com/office/drawing/2010/main" val="0"/>
+              </a:ext>
+            </a:extLst>
+          </a:blip>
+          <a:stretch>
+            <a:fillRect/>
+          </a:stretch>
+        </p:blipFill>
+        <p:spPr>
+          <a:xfrm>
+            <a:off x="838200" y="2666830"/>
+            <a:ext cx="3712648" cy="3060266"/>
+          </a:xfrm>
+          <a:prstGeom prst="rect">
+            <a:avLst/>
+          </a:prstGeom>
+        </p:spPr>
+      </p:pic>
     </p:spTree>
     <p:extLst>
       <p:ext uri="{BB962C8B-B14F-4D97-AF65-F5344CB8AC3E}">
-        <p14:creationId xmlns:p14="http://schemas.microsoft.com/office/powerpoint/2010/main" val="2197693600"/>
+        <p14:creationId xmlns:p14="http://schemas.microsoft.com/office/powerpoint/2010/main" val="2648920250"/>
       </p:ext>
     </p:extLst>
   </p:cSld>
@@ -6496,7 +6668,7 @@
           <p:cNvPr id="2" name="Titel 1">
             <a:extLst>
               <a:ext uri="{FF2B5EF4-FFF2-40B4-BE49-F238E27FC236}">
-                <a16:creationId xmlns:a16="http://schemas.microsoft.com/office/drawing/2014/main" id="{9591C612-F88B-4465-8B3F-44166E3449EA}"/>
+                <a16:creationId xmlns:a16="http://schemas.microsoft.com/office/drawing/2014/main" id="{6019DB3D-05C1-487C-84EB-B488DE6B8C90}"/>
               </a:ext>
             </a:extLst>
           </p:cNvPr>
@@ -6514,79 +6686,31 @@
           <a:p>
             <a:pPr algn="ctr"/>
             <a:r>
-              <a:rPr lang="en-US" dirty="0"/>
-              <a:t>Feature: raw scores</a:t>
-            </a:r>
-          </a:p>
-        </p:txBody>
-      </p:sp>
-      <p:sp>
-        <p:nvSpPr>
-          <p:cNvPr id="3" name="Inhaltsplatzhalter 2">
-            <a:extLst>
-              <a:ext uri="{FF2B5EF4-FFF2-40B4-BE49-F238E27FC236}">
-                <a16:creationId xmlns:a16="http://schemas.microsoft.com/office/drawing/2014/main" id="{5B3C0166-0693-45E2-8540-A3B3EA29A65E}"/>
-              </a:ext>
-            </a:extLst>
-          </p:cNvPr>
-          <p:cNvSpPr>
-            <a:spLocks noGrp="1"/>
-          </p:cNvSpPr>
-          <p:nvPr>
-            <p:ph idx="1"/>
-          </p:nvPr>
-        </p:nvSpPr>
-        <p:spPr/>
-        <p:txBody>
-          <a:bodyPr/>
-          <a:lstStyle/>
-          <a:p>
-            <a:r>
-              <a:rPr lang="en-US" dirty="0"/>
-              <a:t>Problem: Too little Information to get meaningful results</a:t>
-            </a:r>
-          </a:p>
-          <a:p>
-            <a:r>
-              <a:rPr lang="en-US" dirty="0"/>
-              <a:t>Solution: input raw scores</a:t>
-            </a:r>
-          </a:p>
-          <a:p>
+              <a:rPr lang="de-DE" dirty="0"/>
+              <a:t>Distribution </a:t>
+            </a:r>
+            <a:r>
+              <a:rPr lang="de-DE" dirty="0" err="1"/>
+              <a:t>of</a:t>
+            </a:r>
+            <a:r>
+              <a:rPr lang="de-DE" dirty="0"/>
+              <a:t> </a:t>
+            </a:r>
+            <a:r>
+              <a:rPr lang="de-DE" dirty="0" err="1"/>
+              <a:t>scores</a:t>
+            </a:r>
             <a:endParaRPr lang="en-US" dirty="0"/>
           </a:p>
-          <a:p>
-            <a:endParaRPr lang="en-US" dirty="0"/>
-          </a:p>
-          <a:p>
-            <a:pPr marL="0" indent="0">
-              <a:buNone/>
-            </a:pPr>
-            <a:r>
-              <a:rPr lang="en-US" dirty="0"/>
-              <a:t>[48, -1, 75, -1, 70, -2, 79, -3, 36, -1, 58, 0, 76, -2, 73, -3, 67, -2, 15, 1, </a:t>
-            </a:r>
-          </a:p>
-          <a:p>
-            <a:pPr marL="0" indent="0">
-              <a:buNone/>
-            </a:pPr>
-            <a:r>
-              <a:rPr lang="en-US" dirty="0"/>
-              <a:t>    24, 2, 76, -1, 0, 0, 30, 0, 79, -2, 65, -1, 62, -1, 68, -1, 51, -1, 27, 1]</a:t>
-            </a:r>
-          </a:p>
-          <a:p>
-            <a:endParaRPr lang="en-US" dirty="0"/>
-          </a:p>
-        </p:txBody>
-      </p:sp>
-      <p:sp>
-        <p:nvSpPr>
-          <p:cNvPr id="4" name="Foliennummernplatzhalter 3">
-            <a:extLst>
-              <a:ext uri="{FF2B5EF4-FFF2-40B4-BE49-F238E27FC236}">
-                <a16:creationId xmlns:a16="http://schemas.microsoft.com/office/drawing/2014/main" id="{74F85361-5C17-48B6-93DB-1EDA5C35426C}"/>
+        </p:txBody>
+      </p:sp>
+      <p:sp>
+        <p:nvSpPr>
+          <p:cNvPr id="13" name="Foliennummernplatzhalter 12">
+            <a:extLst>
+              <a:ext uri="{FF2B5EF4-FFF2-40B4-BE49-F238E27FC236}">
+                <a16:creationId xmlns:a16="http://schemas.microsoft.com/office/drawing/2014/main" id="{9AB9A42C-1858-4BAA-ACA3-234429D562F4}"/>
               </a:ext>
             </a:extLst>
           </p:cNvPr>
@@ -6610,10 +6734,80 @@
           </a:p>
         </p:txBody>
       </p:sp>
+      <p:pic>
+        <p:nvPicPr>
+          <p:cNvPr id="9" name="Inhaltsplatzhalter 8" descr="Ein Bild, das Screenshot enthält.&#10;&#10;Automatisch generierte Beschreibung">
+            <a:extLst>
+              <a:ext uri="{FF2B5EF4-FFF2-40B4-BE49-F238E27FC236}">
+                <a16:creationId xmlns:a16="http://schemas.microsoft.com/office/drawing/2014/main" id="{C805BA6A-2D70-47A9-8E99-1F3417F791C1}"/>
+              </a:ext>
+            </a:extLst>
+          </p:cNvPr>
+          <p:cNvPicPr>
+            <a:picLocks noGrp="1" noChangeAspect="1"/>
+          </p:cNvPicPr>
+          <p:nvPr>
+            <p:ph sz="half" idx="1"/>
+          </p:nvPr>
+        </p:nvPicPr>
+        <p:blipFill>
+          <a:blip r:embed="rId2">
+            <a:extLst>
+              <a:ext uri="{28A0092B-C50C-407E-A947-70E740481C1C}">
+                <a14:useLocalDpi xmlns:a14="http://schemas.microsoft.com/office/drawing/2010/main" val="0"/>
+              </a:ext>
+            </a:extLst>
+          </a:blip>
+          <a:stretch>
+            <a:fillRect/>
+          </a:stretch>
+        </p:blipFill>
+        <p:spPr>
+          <a:xfrm>
+            <a:off x="838200" y="2058194"/>
+            <a:ext cx="5181600" cy="3886200"/>
+          </a:xfrm>
+        </p:spPr>
+      </p:pic>
+      <p:pic>
+        <p:nvPicPr>
+          <p:cNvPr id="7" name="Inhaltsplatzhalter 6" descr="Ein Bild, das Screenshot enthält.&#10;&#10;Automatisch generierte Beschreibung">
+            <a:extLst>
+              <a:ext uri="{FF2B5EF4-FFF2-40B4-BE49-F238E27FC236}">
+                <a16:creationId xmlns:a16="http://schemas.microsoft.com/office/drawing/2014/main" id="{048EE260-C95E-4E1D-9210-98D563D49B42}"/>
+              </a:ext>
+            </a:extLst>
+          </p:cNvPr>
+          <p:cNvPicPr>
+            <a:picLocks noGrp="1" noChangeAspect="1"/>
+          </p:cNvPicPr>
+          <p:nvPr>
+            <p:ph sz="half" idx="2"/>
+          </p:nvPr>
+        </p:nvPicPr>
+        <p:blipFill>
+          <a:blip r:embed="rId3">
+            <a:extLst>
+              <a:ext uri="{28A0092B-C50C-407E-A947-70E740481C1C}">
+                <a14:useLocalDpi xmlns:a14="http://schemas.microsoft.com/office/drawing/2010/main" val="0"/>
+              </a:ext>
+            </a:extLst>
+          </a:blip>
+          <a:stretch>
+            <a:fillRect/>
+          </a:stretch>
+        </p:blipFill>
+        <p:spPr>
+          <a:xfrm>
+            <a:off x="6172200" y="2058194"/>
+            <a:ext cx="5181600" cy="3886200"/>
+          </a:xfrm>
+        </p:spPr>
+      </p:pic>
     </p:spTree>
     <p:extLst>
       <p:ext uri="{BB962C8B-B14F-4D97-AF65-F5344CB8AC3E}">
-        <p14:creationId xmlns:p14="http://schemas.microsoft.com/office/powerpoint/2010/main" val="67827862"/>
+        <p14:creationId xmlns:p14="http://schemas.microsoft.com/office/powerpoint/2010/main" val="498417232"/>
       </p:ext>
     </p:extLst>
   </p:cSld>
@@ -6645,7 +6839,7 @@
           <p:cNvPr id="2" name="Titel 1">
             <a:extLst>
               <a:ext uri="{FF2B5EF4-FFF2-40B4-BE49-F238E27FC236}">
-                <a16:creationId xmlns:a16="http://schemas.microsoft.com/office/drawing/2014/main" id="{60F4F9F7-1F09-4688-9724-856BD95194F1}"/>
+                <a16:creationId xmlns:a16="http://schemas.microsoft.com/office/drawing/2014/main" id="{A0AF0F99-5B8C-4A5B-8805-CC5D24D3C564}"/>
               </a:ext>
             </a:extLst>
           </p:cNvPr>
@@ -6664,89 +6858,133 @@
             <a:pPr algn="ctr"/>
             <a:r>
               <a:rPr lang="en-US" dirty="0"/>
-              <a:t>Feature</a:t>
-            </a:r>
-            <a:r>
-              <a:rPr lang="de-DE" dirty="0"/>
-              <a:t>: </a:t>
-            </a:r>
-            <a:r>
-              <a:rPr lang="de-DE" dirty="0" err="1"/>
-              <a:t>scaled</a:t>
-            </a:r>
-            <a:r>
-              <a:rPr lang="de-DE" dirty="0"/>
-              <a:t> Values</a:t>
-            </a:r>
+              <a:t>Feature: first Ideas</a:t>
+            </a:r>
+          </a:p>
+        </p:txBody>
+      </p:sp>
+      <p:sp>
+        <p:nvSpPr>
+          <p:cNvPr id="3" name="Inhaltsplatzhalter 2">
+            <a:extLst>
+              <a:ext uri="{FF2B5EF4-FFF2-40B4-BE49-F238E27FC236}">
+                <a16:creationId xmlns:a16="http://schemas.microsoft.com/office/drawing/2014/main" id="{DC16FC26-A9C2-43DE-849D-CCD62E93A709}"/>
+              </a:ext>
+            </a:extLst>
+          </p:cNvPr>
+          <p:cNvSpPr>
+            <a:spLocks noGrp="1"/>
+          </p:cNvSpPr>
+          <p:nvPr>
+            <p:ph idx="1"/>
+          </p:nvPr>
+        </p:nvSpPr>
+        <p:spPr/>
+        <p:txBody>
+          <a:bodyPr/>
+          <a:lstStyle/>
+          <a:p>
+            <a:pPr marL="196596" indent="-196596" defTabSz="786384">
+              <a:spcBef>
+                <a:spcPts val="800"/>
+              </a:spcBef>
+              <a:defRPr sz="2408"/>
+            </a:pPr>
+            <a:r>
+              <a:rPr lang="en-US" dirty="0"/>
+              <a:t>Large (-) BLOSUM =&gt; Very unlikely substitution =&gt; Strong functional effect</a:t>
+            </a:r>
+          </a:p>
+          <a:p>
+            <a:pPr marL="589788" lvl="1" indent="-196596" defTabSz="786384">
+              <a:spcBef>
+                <a:spcPts val="800"/>
+              </a:spcBef>
+              <a:defRPr sz="2408"/>
+            </a:pPr>
+            <a:r>
+              <a:rPr lang="en-US" dirty="0"/>
+              <a:t>Requires high SNAP2 to be functionally significant (i.e. binding)</a:t>
+            </a:r>
+          </a:p>
+          <a:p>
+            <a:pPr marL="196596" indent="-196596" defTabSz="786384">
+              <a:spcBef>
+                <a:spcPts val="800"/>
+              </a:spcBef>
+              <a:defRPr sz="2408"/>
+            </a:pPr>
+            <a:r>
+              <a:rPr lang="en-US" dirty="0"/>
+              <a:t>Large (+) BLOSUM =&gt; Very likely substitution =&gt; Weak functional effect</a:t>
+            </a:r>
+          </a:p>
+          <a:p>
+            <a:pPr marL="589788" lvl="1" indent="-196596" defTabSz="786384">
+              <a:spcBef>
+                <a:spcPts val="800"/>
+              </a:spcBef>
+              <a:defRPr sz="2408"/>
+            </a:pPr>
+            <a:r>
+              <a:rPr lang="en-US" dirty="0"/>
+              <a:t>Small SNAP2 can still imply functional significance (i.e. binding)</a:t>
+            </a:r>
+          </a:p>
+          <a:p>
+            <a:pPr marL="589788" lvl="1" indent="-196596" defTabSz="786384">
+              <a:spcBef>
+                <a:spcPts val="800"/>
+              </a:spcBef>
+              <a:defRPr sz="2408"/>
+            </a:pPr>
             <a:endParaRPr lang="en-US" dirty="0"/>
           </a:p>
-        </p:txBody>
-      </p:sp>
-      <p:sp>
-        <p:nvSpPr>
-          <p:cNvPr id="3" name="Inhaltsplatzhalter 2">
-            <a:extLst>
-              <a:ext uri="{FF2B5EF4-FFF2-40B4-BE49-F238E27FC236}">
-                <a16:creationId xmlns:a16="http://schemas.microsoft.com/office/drawing/2014/main" id="{DABFB4CD-55BA-4B9D-9388-099CEA4FC0CC}"/>
-              </a:ext>
-            </a:extLst>
-          </p:cNvPr>
-          <p:cNvSpPr>
-            <a:spLocks noGrp="1"/>
-          </p:cNvSpPr>
-          <p:nvPr>
-            <p:ph idx="1"/>
-          </p:nvPr>
-        </p:nvSpPr>
-        <p:spPr/>
-        <p:txBody>
-          <a:bodyPr/>
-          <a:lstStyle/>
-          <a:p>
+          <a:p>
+            <a:r>
+              <a:rPr lang="en-US" sz="2400" dirty="0"/>
+              <a:t>Cutoffs:</a:t>
+            </a:r>
+          </a:p>
+          <a:p>
+            <a:pPr marL="457200" lvl="1" indent="0">
+              <a:buNone/>
+            </a:pPr>
             <a:r>
               <a:rPr lang="en-US" dirty="0"/>
-              <a:t>BLOSUM scores are very small compared to SNAP scores</a:t>
+              <a:t>-4: 90, -3: 80, -2:70, -1: 60, 0:50, 1:40, 2:30, 3:0</a:t>
+            </a:r>
+          </a:p>
+          <a:p>
+            <a:pPr marL="457200" lvl="1" indent="0">
+              <a:buNone/>
+            </a:pPr>
+            <a:r>
+              <a:rPr lang="en-US" dirty="0"/>
+              <a:t>BLOSUM diagonal can be ignored</a:t>
+            </a:r>
+          </a:p>
+          <a:p>
+            <a:r>
+              <a:rPr lang="en-US" sz="2400" dirty="0"/>
+              <a:t>Result:</a:t>
             </a:r>
           </a:p>
           <a:p>
             <a:pPr marL="0" indent="0">
               <a:buNone/>
             </a:pPr>
+            <a:r>
+              <a:rPr lang="en-US" sz="2400" dirty="0"/>
+              <a:t>	[-1, 1, -1, -1, -1, 1, 1, -1, -1, -1, -1, 1, 0, -1, 1, 1, 1, 1, -1, -1]</a:t>
+            </a:r>
+          </a:p>
+          <a:p>
             <a:endParaRPr lang="en-US" dirty="0"/>
           </a:p>
           <a:p>
-            <a:pPr marL="0" indent="0">
-              <a:buNone/>
-            </a:pPr>
             <a:endParaRPr lang="en-US" dirty="0"/>
           </a:p>
-          <a:p>
-            <a:pPr marL="0" indent="0">
-              <a:buNone/>
-            </a:pPr>
-            <a:r>
-              <a:rPr lang="en-US" dirty="0"/>
-              <a:t>[48, -25, 75, -25, 70, -50, 79, -75, 36, -25, 58, 0, 76, -50, 73, -75, 67, </a:t>
-            </a:r>
-          </a:p>
-          <a:p>
-            <a:pPr marL="0" indent="0">
-              <a:buNone/>
-            </a:pPr>
-            <a:r>
-              <a:rPr lang="en-US" dirty="0"/>
-              <a:t>   -50, 15, 33, 24, 66, 76, -25, 0, 0, 30, 0, 79, -50, 65, -25, 62, -25, 68, </a:t>
-            </a:r>
-          </a:p>
-          <a:p>
-            <a:pPr marL="0" indent="0">
-              <a:buNone/>
-            </a:pPr>
-            <a:r>
-              <a:rPr lang="en-US" dirty="0"/>
-              <a:t>   -25, 51, -25, 27, 33]</a:t>
-            </a:r>
-          </a:p>
         </p:txBody>
       </p:sp>
       <p:sp>
@@ -6754,7 +6992,7 @@
           <p:cNvPr id="4" name="Foliennummernplatzhalter 3">
             <a:extLst>
               <a:ext uri="{FF2B5EF4-FFF2-40B4-BE49-F238E27FC236}">
-                <a16:creationId xmlns:a16="http://schemas.microsoft.com/office/drawing/2014/main" id="{CBB3139C-6890-4543-90A0-FAE3AA3EE102}"/>
+                <a16:creationId xmlns:a16="http://schemas.microsoft.com/office/drawing/2014/main" id="{6ECE49BF-46DA-4F97-8631-C0E5C689DF62}"/>
               </a:ext>
             </a:extLst>
           </p:cNvPr>
@@ -6781,7 +7019,7 @@
     </p:spTree>
     <p:extLst>
       <p:ext uri="{BB962C8B-B14F-4D97-AF65-F5344CB8AC3E}">
-        <p14:creationId xmlns:p14="http://schemas.microsoft.com/office/powerpoint/2010/main" val="2783528183"/>
+        <p14:creationId xmlns:p14="http://schemas.microsoft.com/office/powerpoint/2010/main" val="2197693600"/>
       </p:ext>
     </p:extLst>
   </p:cSld>
@@ -6813,7 +7051,7 @@
           <p:cNvPr id="2" name="Titel 1">
             <a:extLst>
               <a:ext uri="{FF2B5EF4-FFF2-40B4-BE49-F238E27FC236}">
-                <a16:creationId xmlns:a16="http://schemas.microsoft.com/office/drawing/2014/main" id="{6019DB3D-05C1-487C-84EB-B488DE6B8C90}"/>
+                <a16:creationId xmlns:a16="http://schemas.microsoft.com/office/drawing/2014/main" id="{9591C612-F88B-4465-8B3F-44166E3449EA}"/>
               </a:ext>
             </a:extLst>
           </p:cNvPr>
@@ -6831,31 +7069,85 @@
           <a:p>
             <a:pPr algn="ctr"/>
             <a:r>
-              <a:rPr lang="de-DE" dirty="0"/>
-              <a:t>Distribution </a:t>
-            </a:r>
-            <a:r>
-              <a:rPr lang="de-DE" dirty="0" err="1"/>
-              <a:t>of</a:t>
-            </a:r>
-            <a:r>
-              <a:rPr lang="de-DE" dirty="0"/>
-              <a:t> </a:t>
-            </a:r>
-            <a:r>
-              <a:rPr lang="de-DE" dirty="0" err="1"/>
-              <a:t>scores</a:t>
-            </a:r>
+              <a:rPr lang="en-US" dirty="0"/>
+              <a:t>Feature: raw scores</a:t>
+            </a:r>
+          </a:p>
+        </p:txBody>
+      </p:sp>
+      <p:sp>
+        <p:nvSpPr>
+          <p:cNvPr id="3" name="Inhaltsplatzhalter 2">
+            <a:extLst>
+              <a:ext uri="{FF2B5EF4-FFF2-40B4-BE49-F238E27FC236}">
+                <a16:creationId xmlns:a16="http://schemas.microsoft.com/office/drawing/2014/main" id="{5B3C0166-0693-45E2-8540-A3B3EA29A65E}"/>
+              </a:ext>
+            </a:extLst>
+          </p:cNvPr>
+          <p:cNvSpPr>
+            <a:spLocks noGrp="1"/>
+          </p:cNvSpPr>
+          <p:nvPr>
+            <p:ph idx="1"/>
+          </p:nvPr>
+        </p:nvSpPr>
+        <p:spPr/>
+        <p:txBody>
+          <a:bodyPr/>
+          <a:lstStyle/>
+          <a:p>
+            <a:r>
+              <a:rPr lang="en-US" dirty="0"/>
+              <a:t>Predicts similar to random</a:t>
+            </a:r>
+          </a:p>
+          <a:p>
+            <a:r>
+              <a:rPr lang="en-US" dirty="0"/>
+              <a:t>Problem: Too little Information to get meaningful results</a:t>
+            </a:r>
+          </a:p>
+          <a:p>
+            <a:r>
+              <a:rPr lang="en-US" dirty="0"/>
+              <a:t>Solution: input raw scores</a:t>
+            </a:r>
+          </a:p>
+          <a:p>
             <a:endParaRPr lang="en-US" dirty="0"/>
           </a:p>
-        </p:txBody>
-      </p:sp>
-      <p:sp>
-        <p:nvSpPr>
-          <p:cNvPr id="13" name="Foliennummernplatzhalter 12">
-            <a:extLst>
-              <a:ext uri="{FF2B5EF4-FFF2-40B4-BE49-F238E27FC236}">
-                <a16:creationId xmlns:a16="http://schemas.microsoft.com/office/drawing/2014/main" id="{9AB9A42C-1858-4BAA-ACA3-234429D562F4}"/>
+          <a:p>
+            <a:endParaRPr lang="en-US" dirty="0"/>
+          </a:p>
+          <a:p>
+            <a:pPr marL="0" indent="0">
+              <a:buNone/>
+            </a:pPr>
+            <a:r>
+              <a:rPr lang="en-US" dirty="0"/>
+              <a:t>[48, -1, 75, -1, 70, -2, 79, -3, 36, -1, 58, 0, 76, -2, 73, -3, 67, -2, 15, 1, </a:t>
+            </a:r>
+          </a:p>
+          <a:p>
+            <a:pPr marL="0" indent="0">
+              <a:buNone/>
+            </a:pPr>
+            <a:r>
+              <a:rPr lang="en-US" dirty="0"/>
+              <a:t>    24, 2, 76, -1, 0, 0, 30, 0, 79, -2, 65, -1, 62, -1, 68, -1, 51, -1, 27, 1]</a:t>
+            </a:r>
+          </a:p>
+          <a:p>
+            <a:endParaRPr lang="en-US" dirty="0"/>
+          </a:p>
+        </p:txBody>
+      </p:sp>
+      <p:sp>
+        <p:nvSpPr>
+          <p:cNvPr id="4" name="Foliennummernplatzhalter 3">
+            <a:extLst>
+              <a:ext uri="{FF2B5EF4-FFF2-40B4-BE49-F238E27FC236}">
+                <a16:creationId xmlns:a16="http://schemas.microsoft.com/office/drawing/2014/main" id="{74F85361-5C17-48B6-93DB-1EDA5C35426C}"/>
               </a:ext>
             </a:extLst>
           </p:cNvPr>
@@ -6879,80 +7171,10 @@
           </a:p>
         </p:txBody>
       </p:sp>
-      <p:pic>
-        <p:nvPicPr>
-          <p:cNvPr id="9" name="Inhaltsplatzhalter 8" descr="Ein Bild, das Screenshot enthält.&#10;&#10;Automatisch generierte Beschreibung">
-            <a:extLst>
-              <a:ext uri="{FF2B5EF4-FFF2-40B4-BE49-F238E27FC236}">
-                <a16:creationId xmlns:a16="http://schemas.microsoft.com/office/drawing/2014/main" id="{C805BA6A-2D70-47A9-8E99-1F3417F791C1}"/>
-              </a:ext>
-            </a:extLst>
-          </p:cNvPr>
-          <p:cNvPicPr>
-            <a:picLocks noGrp="1" noChangeAspect="1"/>
-          </p:cNvPicPr>
-          <p:nvPr>
-            <p:ph sz="half" idx="1"/>
-          </p:nvPr>
-        </p:nvPicPr>
-        <p:blipFill>
-          <a:blip r:embed="rId2">
-            <a:extLst>
-              <a:ext uri="{28A0092B-C50C-407E-A947-70E740481C1C}">
-                <a14:useLocalDpi xmlns:a14="http://schemas.microsoft.com/office/drawing/2010/main" val="0"/>
-              </a:ext>
-            </a:extLst>
-          </a:blip>
-          <a:stretch>
-            <a:fillRect/>
-          </a:stretch>
-        </p:blipFill>
-        <p:spPr>
-          <a:xfrm>
-            <a:off x="838200" y="2058194"/>
-            <a:ext cx="5181600" cy="3886200"/>
-          </a:xfrm>
-        </p:spPr>
-      </p:pic>
-      <p:pic>
-        <p:nvPicPr>
-          <p:cNvPr id="6" name="Inhaltsplatzhalter 5" descr="Ein Bild, das Screenshot enthält.&#10;&#10;Automatisch generierte Beschreibung">
-            <a:extLst>
-              <a:ext uri="{FF2B5EF4-FFF2-40B4-BE49-F238E27FC236}">
-                <a16:creationId xmlns:a16="http://schemas.microsoft.com/office/drawing/2014/main" id="{4B03FBAE-B680-4CEC-A4ED-DF55019C107C}"/>
-              </a:ext>
-            </a:extLst>
-          </p:cNvPr>
-          <p:cNvPicPr>
-            <a:picLocks noGrp="1" noChangeAspect="1"/>
-          </p:cNvPicPr>
-          <p:nvPr>
-            <p:ph sz="half" idx="2"/>
-          </p:nvPr>
-        </p:nvPicPr>
-        <p:blipFill>
-          <a:blip r:embed="rId3">
-            <a:extLst>
-              <a:ext uri="{28A0092B-C50C-407E-A947-70E740481C1C}">
-                <a14:useLocalDpi xmlns:a14="http://schemas.microsoft.com/office/drawing/2010/main" val="0"/>
-              </a:ext>
-            </a:extLst>
-          </a:blip>
-          <a:stretch>
-            <a:fillRect/>
-          </a:stretch>
-        </p:blipFill>
-        <p:spPr>
-          <a:xfrm>
-            <a:off x="6172200" y="2058194"/>
-            <a:ext cx="5181600" cy="3886200"/>
-          </a:xfrm>
-        </p:spPr>
-      </p:pic>
     </p:spTree>
     <p:extLst>
       <p:ext uri="{BB962C8B-B14F-4D97-AF65-F5344CB8AC3E}">
-        <p14:creationId xmlns:p14="http://schemas.microsoft.com/office/powerpoint/2010/main" val="498417232"/>
+        <p14:creationId xmlns:p14="http://schemas.microsoft.com/office/powerpoint/2010/main" val="67827862"/>
       </p:ext>
     </p:extLst>
   </p:cSld>
@@ -6981,6 +7203,174 @@
       </p:grpSpPr>
       <p:sp>
         <p:nvSpPr>
+          <p:cNvPr id="2" name="Titel 1">
+            <a:extLst>
+              <a:ext uri="{FF2B5EF4-FFF2-40B4-BE49-F238E27FC236}">
+                <a16:creationId xmlns:a16="http://schemas.microsoft.com/office/drawing/2014/main" id="{60F4F9F7-1F09-4688-9724-856BD95194F1}"/>
+              </a:ext>
+            </a:extLst>
+          </p:cNvPr>
+          <p:cNvSpPr>
+            <a:spLocks noGrp="1"/>
+          </p:cNvSpPr>
+          <p:nvPr>
+            <p:ph type="title"/>
+          </p:nvPr>
+        </p:nvSpPr>
+        <p:spPr/>
+        <p:txBody>
+          <a:bodyPr/>
+          <a:lstStyle/>
+          <a:p>
+            <a:pPr algn="ctr"/>
+            <a:r>
+              <a:rPr lang="en-US" dirty="0"/>
+              <a:t>Feature</a:t>
+            </a:r>
+            <a:r>
+              <a:rPr lang="de-DE" dirty="0"/>
+              <a:t>: </a:t>
+            </a:r>
+            <a:r>
+              <a:rPr lang="de-DE" dirty="0" err="1"/>
+              <a:t>scaled</a:t>
+            </a:r>
+            <a:r>
+              <a:rPr lang="de-DE" dirty="0"/>
+              <a:t> Values</a:t>
+            </a:r>
+            <a:endParaRPr lang="en-US" dirty="0"/>
+          </a:p>
+        </p:txBody>
+      </p:sp>
+      <p:sp>
+        <p:nvSpPr>
+          <p:cNvPr id="3" name="Inhaltsplatzhalter 2">
+            <a:extLst>
+              <a:ext uri="{FF2B5EF4-FFF2-40B4-BE49-F238E27FC236}">
+                <a16:creationId xmlns:a16="http://schemas.microsoft.com/office/drawing/2014/main" id="{DABFB4CD-55BA-4B9D-9388-099CEA4FC0CC}"/>
+              </a:ext>
+            </a:extLst>
+          </p:cNvPr>
+          <p:cNvSpPr>
+            <a:spLocks noGrp="1"/>
+          </p:cNvSpPr>
+          <p:nvPr>
+            <p:ph idx="1"/>
+          </p:nvPr>
+        </p:nvSpPr>
+        <p:spPr/>
+        <p:txBody>
+          <a:bodyPr/>
+          <a:lstStyle/>
+          <a:p>
+            <a:r>
+              <a:rPr lang="en-US" dirty="0"/>
+              <a:t>BLOSUM scores are very small compared to SNAP scores</a:t>
+            </a:r>
+          </a:p>
+          <a:p>
+            <a:pPr marL="0" indent="0">
+              <a:buNone/>
+            </a:pPr>
+            <a:endParaRPr lang="en-US" dirty="0"/>
+          </a:p>
+          <a:p>
+            <a:pPr marL="0" indent="0">
+              <a:buNone/>
+            </a:pPr>
+            <a:endParaRPr lang="en-US" dirty="0"/>
+          </a:p>
+          <a:p>
+            <a:pPr marL="0" indent="0">
+              <a:buNone/>
+            </a:pPr>
+            <a:r>
+              <a:rPr lang="en-US" dirty="0"/>
+              <a:t>[48, -25, 75, -25, 70, -50, 79, -75, 36, -25, 58, 0, 76, -50, 73, -75, 67, </a:t>
+            </a:r>
+          </a:p>
+          <a:p>
+            <a:pPr marL="0" indent="0">
+              <a:buNone/>
+            </a:pPr>
+            <a:r>
+              <a:rPr lang="en-US" dirty="0"/>
+              <a:t>   -50, 15, 33, 24, 66, 76, -25, 0, 0, 30, 0, 79, -50, 65, -25, 62, -25, 68, </a:t>
+            </a:r>
+          </a:p>
+          <a:p>
+            <a:pPr marL="0" indent="0">
+              <a:buNone/>
+            </a:pPr>
+            <a:r>
+              <a:rPr lang="en-US" dirty="0"/>
+              <a:t>   -25, 51, -25, 27, 33]</a:t>
+            </a:r>
+          </a:p>
+        </p:txBody>
+      </p:sp>
+      <p:sp>
+        <p:nvSpPr>
+          <p:cNvPr id="4" name="Foliennummernplatzhalter 3">
+            <a:extLst>
+              <a:ext uri="{FF2B5EF4-FFF2-40B4-BE49-F238E27FC236}">
+                <a16:creationId xmlns:a16="http://schemas.microsoft.com/office/drawing/2014/main" id="{CBB3139C-6890-4543-90A0-FAE3AA3EE102}"/>
+              </a:ext>
+            </a:extLst>
+          </p:cNvPr>
+          <p:cNvSpPr>
+            <a:spLocks noGrp="1"/>
+          </p:cNvSpPr>
+          <p:nvPr>
+            <p:ph type="sldNum" sz="quarter" idx="12"/>
+          </p:nvPr>
+        </p:nvSpPr>
+        <p:spPr/>
+        <p:txBody>
+          <a:bodyPr/>
+          <a:lstStyle/>
+          <a:p>
+            <a:fld id="{CCAAE293-A3DA-4FFC-871C-7F0F209F7CB2}" type="slidenum">
+              <a:rPr lang="en-US" smtClean="0"/>
+              <a:t>7</a:t>
+            </a:fld>
+            <a:endParaRPr lang="en-US"/>
+          </a:p>
+        </p:txBody>
+      </p:sp>
+    </p:spTree>
+    <p:extLst>
+      <p:ext uri="{BB962C8B-B14F-4D97-AF65-F5344CB8AC3E}">
+        <p14:creationId xmlns:p14="http://schemas.microsoft.com/office/powerpoint/2010/main" val="2783528183"/>
+      </p:ext>
+    </p:extLst>
+  </p:cSld>
+  <p:clrMapOvr>
+    <a:masterClrMapping/>
+  </p:clrMapOvr>
+</p:sld>
+</file>
+
+<file path=ppt/slides/slide8.xml><?xml version="1.0" encoding="utf-8"?>
+<p:sld xmlns:a="http://schemas.openxmlformats.org/drawingml/2006/main" xmlns:r="http://schemas.openxmlformats.org/officeDocument/2006/relationships" xmlns:p="http://schemas.openxmlformats.org/presentationml/2006/main">
+  <p:cSld>
+    <p:spTree>
+      <p:nvGrpSpPr>
+        <p:cNvPr id="1" name=""/>
+        <p:cNvGrpSpPr/>
+        <p:nvPr/>
+      </p:nvGrpSpPr>
+      <p:grpSpPr>
+        <a:xfrm>
+          <a:off x="0" y="0"/>
+          <a:ext cx="0" cy="0"/>
+          <a:chOff x="0" y="0"/>
+          <a:chExt cx="0" cy="0"/>
+        </a:xfrm>
+      </p:grpSpPr>
+      <p:sp>
+        <p:nvSpPr>
           <p:cNvPr id="6" name="Titel 5">
             <a:extLst>
               <a:ext uri="{FF2B5EF4-FFF2-40B4-BE49-F238E27FC236}">
@@ -7146,7 +7536,7 @@
           <a:p>
             <a:fld id="{CCAAE293-A3DA-4FFC-871C-7F0F209F7CB2}" type="slidenum">
               <a:rPr lang="en-US" smtClean="0"/>
-              <a:t>7</a:t>
+              <a:t>8</a:t>
             </a:fld>
             <a:endParaRPr lang="en-US"/>
           </a:p>
@@ -7395,190 +7785,6 @@
 </p:sld>
 </file>
 
-<file path=ppt/slides/slide8.xml><?xml version="1.0" encoding="utf-8"?>
-<p:sld xmlns:a="http://schemas.openxmlformats.org/drawingml/2006/main" xmlns:r="http://schemas.openxmlformats.org/officeDocument/2006/relationships" xmlns:p="http://schemas.openxmlformats.org/presentationml/2006/main">
-  <p:cSld>
-    <p:spTree>
-      <p:nvGrpSpPr>
-        <p:cNvPr id="1" name=""/>
-        <p:cNvGrpSpPr/>
-        <p:nvPr/>
-      </p:nvGrpSpPr>
-      <p:grpSpPr>
-        <a:xfrm>
-          <a:off x="0" y="0"/>
-          <a:ext cx="0" cy="0"/>
-          <a:chOff x="0" y="0"/>
-          <a:chExt cx="0" cy="0"/>
-        </a:xfrm>
-      </p:grpSpPr>
-      <p:sp>
-        <p:nvSpPr>
-          <p:cNvPr id="2" name="Titel 1">
-            <a:extLst>
-              <a:ext uri="{FF2B5EF4-FFF2-40B4-BE49-F238E27FC236}">
-                <a16:creationId xmlns:a16="http://schemas.microsoft.com/office/drawing/2014/main" id="{90DA7BD1-7036-4062-A3E7-109EE85AC270}"/>
-              </a:ext>
-            </a:extLst>
-          </p:cNvPr>
-          <p:cNvSpPr>
-            <a:spLocks noGrp="1"/>
-          </p:cNvSpPr>
-          <p:nvPr>
-            <p:ph type="title"/>
-          </p:nvPr>
-        </p:nvSpPr>
-        <p:spPr/>
-        <p:txBody>
-          <a:bodyPr/>
-          <a:lstStyle/>
-          <a:p>
-            <a:pPr algn="ctr"/>
-            <a:r>
-              <a:rPr lang="de-DE" dirty="0"/>
-              <a:t>Hyperparameter</a:t>
-            </a:r>
-            <a:endParaRPr lang="en-US" dirty="0"/>
-          </a:p>
-        </p:txBody>
-      </p:sp>
-      <p:sp>
-        <p:nvSpPr>
-          <p:cNvPr id="3" name="Inhaltsplatzhalter 2">
-            <a:extLst>
-              <a:ext uri="{FF2B5EF4-FFF2-40B4-BE49-F238E27FC236}">
-                <a16:creationId xmlns:a16="http://schemas.microsoft.com/office/drawing/2014/main" id="{08A62452-8D0B-487B-BF6E-8C680AB179B6}"/>
-              </a:ext>
-            </a:extLst>
-          </p:cNvPr>
-          <p:cNvSpPr>
-            <a:spLocks noGrp="1"/>
-          </p:cNvSpPr>
-          <p:nvPr>
-            <p:ph idx="1"/>
-          </p:nvPr>
-        </p:nvSpPr>
-        <p:spPr/>
-        <p:txBody>
-          <a:bodyPr>
-            <a:normAutofit lnSpcReduction="10000"/>
-          </a:bodyPr>
-          <a:lstStyle/>
-          <a:p>
-            <a:r>
-              <a:rPr lang="de-DE" dirty="0" err="1"/>
-              <a:t>Weigths</a:t>
-            </a:r>
-            <a:r>
-              <a:rPr lang="de-DE" dirty="0"/>
-              <a:t>: Binding 0.6; Non-</a:t>
-            </a:r>
-            <a:r>
-              <a:rPr lang="de-DE" dirty="0" err="1"/>
-              <a:t>binding</a:t>
-            </a:r>
-            <a:r>
-              <a:rPr lang="de-DE" dirty="0"/>
-              <a:t> 0.4</a:t>
-            </a:r>
-          </a:p>
-          <a:p>
-            <a:endParaRPr lang="de-DE" dirty="0"/>
-          </a:p>
-          <a:p>
-            <a:r>
-              <a:rPr lang="de-DE" dirty="0"/>
-              <a:t>Learning rate: 0.003</a:t>
-            </a:r>
-          </a:p>
-          <a:p>
-            <a:endParaRPr lang="de-DE" dirty="0"/>
-          </a:p>
-          <a:p>
-            <a:r>
-              <a:rPr lang="de-DE" dirty="0" err="1"/>
-              <a:t>Prediction</a:t>
-            </a:r>
-            <a:r>
-              <a:rPr lang="de-DE" dirty="0"/>
-              <a:t> </a:t>
-            </a:r>
-            <a:r>
-              <a:rPr lang="de-DE" dirty="0" err="1"/>
-              <a:t>Cutoff</a:t>
-            </a:r>
-            <a:r>
-              <a:rPr lang="de-DE" dirty="0"/>
-              <a:t>: 0.4</a:t>
-            </a:r>
-          </a:p>
-          <a:p>
-            <a:endParaRPr lang="de-DE" dirty="0"/>
-          </a:p>
-          <a:p>
-            <a:r>
-              <a:rPr lang="de-DE" dirty="0"/>
-              <a:t>Momentum: 0.9</a:t>
-            </a:r>
-          </a:p>
-          <a:p>
-            <a:endParaRPr lang="de-DE" dirty="0"/>
-          </a:p>
-          <a:p>
-            <a:r>
-              <a:rPr lang="de-DE" dirty="0" err="1"/>
-              <a:t>Epochs</a:t>
-            </a:r>
-            <a:r>
-              <a:rPr lang="de-DE" dirty="0"/>
-              <a:t>: 200</a:t>
-            </a:r>
-            <a:endParaRPr lang="en-US" dirty="0"/>
-          </a:p>
-        </p:txBody>
-      </p:sp>
-      <p:sp>
-        <p:nvSpPr>
-          <p:cNvPr id="4" name="Foliennummernplatzhalter 3">
-            <a:extLst>
-              <a:ext uri="{FF2B5EF4-FFF2-40B4-BE49-F238E27FC236}">
-                <a16:creationId xmlns:a16="http://schemas.microsoft.com/office/drawing/2014/main" id="{5BC1D8A0-0EDC-4692-8350-8E5C893B0A2A}"/>
-              </a:ext>
-            </a:extLst>
-          </p:cNvPr>
-          <p:cNvSpPr>
-            <a:spLocks noGrp="1"/>
-          </p:cNvSpPr>
-          <p:nvPr>
-            <p:ph type="sldNum" sz="quarter" idx="12"/>
-          </p:nvPr>
-        </p:nvSpPr>
-        <p:spPr/>
-        <p:txBody>
-          <a:bodyPr/>
-          <a:lstStyle/>
-          <a:p>
-            <a:fld id="{CCAAE293-A3DA-4FFC-871C-7F0F209F7CB2}" type="slidenum">
-              <a:rPr lang="en-US" smtClean="0"/>
-              <a:t>8</a:t>
-            </a:fld>
-            <a:endParaRPr lang="en-US"/>
-          </a:p>
-        </p:txBody>
-      </p:sp>
-    </p:spTree>
-    <p:extLst>
-      <p:ext uri="{BB962C8B-B14F-4D97-AF65-F5344CB8AC3E}">
-        <p14:creationId xmlns:p14="http://schemas.microsoft.com/office/powerpoint/2010/main" val="3829208825"/>
-      </p:ext>
-    </p:extLst>
-  </p:cSld>
-  <p:clrMapOvr>
-    <a:masterClrMapping/>
-  </p:clrMapOvr>
-</p:sld>
-</file>
-
 <file path=ppt/slides/slide9.xml><?xml version="1.0" encoding="utf-8"?>
 <p:sld xmlns:a="http://schemas.openxmlformats.org/drawingml/2006/main" xmlns:r="http://schemas.openxmlformats.org/officeDocument/2006/relationships" xmlns:p="http://schemas.openxmlformats.org/presentationml/2006/main">
   <p:cSld>
@@ -7598,10 +7804,10 @@
       </p:grpSpPr>
       <p:sp>
         <p:nvSpPr>
-          <p:cNvPr id="5" name="Titel 4">
-            <a:extLst>
-              <a:ext uri="{FF2B5EF4-FFF2-40B4-BE49-F238E27FC236}">
-                <a16:creationId xmlns:a16="http://schemas.microsoft.com/office/drawing/2014/main" id="{ACFF07FE-4BFA-4138-9A63-E2152340D587}"/>
+          <p:cNvPr id="2" name="Titel 1">
+            <a:extLst>
+              <a:ext uri="{FF2B5EF4-FFF2-40B4-BE49-F238E27FC236}">
+                <a16:creationId xmlns:a16="http://schemas.microsoft.com/office/drawing/2014/main" id="{90DA7BD1-7036-4062-A3E7-109EE85AC270}"/>
               </a:ext>
             </a:extLst>
           </p:cNvPr>
@@ -7620,86 +7826,113 @@
             <a:pPr algn="ctr"/>
             <a:r>
               <a:rPr lang="de-DE" dirty="0"/>
-              <a:t>Hyperparameter: Grid </a:t>
-            </a:r>
+              <a:t>Hyperparameter</a:t>
+            </a:r>
+            <a:endParaRPr lang="en-US" dirty="0"/>
+          </a:p>
+        </p:txBody>
+      </p:sp>
+      <p:sp>
+        <p:nvSpPr>
+          <p:cNvPr id="3" name="Inhaltsplatzhalter 2">
+            <a:extLst>
+              <a:ext uri="{FF2B5EF4-FFF2-40B4-BE49-F238E27FC236}">
+                <a16:creationId xmlns:a16="http://schemas.microsoft.com/office/drawing/2014/main" id="{08A62452-8D0B-487B-BF6E-8C680AB179B6}"/>
+              </a:ext>
+            </a:extLst>
+          </p:cNvPr>
+          <p:cNvSpPr>
+            <a:spLocks noGrp="1"/>
+          </p:cNvSpPr>
+          <p:nvPr>
+            <p:ph idx="1"/>
+          </p:nvPr>
+        </p:nvSpPr>
+        <p:spPr/>
+        <p:txBody>
+          <a:bodyPr>
+            <a:normAutofit lnSpcReduction="10000"/>
+          </a:bodyPr>
+          <a:lstStyle/>
+          <a:p>
             <a:r>
               <a:rPr lang="de-DE" dirty="0" err="1"/>
-              <a:t>search</a:t>
-            </a:r>
+              <a:t>Weigths</a:t>
+            </a:r>
+            <a:r>
+              <a:rPr lang="de-DE" dirty="0"/>
+              <a:t>: Binding 0.6; Non-</a:t>
+            </a:r>
+            <a:r>
+              <a:rPr lang="de-DE" dirty="0" err="1"/>
+              <a:t>binding</a:t>
+            </a:r>
+            <a:r>
+              <a:rPr lang="de-DE" dirty="0"/>
+              <a:t> 0.4</a:t>
+            </a:r>
+          </a:p>
+          <a:p>
             <a:endParaRPr lang="de-DE" dirty="0"/>
           </a:p>
-        </p:txBody>
-      </p:sp>
-      <p:pic>
-        <p:nvPicPr>
-          <p:cNvPr id="8" name="Inhaltsplatzhalter 7">
-            <a:extLst>
-              <a:ext uri="{FF2B5EF4-FFF2-40B4-BE49-F238E27FC236}">
-                <a16:creationId xmlns:a16="http://schemas.microsoft.com/office/drawing/2014/main" id="{DD13C4F1-21ED-4973-B770-7D5C0CD37A89}"/>
-              </a:ext>
-            </a:extLst>
-          </p:cNvPr>
-          <p:cNvPicPr>
-            <a:picLocks noGrp="1" noChangeAspect="1"/>
-          </p:cNvPicPr>
-          <p:nvPr>
-            <p:ph sz="half" idx="1"/>
-          </p:nvPr>
-        </p:nvPicPr>
-        <p:blipFill>
-          <a:blip r:embed="rId2"/>
-          <a:stretch>
-            <a:fillRect/>
-          </a:stretch>
-        </p:blipFill>
-        <p:spPr>
-          <a:xfrm>
-            <a:off x="1249491" y="2053453"/>
-            <a:ext cx="4359018" cy="3895682"/>
-          </a:xfrm>
-          <a:prstGeom prst="rect">
-            <a:avLst/>
-          </a:prstGeom>
-        </p:spPr>
-      </p:pic>
-      <p:pic>
-        <p:nvPicPr>
-          <p:cNvPr id="9" name="Inhaltsplatzhalter 8">
-            <a:extLst>
-              <a:ext uri="{FF2B5EF4-FFF2-40B4-BE49-F238E27FC236}">
-                <a16:creationId xmlns:a16="http://schemas.microsoft.com/office/drawing/2014/main" id="{D9478754-314A-47F3-8298-65235AA2C335}"/>
-              </a:ext>
-            </a:extLst>
-          </p:cNvPr>
-          <p:cNvPicPr>
-            <a:picLocks noGrp="1" noChangeAspect="1"/>
-          </p:cNvPicPr>
-          <p:nvPr>
-            <p:ph sz="half" idx="2"/>
-          </p:nvPr>
-        </p:nvPicPr>
-        <p:blipFill>
-          <a:blip r:embed="rId3"/>
-          <a:stretch>
-            <a:fillRect/>
-          </a:stretch>
-        </p:blipFill>
-        <p:spPr>
-          <a:xfrm>
-            <a:off x="6644456" y="2108322"/>
-            <a:ext cx="4237087" cy="3785944"/>
-          </a:xfrm>
-          <a:prstGeom prst="rect">
-            <a:avLst/>
-          </a:prstGeom>
-        </p:spPr>
-      </p:pic>
+          <a:p>
+            <a:r>
+              <a:rPr lang="de-DE" dirty="0"/>
+              <a:t>Learning rate: 0.003</a:t>
+            </a:r>
+          </a:p>
+          <a:p>
+            <a:endParaRPr lang="de-DE" dirty="0"/>
+          </a:p>
+          <a:p>
+            <a:r>
+              <a:rPr lang="de-DE" dirty="0" err="1"/>
+              <a:t>Prediction</a:t>
+            </a:r>
+            <a:r>
+              <a:rPr lang="de-DE" dirty="0"/>
+              <a:t> </a:t>
+            </a:r>
+            <a:r>
+              <a:rPr lang="de-DE" dirty="0" err="1"/>
+              <a:t>Cutoff</a:t>
+            </a:r>
+            <a:r>
+              <a:rPr lang="de-DE" dirty="0"/>
+              <a:t>: 0.4</a:t>
+            </a:r>
+          </a:p>
+          <a:p>
+            <a:endParaRPr lang="de-DE" dirty="0"/>
+          </a:p>
+          <a:p>
+            <a:r>
+              <a:rPr lang="de-DE" dirty="0"/>
+              <a:t>Momentum: 0.9</a:t>
+            </a:r>
+          </a:p>
+          <a:p>
+            <a:endParaRPr lang="de-DE" dirty="0"/>
+          </a:p>
+          <a:p>
+            <a:r>
+              <a:rPr lang="de-DE" dirty="0" err="1"/>
+              <a:t>Epochs</a:t>
+            </a:r>
+            <a:r>
+              <a:rPr lang="de-DE" dirty="0"/>
+              <a:t>: 200</a:t>
+            </a:r>
+            <a:endParaRPr lang="en-US" dirty="0"/>
+          </a:p>
+        </p:txBody>
+      </p:sp>
       <p:sp>
         <p:nvSpPr>
           <p:cNvPr id="4" name="Foliennummernplatzhalter 3">
             <a:extLst>
               <a:ext uri="{FF2B5EF4-FFF2-40B4-BE49-F238E27FC236}">
-                <a16:creationId xmlns:a16="http://schemas.microsoft.com/office/drawing/2014/main" id="{41274183-5DF6-42AA-9AF2-97B73CC23AA2}"/>
+                <a16:creationId xmlns:a16="http://schemas.microsoft.com/office/drawing/2014/main" id="{5BC1D8A0-0EDC-4692-8350-8E5C893B0A2A}"/>
               </a:ext>
             </a:extLst>
           </p:cNvPr>
@@ -7726,7 +7959,7 @@
     </p:spTree>
     <p:extLst>
       <p:ext uri="{BB962C8B-B14F-4D97-AF65-F5344CB8AC3E}">
-        <p14:creationId xmlns:p14="http://schemas.microsoft.com/office/powerpoint/2010/main" val="1355063638"/>
+        <p14:creationId xmlns:p14="http://schemas.microsoft.com/office/powerpoint/2010/main" val="3829208825"/>
       </p:ext>
     </p:extLst>
   </p:cSld>

</xml_diff>